<commit_message>
updated SQL Primer slide deck
</commit_message>
<xml_diff>
--- a/1-sql-primer/SQL_Primer.pptx
+++ b/1-sql-primer/SQL_Primer.pptx
@@ -5,13 +5,19 @@
     <p:sldMasterId id="2147483654" r:id="rId1"/>
   </p:sldMasterIdLst>
   <p:notesMasterIdLst>
-    <p:notesMasterId r:id="rId6"/>
+    <p:notesMasterId r:id="rId12"/>
   </p:notesMasterIdLst>
   <p:sldIdLst>
     <p:sldId id="256" r:id="rId2"/>
     <p:sldId id="257" r:id="rId3"/>
-    <p:sldId id="258" r:id="rId4"/>
-    <p:sldId id="259" r:id="rId5"/>
+    <p:sldId id="259" r:id="rId4"/>
+    <p:sldId id="260" r:id="rId5"/>
+    <p:sldId id="262" r:id="rId6"/>
+    <p:sldId id="261" r:id="rId7"/>
+    <p:sldId id="264" r:id="rId8"/>
+    <p:sldId id="265" r:id="rId9"/>
+    <p:sldId id="266" r:id="rId10"/>
+    <p:sldId id="263" r:id="rId11"/>
   </p:sldIdLst>
   <p:sldSz cx="9144000" cy="6858000" type="screen4x3"/>
   <p:notesSz cx="7010400" cy="9236075"/>
@@ -2229,6 +2235,11 @@
         </p:txBody>
       </p:sp>
     </p:spTree>
+    <p:extLst>
+      <p:ext uri="{BB962C8B-B14F-4D97-AF65-F5344CB8AC3E}">
+        <p14:creationId xmlns:p14="http://schemas.microsoft.com/office/powerpoint/2010/main" val="1826913370"/>
+      </p:ext>
+    </p:extLst>
   </p:cSld>
   <p:clrMapOvr>
     <a:masterClrMapping/>
@@ -2241,7 +2252,7 @@
   <p:cSld>
     <p:spTree>
       <p:nvGrpSpPr>
-        <p:cNvPr id="1" name="Shape 61"/>
+        <p:cNvPr id="1" name="Shape 52"/>
         <p:cNvGrpSpPr/>
         <p:nvPr/>
       </p:nvGrpSpPr>
@@ -2255,7 +2266,7 @@
       </p:grpSpPr>
       <p:sp>
         <p:nvSpPr>
-          <p:cNvPr id="62" name="Google Shape;62;p4:notes"/>
+          <p:cNvPr id="53" name="Google Shape;53;p2:notes"/>
           <p:cNvSpPr>
             <a:spLocks noGrp="1" noRot="1" noChangeAspect="1"/>
           </p:cNvSpPr>
@@ -2306,7 +2317,7 @@
       </p:sp>
       <p:sp>
         <p:nvSpPr>
-          <p:cNvPr id="63" name="Google Shape;63;p4:notes"/>
+          <p:cNvPr id="54" name="Google Shape;54;p2:notes"/>
           <p:cNvSpPr txBox="1">
             <a:spLocks noGrp="1"/>
           </p:cNvSpPr>
@@ -2352,7 +2363,7 @@
       </p:sp>
       <p:sp>
         <p:nvSpPr>
-          <p:cNvPr id="64" name="Google Shape;64;p4:notes"/>
+          <p:cNvPr id="55" name="Google Shape;55;p2:notes"/>
           <p:cNvSpPr txBox="1">
             <a:spLocks noGrp="1"/>
           </p:cNvSpPr>
@@ -2394,7 +2405,7 @@
             </a:pPr>
             <a:fld id="{00000000-1234-1234-1234-123412341234}" type="slidenum">
               <a:rPr lang="en-US"/>
-              <a:t>4</a:t>
+              <a:t>8</a:t>
             </a:fld>
             <a:endParaRPr/>
           </a:p>
@@ -2403,7 +2414,184 @@
     </p:spTree>
     <p:extLst>
       <p:ext uri="{BB962C8B-B14F-4D97-AF65-F5344CB8AC3E}">
-        <p14:creationId xmlns:p14="http://schemas.microsoft.com/office/powerpoint/2010/main" val="1826913370"/>
+        <p14:creationId xmlns:p14="http://schemas.microsoft.com/office/powerpoint/2010/main" val="3490762142"/>
+      </p:ext>
+    </p:extLst>
+  </p:cSld>
+  <p:clrMapOvr>
+    <a:masterClrMapping/>
+  </p:clrMapOvr>
+</p:notes>
+</file>
+
+<file path=ppt/notesSlides/notesSlide5.xml><?xml version="1.0" encoding="utf-8"?>
+<p:notes xmlns:a="http://schemas.openxmlformats.org/drawingml/2006/main" xmlns:r="http://schemas.openxmlformats.org/officeDocument/2006/relationships" xmlns:p="http://schemas.openxmlformats.org/presentationml/2006/main" showMasterSp="0" showMasterPhAnim="0">
+  <p:cSld>
+    <p:spTree>
+      <p:nvGrpSpPr>
+        <p:cNvPr id="1" name="Shape 52"/>
+        <p:cNvGrpSpPr/>
+        <p:nvPr/>
+      </p:nvGrpSpPr>
+      <p:grpSpPr>
+        <a:xfrm>
+          <a:off x="0" y="0"/>
+          <a:ext cx="0" cy="0"/>
+          <a:chOff x="0" y="0"/>
+          <a:chExt cx="0" cy="0"/>
+        </a:xfrm>
+      </p:grpSpPr>
+      <p:sp>
+        <p:nvSpPr>
+          <p:cNvPr id="53" name="Google Shape;53;p2:notes"/>
+          <p:cNvSpPr>
+            <a:spLocks noGrp="1" noRot="1" noChangeAspect="1"/>
+          </p:cNvSpPr>
+          <p:nvPr>
+            <p:ph type="sldImg" idx="2"/>
+          </p:nvPr>
+        </p:nvSpPr>
+        <p:spPr>
+          <a:xfrm>
+            <a:off x="1195388" y="692150"/>
+            <a:ext cx="4619625" cy="3463925"/>
+          </a:xfrm>
+          <a:custGeom>
+            <a:avLst/>
+            <a:gdLst/>
+            <a:ahLst/>
+            <a:cxnLst/>
+            <a:rect l="l" t="t" r="r" b="b"/>
+            <a:pathLst>
+              <a:path w="120000" h="120000" extrusionOk="0">
+                <a:moveTo>
+                  <a:pt x="0" y="0"/>
+                </a:moveTo>
+                <a:lnTo>
+                  <a:pt x="120000" y="0"/>
+                </a:lnTo>
+                <a:lnTo>
+                  <a:pt x="120000" y="120000"/>
+                </a:lnTo>
+                <a:lnTo>
+                  <a:pt x="0" y="120000"/>
+                </a:lnTo>
+                <a:close/>
+              </a:path>
+            </a:pathLst>
+          </a:custGeom>
+          <a:noFill/>
+          <a:ln w="12700" cap="flat" cmpd="sng">
+            <a:solidFill>
+              <a:srgbClr val="000000"/>
+            </a:solidFill>
+            <a:prstDash val="solid"/>
+            <a:round/>
+            <a:headEnd type="none" w="sm" len="sm"/>
+            <a:tailEnd type="none" w="sm" len="sm"/>
+          </a:ln>
+        </p:spPr>
+      </p:sp>
+      <p:sp>
+        <p:nvSpPr>
+          <p:cNvPr id="54" name="Google Shape;54;p2:notes"/>
+          <p:cNvSpPr txBox="1">
+            <a:spLocks noGrp="1"/>
+          </p:cNvSpPr>
+          <p:nvPr>
+            <p:ph type="body" idx="1"/>
+          </p:nvPr>
+        </p:nvSpPr>
+        <p:spPr>
+          <a:xfrm>
+            <a:off x="701040" y="4387136"/>
+            <a:ext cx="5608320" cy="4156234"/>
+          </a:xfrm>
+          <a:prstGeom prst="rect">
+            <a:avLst/>
+          </a:prstGeom>
+          <a:noFill/>
+          <a:ln>
+            <a:noFill/>
+          </a:ln>
+        </p:spPr>
+        <p:txBody>
+          <a:bodyPr spcFirstLastPara="1" wrap="square" lIns="93175" tIns="46575" rIns="93175" bIns="46575" anchor="t" anchorCtr="0">
+            <a:noAutofit/>
+          </a:bodyPr>
+          <a:lstStyle/>
+          <a:p>
+            <a:pPr marL="0" lvl="0" indent="0" algn="l" rtl="0">
+              <a:lnSpc>
+                <a:spcPct val="100000"/>
+              </a:lnSpc>
+              <a:spcBef>
+                <a:spcPts val="0"/>
+              </a:spcBef>
+              <a:spcAft>
+                <a:spcPts val="0"/>
+              </a:spcAft>
+              <a:buSzPts val="1400"/>
+              <a:buNone/>
+            </a:pPr>
+            <a:endParaRPr/>
+          </a:p>
+        </p:txBody>
+      </p:sp>
+      <p:sp>
+        <p:nvSpPr>
+          <p:cNvPr id="55" name="Google Shape;55;p2:notes"/>
+          <p:cNvSpPr txBox="1">
+            <a:spLocks noGrp="1"/>
+          </p:cNvSpPr>
+          <p:nvPr>
+            <p:ph type="sldNum" idx="12"/>
+          </p:nvPr>
+        </p:nvSpPr>
+        <p:spPr>
+          <a:xfrm>
+            <a:off x="3970938" y="8772669"/>
+            <a:ext cx="3037840" cy="461804"/>
+          </a:xfrm>
+          <a:prstGeom prst="rect">
+            <a:avLst/>
+          </a:prstGeom>
+          <a:noFill/>
+          <a:ln>
+            <a:noFill/>
+          </a:ln>
+        </p:spPr>
+        <p:txBody>
+          <a:bodyPr spcFirstLastPara="1" wrap="square" lIns="93175" tIns="46575" rIns="93175" bIns="46575" anchor="b" anchorCtr="0">
+            <a:noAutofit/>
+          </a:bodyPr>
+          <a:lstStyle/>
+          <a:p>
+            <a:pPr marL="0" lvl="0" indent="0" algn="r" rtl="0">
+              <a:lnSpc>
+                <a:spcPct val="100000"/>
+              </a:lnSpc>
+              <a:spcBef>
+                <a:spcPts val="0"/>
+              </a:spcBef>
+              <a:spcAft>
+                <a:spcPts val="0"/>
+              </a:spcAft>
+              <a:buSzPts val="1400"/>
+              <a:buNone/>
+            </a:pPr>
+            <a:fld id="{00000000-1234-1234-1234-123412341234}" type="slidenum">
+              <a:rPr lang="en-US"/>
+              <a:t>9</a:t>
+            </a:fld>
+            <a:endParaRPr/>
+          </a:p>
+        </p:txBody>
+      </p:sp>
+    </p:spTree>
+    <p:extLst>
+      <p:ext uri="{BB962C8B-B14F-4D97-AF65-F5344CB8AC3E}">
+        <p14:creationId xmlns:p14="http://schemas.microsoft.com/office/powerpoint/2010/main" val="422400090"/>
       </p:ext>
     </p:extLst>
   </p:cSld>
@@ -8767,12 +8955,8 @@
               <a:buNone/>
             </a:pPr>
             <a:r>
-              <a:rPr lang="en-US" dirty="0" smtClean="0"/>
+              <a:rPr lang="en-US" dirty="0"/>
               <a:t>SQL Primer</a:t>
-            </a:r>
-            <a:r>
-              <a:rPr lang="en-US" dirty="0"/>
-              <a:t/>
             </a:r>
             <a:br>
               <a:rPr lang="en-US" dirty="0"/>
@@ -8850,7 +9034,7 @@
               <a:buNone/>
             </a:pPr>
             <a:r>
-              <a:rPr lang="en-US" dirty="0" smtClean="0"/>
+              <a:rPr lang="en-US" dirty="0"/>
               <a:t>Winter, 2020</a:t>
             </a:r>
             <a:endParaRPr dirty="0"/>
@@ -8908,6 +9092,197 @@
         </p:txBody>
       </p:sp>
     </p:spTree>
+  </p:cSld>
+  <p:clrMapOvr>
+    <a:masterClrMapping/>
+  </p:clrMapOvr>
+</p:sld>
+</file>
+
+<file path=ppt/slides/slide10.xml><?xml version="1.0" encoding="utf-8"?>
+<p:sld xmlns:a="http://schemas.openxmlformats.org/drawingml/2006/main" xmlns:r="http://schemas.openxmlformats.org/officeDocument/2006/relationships" xmlns:p="http://schemas.openxmlformats.org/presentationml/2006/main">
+  <p:cSld>
+    <p:spTree>
+      <p:nvGrpSpPr>
+        <p:cNvPr id="1" name=""/>
+        <p:cNvGrpSpPr/>
+        <p:nvPr/>
+      </p:nvGrpSpPr>
+      <p:grpSpPr>
+        <a:xfrm>
+          <a:off x="0" y="0"/>
+          <a:ext cx="0" cy="0"/>
+          <a:chOff x="0" y="0"/>
+          <a:chExt cx="0" cy="0"/>
+        </a:xfrm>
+      </p:grpSpPr>
+      <p:sp>
+        <p:nvSpPr>
+          <p:cNvPr id="2" name="Title 1">
+            <a:extLst>
+              <a:ext uri="{FF2B5EF4-FFF2-40B4-BE49-F238E27FC236}">
+                <a16:creationId xmlns:a16="http://schemas.microsoft.com/office/drawing/2014/main" id="{F81768C4-73F8-6A4A-A317-EB5B1641540B}"/>
+              </a:ext>
+            </a:extLst>
+          </p:cNvPr>
+          <p:cNvSpPr>
+            <a:spLocks noGrp="1"/>
+          </p:cNvSpPr>
+          <p:nvPr>
+            <p:ph type="title"/>
+          </p:nvPr>
+        </p:nvSpPr>
+        <p:spPr/>
+        <p:txBody>
+          <a:bodyPr/>
+          <a:lstStyle/>
+          <a:p>
+            <a:r>
+              <a:rPr lang="en-US" dirty="0"/>
+              <a:t>Resources</a:t>
+            </a:r>
+          </a:p>
+        </p:txBody>
+      </p:sp>
+      <p:sp>
+        <p:nvSpPr>
+          <p:cNvPr id="3" name="Text Placeholder 2">
+            <a:extLst>
+              <a:ext uri="{FF2B5EF4-FFF2-40B4-BE49-F238E27FC236}">
+                <a16:creationId xmlns:a16="http://schemas.microsoft.com/office/drawing/2014/main" id="{1BFA1603-DCEA-8849-8DEA-0610C87DACAB}"/>
+              </a:ext>
+            </a:extLst>
+          </p:cNvPr>
+          <p:cNvSpPr>
+            <a:spLocks noGrp="1"/>
+          </p:cNvSpPr>
+          <p:nvPr>
+            <p:ph type="body" idx="1"/>
+          </p:nvPr>
+        </p:nvSpPr>
+        <p:spPr>
+          <a:xfrm>
+            <a:off x="457200" y="1485839"/>
+            <a:ext cx="8229600" cy="4525963"/>
+          </a:xfrm>
+        </p:spPr>
+        <p:txBody>
+          <a:bodyPr/>
+          <a:lstStyle/>
+          <a:p>
+            <a:r>
+              <a:rPr lang="en-US" dirty="0" err="1"/>
+              <a:t>DataCamp</a:t>
+            </a:r>
+            <a:r>
+              <a:rPr lang="en-US" dirty="0"/>
+              <a:t>:</a:t>
+            </a:r>
+          </a:p>
+          <a:p>
+            <a:pPr lvl="1"/>
+            <a:r>
+              <a:rPr lang="en-US" sz="1800" dirty="0">
+                <a:hlinkClick r:id="rId2"/>
+              </a:rPr>
+              <a:t>https://www.datacamp.com/courses/intro-to-sql-for-data-science</a:t>
+            </a:r>
+            <a:endParaRPr lang="en-US" sz="1800" dirty="0"/>
+          </a:p>
+          <a:p>
+            <a:r>
+              <a:rPr lang="en-US" dirty="0"/>
+              <a:t>LinkedIn Learning:</a:t>
+            </a:r>
+          </a:p>
+          <a:p>
+            <a:pPr lvl="1"/>
+            <a:r>
+              <a:rPr lang="en-US" sz="1800" dirty="0">
+                <a:hlinkClick r:id="rId3"/>
+              </a:rPr>
+              <a:t>https://www.linkedin.com/learning/sql-essential-training-3/understanding-sql</a:t>
+            </a:r>
+            <a:endParaRPr lang="en-US" sz="1800" dirty="0"/>
+          </a:p>
+          <a:p>
+            <a:r>
+              <a:rPr lang="en-US" dirty="0"/>
+              <a:t>Khan Academy:</a:t>
+            </a:r>
+          </a:p>
+          <a:p>
+            <a:pPr lvl="1"/>
+            <a:r>
+              <a:rPr lang="en-US" sz="1800" dirty="0">
+                <a:hlinkClick r:id="rId4"/>
+              </a:rPr>
+              <a:t>https://www.khanacademy.org/computing/computer-programming/sql</a:t>
+            </a:r>
+            <a:endParaRPr lang="en-US" sz="1800" dirty="0"/>
+          </a:p>
+          <a:p>
+            <a:r>
+              <a:rPr lang="en-US" dirty="0"/>
+              <a:t>Safari Books Online:</a:t>
+            </a:r>
+          </a:p>
+          <a:p>
+            <a:pPr lvl="1"/>
+            <a:r>
+              <a:rPr lang="en-US" sz="1800" dirty="0">
+                <a:hlinkClick r:id="rId5"/>
+              </a:rPr>
+              <a:t>https://learning.oreilly.com/learning-paths/learning-path-sql/9781492058076/</a:t>
+            </a:r>
+            <a:endParaRPr lang="en-US" sz="1800" dirty="0"/>
+          </a:p>
+        </p:txBody>
+      </p:sp>
+      <p:sp>
+        <p:nvSpPr>
+          <p:cNvPr id="4" name="Slide Number Placeholder 3">
+            <a:extLst>
+              <a:ext uri="{FF2B5EF4-FFF2-40B4-BE49-F238E27FC236}">
+                <a16:creationId xmlns:a16="http://schemas.microsoft.com/office/drawing/2014/main" id="{1797D19B-1123-F743-82A8-27C8B8B5DEEC}"/>
+              </a:ext>
+            </a:extLst>
+          </p:cNvPr>
+          <p:cNvSpPr>
+            <a:spLocks noGrp="1"/>
+          </p:cNvSpPr>
+          <p:nvPr>
+            <p:ph type="sldNum" idx="12"/>
+          </p:nvPr>
+        </p:nvSpPr>
+        <p:spPr/>
+        <p:txBody>
+          <a:bodyPr/>
+          <a:lstStyle/>
+          <a:p>
+            <a:pPr marL="0" lvl="0" indent="0" algn="r" rtl="0">
+              <a:spcBef>
+                <a:spcPts val="0"/>
+              </a:spcBef>
+              <a:spcAft>
+                <a:spcPts val="0"/>
+              </a:spcAft>
+              <a:buNone/>
+            </a:pPr>
+            <a:fld id="{00000000-1234-1234-1234-123412341234}" type="slidenum">
+              <a:rPr lang="en-US" smtClean="0"/>
+              <a:t>10</a:t>
+            </a:fld>
+            <a:endParaRPr lang="en-US"/>
+          </a:p>
+        </p:txBody>
+      </p:sp>
+    </p:spTree>
+    <p:extLst>
+      <p:ext uri="{BB962C8B-B14F-4D97-AF65-F5344CB8AC3E}">
+        <p14:creationId xmlns:p14="http://schemas.microsoft.com/office/powerpoint/2010/main" val="1860519246"/>
+      </p:ext>
+    </p:extLst>
   </p:cSld>
   <p:clrMapOvr>
     <a:masterClrMapping/>
@@ -9189,15 +9564,7 @@
                   <a:schemeClr val="dk1"/>
                 </a:solidFill>
               </a:rPr>
-              <a:t>Primer on SQL </a:t>
-            </a:r>
-            <a:r>
-              <a:rPr lang="en-US" sz="1800" dirty="0" smtClean="0">
-                <a:solidFill>
-                  <a:schemeClr val="dk1"/>
-                </a:solidFill>
-              </a:rPr>
-              <a:t>Syntax</a:t>
+              <a:t>Primer on SQL Syntax</a:t>
             </a:r>
           </a:p>
           <a:p>
@@ -9210,7 +9577,7 @@
               <a:buChar char="▪"/>
             </a:pPr>
             <a:r>
-              <a:rPr lang="en-US" sz="1800" dirty="0" smtClean="0">
+              <a:rPr lang="en-US" sz="1800" dirty="0">
                 <a:solidFill>
                   <a:schemeClr val="dk1"/>
                 </a:solidFill>
@@ -9354,7 +9721,7 @@
               <a:buChar char="▪"/>
             </a:pPr>
             <a:r>
-              <a:rPr lang="en-US" sz="1800" b="0" i="0" u="none" strike="noStrike" cap="none" dirty="0" smtClean="0">
+              <a:rPr lang="en-US" sz="1800" b="0" i="0" u="none" strike="noStrike" cap="none" dirty="0">
                 <a:solidFill>
                   <a:schemeClr val="dk1"/>
                 </a:solidFill>
@@ -9385,12 +9752,12 @@
               <a:buChar char="▪"/>
             </a:pPr>
             <a:r>
-              <a:rPr lang="en-US" sz="1800" dirty="0" smtClean="0">
+              <a:rPr lang="en-US" sz="1800" dirty="0">
                 <a:solidFill>
                   <a:schemeClr val="dk1"/>
                 </a:solidFill>
               </a:rPr>
-              <a:t>Stata</a:t>
+              <a:t>Python</a:t>
             </a:r>
             <a:endParaRPr dirty="0"/>
           </a:p>
@@ -9422,7 +9789,7 @@
                 <a:cs typeface="Arial"/>
                 <a:sym typeface="Arial"/>
               </a:rPr>
-              <a:t>Python</a:t>
+              <a:t>Stata</a:t>
             </a:r>
             <a:endParaRPr sz="1800" b="0" i="0" u="none" strike="noStrike" cap="none" dirty="0">
               <a:solidFill>
@@ -9867,10 +10234,10 @@
               <a:buNone/>
             </a:pPr>
             <a:r>
-              <a:rPr lang="en-US"/>
-              <a:t>Differences Between Kellogg’s Servers</a:t>
+              <a:rPr lang="en-US" dirty="0"/>
+              <a:t>Preparation for Coding Lab</a:t>
             </a:r>
-            <a:endParaRPr/>
+            <a:endParaRPr dirty="0"/>
           </a:p>
         </p:txBody>
       </p:sp>
@@ -9974,213 +10341,6 @@
           </a:p>
         </p:txBody>
       </p:sp>
-      <p:pic>
-        <p:nvPicPr>
-          <p:cNvPr id="69" name="Google Shape;69;p10"/>
-          <p:cNvPicPr preferRelativeResize="0"/>
-          <p:nvPr/>
-        </p:nvPicPr>
-        <p:blipFill>
-          <a:blip r:embed="rId3">
-            <a:alphaModFix/>
-          </a:blip>
-          <a:stretch>
-            <a:fillRect/>
-          </a:stretch>
-        </p:blipFill>
-        <p:spPr>
-          <a:xfrm>
-            <a:off x="386213" y="878850"/>
-            <a:ext cx="8371575" cy="5298150"/>
-          </a:xfrm>
-          <a:prstGeom prst="rect">
-            <a:avLst/>
-          </a:prstGeom>
-          <a:noFill/>
-          <a:ln>
-            <a:noFill/>
-          </a:ln>
-        </p:spPr>
-      </p:pic>
-    </p:spTree>
-  </p:cSld>
-  <p:clrMapOvr>
-    <a:masterClrMapping/>
-  </p:clrMapOvr>
-</p:sld>
-</file>
-
-<file path=ppt/slides/slide4.xml><?xml version="1.0" encoding="utf-8"?>
-<p:sld xmlns:a="http://schemas.openxmlformats.org/drawingml/2006/main" xmlns:r="http://schemas.openxmlformats.org/officeDocument/2006/relationships" xmlns:p="http://schemas.openxmlformats.org/presentationml/2006/main">
-  <p:cSld>
-    <p:spTree>
-      <p:nvGrpSpPr>
-        <p:cNvPr id="1" name="Shape 65"/>
-        <p:cNvGrpSpPr/>
-        <p:nvPr/>
-      </p:nvGrpSpPr>
-      <p:grpSpPr>
-        <a:xfrm>
-          <a:off x="0" y="0"/>
-          <a:ext cx="0" cy="0"/>
-          <a:chOff x="0" y="0"/>
-          <a:chExt cx="0" cy="0"/>
-        </a:xfrm>
-      </p:grpSpPr>
-      <p:sp>
-        <p:nvSpPr>
-          <p:cNvPr id="66" name="Google Shape;66;p10"/>
-          <p:cNvSpPr txBox="1">
-            <a:spLocks noGrp="1"/>
-          </p:cNvSpPr>
-          <p:nvPr>
-            <p:ph type="title"/>
-          </p:nvPr>
-        </p:nvSpPr>
-        <p:spPr>
-          <a:xfrm>
-            <a:off x="457200" y="0"/>
-            <a:ext cx="8229600" cy="1143000"/>
-          </a:xfrm>
-          <a:prstGeom prst="rect">
-            <a:avLst/>
-          </a:prstGeom>
-          <a:noFill/>
-          <a:ln>
-            <a:noFill/>
-          </a:ln>
-        </p:spPr>
-        <p:txBody>
-          <a:bodyPr spcFirstLastPara="1" wrap="square" lIns="91425" tIns="45700" rIns="91425" bIns="45700" anchor="ctr" anchorCtr="0">
-            <a:noAutofit/>
-          </a:bodyPr>
-          <a:lstStyle/>
-          <a:p>
-            <a:pPr marL="0" lvl="0" indent="0" algn="l" rtl="0">
-              <a:lnSpc>
-                <a:spcPct val="100000"/>
-              </a:lnSpc>
-              <a:spcBef>
-                <a:spcPts val="0"/>
-              </a:spcBef>
-              <a:spcAft>
-                <a:spcPts val="0"/>
-              </a:spcAft>
-              <a:buClr>
-                <a:srgbClr val="3D146F"/>
-              </a:buClr>
-              <a:buSzPts val="3200"/>
-              <a:buFont typeface="Arial"/>
-              <a:buNone/>
-            </a:pPr>
-            <a:r>
-              <a:rPr lang="en-US" dirty="0" smtClean="0"/>
-              <a:t>During the Break:</a:t>
-            </a:r>
-            <a:endParaRPr dirty="0"/>
-          </a:p>
-        </p:txBody>
-      </p:sp>
-      <p:sp>
-        <p:nvSpPr>
-          <p:cNvPr id="67" name="Google Shape;67;p10"/>
-          <p:cNvSpPr txBox="1">
-            <a:spLocks noGrp="1"/>
-          </p:cNvSpPr>
-          <p:nvPr>
-            <p:ph type="ftr" idx="11"/>
-          </p:nvPr>
-        </p:nvSpPr>
-        <p:spPr>
-          <a:xfrm>
-            <a:off x="4572000" y="6506896"/>
-            <a:ext cx="4114800" cy="365125"/>
-          </a:xfrm>
-          <a:prstGeom prst="rect">
-            <a:avLst/>
-          </a:prstGeom>
-          <a:noFill/>
-          <a:ln>
-            <a:noFill/>
-          </a:ln>
-        </p:spPr>
-        <p:txBody>
-          <a:bodyPr spcFirstLastPara="1" wrap="square" lIns="91425" tIns="45700" rIns="91425" bIns="45700" anchor="ctr" anchorCtr="0">
-            <a:noAutofit/>
-          </a:bodyPr>
-          <a:lstStyle/>
-          <a:p>
-            <a:pPr marL="0" lvl="0" indent="0" algn="r" rtl="0">
-              <a:lnSpc>
-                <a:spcPct val="100000"/>
-              </a:lnSpc>
-              <a:spcBef>
-                <a:spcPts val="0"/>
-              </a:spcBef>
-              <a:spcAft>
-                <a:spcPts val="0"/>
-              </a:spcAft>
-              <a:buSzPts val="1400"/>
-              <a:buNone/>
-            </a:pPr>
-            <a:r>
-              <a:rPr lang="en-US" dirty="0"/>
-              <a:t>Data Skills for Empiricists </a:t>
-            </a:r>
-            <a:endParaRPr dirty="0"/>
-          </a:p>
-        </p:txBody>
-      </p:sp>
-      <p:sp>
-        <p:nvSpPr>
-          <p:cNvPr id="68" name="Google Shape;68;p10"/>
-          <p:cNvSpPr txBox="1">
-            <a:spLocks noGrp="1"/>
-          </p:cNvSpPr>
-          <p:nvPr>
-            <p:ph type="sldNum" idx="12"/>
-          </p:nvPr>
-        </p:nvSpPr>
-        <p:spPr>
-          <a:xfrm>
-            <a:off x="8686800" y="6506896"/>
-            <a:ext cx="416244" cy="365125"/>
-          </a:xfrm>
-          <a:prstGeom prst="rect">
-            <a:avLst/>
-          </a:prstGeom>
-          <a:noFill/>
-          <a:ln>
-            <a:noFill/>
-          </a:ln>
-        </p:spPr>
-        <p:txBody>
-          <a:bodyPr spcFirstLastPara="1" wrap="square" lIns="91425" tIns="45700" rIns="91425" bIns="45700" anchor="ctr" anchorCtr="0">
-            <a:noAutofit/>
-          </a:bodyPr>
-          <a:lstStyle/>
-          <a:p>
-            <a:pPr marL="0" lvl="0" indent="0" algn="r" rtl="0">
-              <a:lnSpc>
-                <a:spcPct val="100000"/>
-              </a:lnSpc>
-              <a:spcBef>
-                <a:spcPts val="0"/>
-              </a:spcBef>
-              <a:spcAft>
-                <a:spcPts val="0"/>
-              </a:spcAft>
-              <a:buSzPts val="1000"/>
-              <a:buNone/>
-            </a:pPr>
-            <a:fld id="{00000000-1234-1234-1234-123412341234}" type="slidenum">
-              <a:rPr lang="en-US"/>
-              <a:t>4</a:t>
-            </a:fld>
-            <a:endParaRPr/>
-          </a:p>
-        </p:txBody>
-      </p:sp>
       <p:sp>
         <p:nvSpPr>
           <p:cNvPr id="6" name="Google Shape;66;p10"/>
@@ -10455,7 +10615,7 @@
           </a:lstStyle>
           <a:p>
             <a:r>
-              <a:rPr lang="en-US" sz="2800" dirty="0" smtClean="0">
+              <a:rPr lang="en-US" sz="2800" dirty="0">
                 <a:solidFill>
                   <a:schemeClr val="tx1"/>
                 </a:solidFill>
@@ -10465,7 +10625,7 @@
           </a:p>
           <a:p>
             <a:r>
-              <a:rPr lang="en-US" sz="2800" dirty="0" smtClean="0">
+              <a:rPr lang="en-US" sz="2800" dirty="0">
                 <a:solidFill>
                   <a:schemeClr val="tx1"/>
                 </a:solidFill>
@@ -10482,20 +10642,12 @@
           </a:p>
           <a:p>
             <a:r>
-              <a:rPr lang="en-US" sz="2800" dirty="0" smtClean="0">
+              <a:rPr lang="en-US" sz="2800" dirty="0">
                 <a:solidFill>
                   <a:schemeClr val="tx1"/>
                 </a:solidFill>
               </a:rPr>
-              <a:t>. </a:t>
-            </a:r>
-            <a:r>
-              <a:rPr lang="en-US" sz="2800" dirty="0">
-                <a:solidFill>
-                  <a:schemeClr val="tx1"/>
-                </a:solidFill>
-              </a:rPr>
-              <a:t>/</a:t>
+              <a:t>source /</a:t>
             </a:r>
             <a:r>
               <a:rPr lang="en-US" sz="2800" dirty="0" err="1">
@@ -10536,6 +10688,2803 @@
     <p:extLst>
       <p:ext uri="{BB962C8B-B14F-4D97-AF65-F5344CB8AC3E}">
         <p14:creationId xmlns:p14="http://schemas.microsoft.com/office/powerpoint/2010/main" val="171580292"/>
+      </p:ext>
+    </p:extLst>
+  </p:cSld>
+  <p:clrMapOvr>
+    <a:masterClrMapping/>
+  </p:clrMapOvr>
+</p:sld>
+</file>
+
+<file path=ppt/slides/slide4.xml><?xml version="1.0" encoding="utf-8"?>
+<p:sld xmlns:a="http://schemas.openxmlformats.org/drawingml/2006/main" xmlns:r="http://schemas.openxmlformats.org/officeDocument/2006/relationships" xmlns:p="http://schemas.openxmlformats.org/presentationml/2006/main">
+  <p:cSld>
+    <p:spTree>
+      <p:nvGrpSpPr>
+        <p:cNvPr id="1" name=""/>
+        <p:cNvGrpSpPr/>
+        <p:nvPr/>
+      </p:nvGrpSpPr>
+      <p:grpSpPr>
+        <a:xfrm>
+          <a:off x="0" y="0"/>
+          <a:ext cx="0" cy="0"/>
+          <a:chOff x="0" y="0"/>
+          <a:chExt cx="0" cy="0"/>
+        </a:xfrm>
+      </p:grpSpPr>
+      <p:pic>
+        <p:nvPicPr>
+          <p:cNvPr id="6" name="Picture 5">
+            <a:extLst>
+              <a:ext uri="{FF2B5EF4-FFF2-40B4-BE49-F238E27FC236}">
+                <a16:creationId xmlns:a16="http://schemas.microsoft.com/office/drawing/2014/main" id="{85DD4E90-BFD8-8C4B-AE28-0B0A2B0E6221}"/>
+              </a:ext>
+            </a:extLst>
+          </p:cNvPr>
+          <p:cNvPicPr>
+            <a:picLocks noChangeAspect="1"/>
+          </p:cNvPicPr>
+          <p:nvPr/>
+        </p:nvPicPr>
+        <p:blipFill>
+          <a:blip r:embed="rId2"/>
+          <a:stretch>
+            <a:fillRect/>
+          </a:stretch>
+        </p:blipFill>
+        <p:spPr>
+          <a:xfrm>
+            <a:off x="1281094" y="3388311"/>
+            <a:ext cx="3162840" cy="3112099"/>
+          </a:xfrm>
+          <a:prstGeom prst="rect">
+            <a:avLst/>
+          </a:prstGeom>
+        </p:spPr>
+      </p:pic>
+      <p:sp>
+        <p:nvSpPr>
+          <p:cNvPr id="2" name="Title 1">
+            <a:extLst>
+              <a:ext uri="{FF2B5EF4-FFF2-40B4-BE49-F238E27FC236}">
+                <a16:creationId xmlns:a16="http://schemas.microsoft.com/office/drawing/2014/main" id="{3231CCAE-EDAD-ED44-A117-17551DAB9099}"/>
+              </a:ext>
+            </a:extLst>
+          </p:cNvPr>
+          <p:cNvSpPr>
+            <a:spLocks noGrp="1"/>
+          </p:cNvSpPr>
+          <p:nvPr>
+            <p:ph type="title"/>
+          </p:nvPr>
+        </p:nvSpPr>
+        <p:spPr/>
+        <p:txBody>
+          <a:bodyPr/>
+          <a:lstStyle/>
+          <a:p>
+            <a:r>
+              <a:rPr lang="en-US" dirty="0"/>
+              <a:t>NYC Taxi Ride Tables</a:t>
+            </a:r>
+          </a:p>
+        </p:txBody>
+      </p:sp>
+      <p:sp>
+        <p:nvSpPr>
+          <p:cNvPr id="4" name="Slide Number Placeholder 3">
+            <a:extLst>
+              <a:ext uri="{FF2B5EF4-FFF2-40B4-BE49-F238E27FC236}">
+                <a16:creationId xmlns:a16="http://schemas.microsoft.com/office/drawing/2014/main" id="{5BE68C99-AA75-AF44-A030-479B977B13EA}"/>
+              </a:ext>
+            </a:extLst>
+          </p:cNvPr>
+          <p:cNvSpPr>
+            <a:spLocks noGrp="1"/>
+          </p:cNvSpPr>
+          <p:nvPr>
+            <p:ph type="sldNum" idx="12"/>
+          </p:nvPr>
+        </p:nvSpPr>
+        <p:spPr/>
+        <p:txBody>
+          <a:bodyPr/>
+          <a:lstStyle/>
+          <a:p>
+            <a:pPr marL="0" lvl="0" indent="0" algn="r" rtl="0">
+              <a:spcBef>
+                <a:spcPts val="0"/>
+              </a:spcBef>
+              <a:spcAft>
+                <a:spcPts val="0"/>
+              </a:spcAft>
+              <a:buNone/>
+            </a:pPr>
+            <a:fld id="{00000000-1234-1234-1234-123412341234}" type="slidenum">
+              <a:rPr lang="en-US" smtClean="0"/>
+              <a:t>4</a:t>
+            </a:fld>
+            <a:endParaRPr lang="en-US"/>
+          </a:p>
+        </p:txBody>
+      </p:sp>
+      <p:pic>
+        <p:nvPicPr>
+          <p:cNvPr id="8" name="Picture 7">
+            <a:extLst>
+              <a:ext uri="{FF2B5EF4-FFF2-40B4-BE49-F238E27FC236}">
+                <a16:creationId xmlns:a16="http://schemas.microsoft.com/office/drawing/2014/main" id="{5B356315-19FB-7F4C-BEB6-68FEC4EAAF53}"/>
+              </a:ext>
+            </a:extLst>
+          </p:cNvPr>
+          <p:cNvPicPr>
+            <a:picLocks noChangeAspect="1"/>
+          </p:cNvPicPr>
+          <p:nvPr/>
+        </p:nvPicPr>
+        <p:blipFill>
+          <a:blip r:embed="rId3"/>
+          <a:stretch>
+            <a:fillRect/>
+          </a:stretch>
+        </p:blipFill>
+        <p:spPr>
+          <a:xfrm>
+            <a:off x="4833841" y="3388311"/>
+            <a:ext cx="3029916" cy="2428807"/>
+          </a:xfrm>
+          <a:prstGeom prst="rect">
+            <a:avLst/>
+          </a:prstGeom>
+        </p:spPr>
+      </p:pic>
+      <p:pic>
+        <p:nvPicPr>
+          <p:cNvPr id="10" name="Picture 9">
+            <a:extLst>
+              <a:ext uri="{FF2B5EF4-FFF2-40B4-BE49-F238E27FC236}">
+                <a16:creationId xmlns:a16="http://schemas.microsoft.com/office/drawing/2014/main" id="{40434ABE-A508-5146-9CA6-0FB21568C3DA}"/>
+              </a:ext>
+            </a:extLst>
+          </p:cNvPr>
+          <p:cNvPicPr>
+            <a:picLocks noChangeAspect="1"/>
+          </p:cNvPicPr>
+          <p:nvPr/>
+        </p:nvPicPr>
+        <p:blipFill>
+          <a:blip r:embed="rId4"/>
+          <a:stretch>
+            <a:fillRect/>
+          </a:stretch>
+        </p:blipFill>
+        <p:spPr>
+          <a:xfrm>
+            <a:off x="206326" y="927983"/>
+            <a:ext cx="8937674" cy="2460328"/>
+          </a:xfrm>
+          <a:prstGeom prst="rect">
+            <a:avLst/>
+          </a:prstGeom>
+        </p:spPr>
+      </p:pic>
+    </p:spTree>
+    <p:extLst>
+      <p:ext uri="{BB962C8B-B14F-4D97-AF65-F5344CB8AC3E}">
+        <p14:creationId xmlns:p14="http://schemas.microsoft.com/office/powerpoint/2010/main" val="2593046193"/>
+      </p:ext>
+    </p:extLst>
+  </p:cSld>
+  <p:clrMapOvr>
+    <a:masterClrMapping/>
+  </p:clrMapOvr>
+</p:sld>
+</file>
+
+<file path=ppt/slides/slide5.xml><?xml version="1.0" encoding="utf-8"?>
+<p:sld xmlns:a="http://schemas.openxmlformats.org/drawingml/2006/main" xmlns:r="http://schemas.openxmlformats.org/officeDocument/2006/relationships" xmlns:p="http://schemas.openxmlformats.org/presentationml/2006/main">
+  <p:cSld>
+    <p:spTree>
+      <p:nvGrpSpPr>
+        <p:cNvPr id="1" name=""/>
+        <p:cNvGrpSpPr/>
+        <p:nvPr/>
+      </p:nvGrpSpPr>
+      <p:grpSpPr>
+        <a:xfrm>
+          <a:off x="0" y="0"/>
+          <a:ext cx="0" cy="0"/>
+          <a:chOff x="0" y="0"/>
+          <a:chExt cx="0" cy="0"/>
+        </a:xfrm>
+      </p:grpSpPr>
+      <p:pic>
+        <p:nvPicPr>
+          <p:cNvPr id="6" name="Picture 5">
+            <a:extLst>
+              <a:ext uri="{FF2B5EF4-FFF2-40B4-BE49-F238E27FC236}">
+                <a16:creationId xmlns:a16="http://schemas.microsoft.com/office/drawing/2014/main" id="{E38C544A-1EC7-8949-A94D-DD54E4002389}"/>
+              </a:ext>
+            </a:extLst>
+          </p:cNvPr>
+          <p:cNvPicPr>
+            <a:picLocks noChangeAspect="1"/>
+          </p:cNvPicPr>
+          <p:nvPr/>
+        </p:nvPicPr>
+        <p:blipFill>
+          <a:blip r:embed="rId2"/>
+          <a:stretch>
+            <a:fillRect/>
+          </a:stretch>
+        </p:blipFill>
+        <p:spPr>
+          <a:xfrm>
+            <a:off x="2281954" y="1272256"/>
+            <a:ext cx="4984694" cy="4571217"/>
+          </a:xfrm>
+          <a:prstGeom prst="rect">
+            <a:avLst/>
+          </a:prstGeom>
+        </p:spPr>
+      </p:pic>
+      <p:sp>
+        <p:nvSpPr>
+          <p:cNvPr id="2" name="Title 1">
+            <a:extLst>
+              <a:ext uri="{FF2B5EF4-FFF2-40B4-BE49-F238E27FC236}">
+                <a16:creationId xmlns:a16="http://schemas.microsoft.com/office/drawing/2014/main" id="{0AC27225-756B-C544-B2F6-7B300A50B66A}"/>
+              </a:ext>
+            </a:extLst>
+          </p:cNvPr>
+          <p:cNvSpPr>
+            <a:spLocks noGrp="1"/>
+          </p:cNvSpPr>
+          <p:nvPr>
+            <p:ph type="title"/>
+          </p:nvPr>
+        </p:nvSpPr>
+        <p:spPr/>
+        <p:txBody>
+          <a:bodyPr/>
+          <a:lstStyle/>
+          <a:p>
+            <a:r>
+              <a:rPr lang="en-US" dirty="0"/>
+              <a:t>NYC Taxi Ride Tables</a:t>
+            </a:r>
+          </a:p>
+        </p:txBody>
+      </p:sp>
+      <p:sp>
+        <p:nvSpPr>
+          <p:cNvPr id="4" name="Slide Number Placeholder 3">
+            <a:extLst>
+              <a:ext uri="{FF2B5EF4-FFF2-40B4-BE49-F238E27FC236}">
+                <a16:creationId xmlns:a16="http://schemas.microsoft.com/office/drawing/2014/main" id="{0B48D5AE-3077-6E4D-AA83-C53143C3F52F}"/>
+              </a:ext>
+            </a:extLst>
+          </p:cNvPr>
+          <p:cNvSpPr>
+            <a:spLocks noGrp="1"/>
+          </p:cNvSpPr>
+          <p:nvPr>
+            <p:ph type="sldNum" idx="12"/>
+          </p:nvPr>
+        </p:nvSpPr>
+        <p:spPr/>
+        <p:txBody>
+          <a:bodyPr/>
+          <a:lstStyle/>
+          <a:p>
+            <a:pPr marL="0" lvl="0" indent="0" algn="r" rtl="0">
+              <a:spcBef>
+                <a:spcPts val="0"/>
+              </a:spcBef>
+              <a:spcAft>
+                <a:spcPts val="0"/>
+              </a:spcAft>
+              <a:buNone/>
+            </a:pPr>
+            <a:fld id="{00000000-1234-1234-1234-123412341234}" type="slidenum">
+              <a:rPr lang="en-US" smtClean="0"/>
+              <a:t>5</a:t>
+            </a:fld>
+            <a:endParaRPr lang="en-US"/>
+          </a:p>
+        </p:txBody>
+      </p:sp>
+      <p:grpSp>
+        <p:nvGrpSpPr>
+          <p:cNvPr id="13" name="Group 12">
+            <a:extLst>
+              <a:ext uri="{FF2B5EF4-FFF2-40B4-BE49-F238E27FC236}">
+                <a16:creationId xmlns:a16="http://schemas.microsoft.com/office/drawing/2014/main" id="{C564CCFA-E52C-A346-8C66-683A1CC68962}"/>
+              </a:ext>
+            </a:extLst>
+          </p:cNvPr>
+          <p:cNvGrpSpPr/>
+          <p:nvPr/>
+        </p:nvGrpSpPr>
+        <p:grpSpPr>
+          <a:xfrm>
+            <a:off x="4163438" y="1741251"/>
+            <a:ext cx="817124" cy="1488332"/>
+            <a:chOff x="4163438" y="1741251"/>
+            <a:chExt cx="817124" cy="1488332"/>
+          </a:xfrm>
+        </p:grpSpPr>
+        <p:cxnSp>
+          <p:nvCxnSpPr>
+            <p:cNvPr id="5" name="Straight Arrow Connector 4">
+              <a:extLst>
+                <a:ext uri="{FF2B5EF4-FFF2-40B4-BE49-F238E27FC236}">
+                  <a16:creationId xmlns:a16="http://schemas.microsoft.com/office/drawing/2014/main" id="{DAC3C724-A715-3544-974C-5E8F547A9EA6}"/>
+                </a:ext>
+              </a:extLst>
+            </p:cNvPr>
+            <p:cNvCxnSpPr/>
+            <p:nvPr/>
+          </p:nvCxnSpPr>
+          <p:spPr>
+            <a:xfrm>
+              <a:off x="4163438" y="1741251"/>
+              <a:ext cx="817124" cy="0"/>
+            </a:xfrm>
+            <a:prstGeom prst="straightConnector1">
+              <a:avLst/>
+            </a:prstGeom>
+            <a:ln w="38100">
+              <a:tailEnd type="triangle"/>
+            </a:ln>
+          </p:spPr>
+          <p:style>
+            <a:lnRef idx="1">
+              <a:schemeClr val="accent1"/>
+            </a:lnRef>
+            <a:fillRef idx="0">
+              <a:schemeClr val="accent1"/>
+            </a:fillRef>
+            <a:effectRef idx="0">
+              <a:schemeClr val="accent1"/>
+            </a:effectRef>
+            <a:fontRef idx="minor">
+              <a:schemeClr val="tx1"/>
+            </a:fontRef>
+          </p:style>
+        </p:cxnSp>
+        <p:cxnSp>
+          <p:nvCxnSpPr>
+            <p:cNvPr id="7" name="Straight Arrow Connector 6">
+              <a:extLst>
+                <a:ext uri="{FF2B5EF4-FFF2-40B4-BE49-F238E27FC236}">
+                  <a16:creationId xmlns:a16="http://schemas.microsoft.com/office/drawing/2014/main" id="{072367CF-C92D-814F-9A06-5B90E3403967}"/>
+                </a:ext>
+              </a:extLst>
+            </p:cNvPr>
+            <p:cNvCxnSpPr/>
+            <p:nvPr/>
+          </p:nvCxnSpPr>
+          <p:spPr>
+            <a:xfrm>
+              <a:off x="4163438" y="2049293"/>
+              <a:ext cx="817124" cy="0"/>
+            </a:xfrm>
+            <a:prstGeom prst="straightConnector1">
+              <a:avLst/>
+            </a:prstGeom>
+            <a:ln w="38100">
+              <a:tailEnd type="triangle"/>
+            </a:ln>
+          </p:spPr>
+          <p:style>
+            <a:lnRef idx="1">
+              <a:schemeClr val="accent1"/>
+            </a:lnRef>
+            <a:fillRef idx="0">
+              <a:schemeClr val="accent1"/>
+            </a:fillRef>
+            <a:effectRef idx="0">
+              <a:schemeClr val="accent1"/>
+            </a:effectRef>
+            <a:fontRef idx="minor">
+              <a:schemeClr val="tx1"/>
+            </a:fontRef>
+          </p:style>
+        </p:cxnSp>
+        <p:cxnSp>
+          <p:nvCxnSpPr>
+            <p:cNvPr id="8" name="Straight Arrow Connector 7">
+              <a:extLst>
+                <a:ext uri="{FF2B5EF4-FFF2-40B4-BE49-F238E27FC236}">
+                  <a16:creationId xmlns:a16="http://schemas.microsoft.com/office/drawing/2014/main" id="{1CD74A1F-9570-E64D-9208-C854091557BA}"/>
+                </a:ext>
+              </a:extLst>
+            </p:cNvPr>
+            <p:cNvCxnSpPr/>
+            <p:nvPr/>
+          </p:nvCxnSpPr>
+          <p:spPr>
+            <a:xfrm>
+              <a:off x="4163438" y="2350851"/>
+              <a:ext cx="817124" cy="0"/>
+            </a:xfrm>
+            <a:prstGeom prst="straightConnector1">
+              <a:avLst/>
+            </a:prstGeom>
+            <a:ln w="38100">
+              <a:tailEnd type="triangle"/>
+            </a:ln>
+          </p:spPr>
+          <p:style>
+            <a:lnRef idx="1">
+              <a:schemeClr val="accent1"/>
+            </a:lnRef>
+            <a:fillRef idx="0">
+              <a:schemeClr val="accent1"/>
+            </a:fillRef>
+            <a:effectRef idx="0">
+              <a:schemeClr val="accent1"/>
+            </a:effectRef>
+            <a:fontRef idx="minor">
+              <a:schemeClr val="tx1"/>
+            </a:fontRef>
+          </p:style>
+        </p:cxnSp>
+        <p:cxnSp>
+          <p:nvCxnSpPr>
+            <p:cNvPr id="10" name="Straight Arrow Connector 9">
+              <a:extLst>
+                <a:ext uri="{FF2B5EF4-FFF2-40B4-BE49-F238E27FC236}">
+                  <a16:creationId xmlns:a16="http://schemas.microsoft.com/office/drawing/2014/main" id="{6F61C4AD-A653-A147-A28A-36C85F67DFB7}"/>
+                </a:ext>
+              </a:extLst>
+            </p:cNvPr>
+            <p:cNvCxnSpPr>
+              <a:cxnSpLocks/>
+            </p:cNvCxnSpPr>
+            <p:nvPr/>
+          </p:nvCxnSpPr>
+          <p:spPr>
+            <a:xfrm>
+              <a:off x="4163438" y="2665379"/>
+              <a:ext cx="817124" cy="564204"/>
+            </a:xfrm>
+            <a:prstGeom prst="straightConnector1">
+              <a:avLst/>
+            </a:prstGeom>
+            <a:ln w="38100">
+              <a:tailEnd type="triangle"/>
+            </a:ln>
+          </p:spPr>
+          <p:style>
+            <a:lnRef idx="1">
+              <a:schemeClr val="accent1"/>
+            </a:lnRef>
+            <a:fillRef idx="0">
+              <a:schemeClr val="accent1"/>
+            </a:fillRef>
+            <a:effectRef idx="0">
+              <a:schemeClr val="accent1"/>
+            </a:effectRef>
+            <a:fontRef idx="minor">
+              <a:schemeClr val="tx1"/>
+            </a:fontRef>
+          </p:style>
+        </p:cxnSp>
+      </p:grpSp>
+    </p:spTree>
+    <p:extLst>
+      <p:ext uri="{BB962C8B-B14F-4D97-AF65-F5344CB8AC3E}">
+        <p14:creationId xmlns:p14="http://schemas.microsoft.com/office/powerpoint/2010/main" val="3439255096"/>
+      </p:ext>
+    </p:extLst>
+  </p:cSld>
+  <p:clrMapOvr>
+    <a:masterClrMapping/>
+  </p:clrMapOvr>
+  <p:timing>
+    <p:tnLst>
+      <p:par>
+        <p:cTn id="1" dur="indefinite" restart="never" nodeType="tmRoot">
+          <p:childTnLst>
+            <p:seq concurrent="1" nextAc="seek">
+              <p:cTn id="2" dur="indefinite" nodeType="mainSeq">
+                <p:childTnLst>
+                  <p:par>
+                    <p:cTn id="3" fill="hold">
+                      <p:stCondLst>
+                        <p:cond delay="indefinite"/>
+                      </p:stCondLst>
+                      <p:childTnLst>
+                        <p:par>
+                          <p:cTn id="4" fill="hold">
+                            <p:stCondLst>
+                              <p:cond delay="0"/>
+                            </p:stCondLst>
+                            <p:childTnLst>
+                              <p:par>
+                                <p:cTn id="5" presetID="1" presetClass="entr" presetSubtype="0" fill="hold" nodeType="clickEffect">
+                                  <p:stCondLst>
+                                    <p:cond delay="0"/>
+                                  </p:stCondLst>
+                                  <p:childTnLst>
+                                    <p:set>
+                                      <p:cBhvr>
+                                        <p:cTn id="6" dur="1" fill="hold">
+                                          <p:stCondLst>
+                                            <p:cond delay="0"/>
+                                          </p:stCondLst>
+                                        </p:cTn>
+                                        <p:tgtEl>
+                                          <p:spTgt spid="13"/>
+                                        </p:tgtEl>
+                                        <p:attrNameLst>
+                                          <p:attrName>style.visibility</p:attrName>
+                                        </p:attrNameLst>
+                                      </p:cBhvr>
+                                      <p:to>
+                                        <p:strVal val="visible"/>
+                                      </p:to>
+                                    </p:set>
+                                  </p:childTnLst>
+                                </p:cTn>
+                              </p:par>
+                            </p:childTnLst>
+                          </p:cTn>
+                        </p:par>
+                      </p:childTnLst>
+                    </p:cTn>
+                  </p:par>
+                </p:childTnLst>
+              </p:cTn>
+              <p:prevCondLst>
+                <p:cond evt="onPrev" delay="0">
+                  <p:tgtEl>
+                    <p:sldTgt/>
+                  </p:tgtEl>
+                </p:cond>
+              </p:prevCondLst>
+              <p:nextCondLst>
+                <p:cond evt="onNext" delay="0">
+                  <p:tgtEl>
+                    <p:sldTgt/>
+                  </p:tgtEl>
+                </p:cond>
+              </p:nextCondLst>
+            </p:seq>
+          </p:childTnLst>
+        </p:cTn>
+      </p:par>
+    </p:tnLst>
+  </p:timing>
+</p:sld>
+</file>
+
+<file path=ppt/slides/slide6.xml><?xml version="1.0" encoding="utf-8"?>
+<p:sld xmlns:a="http://schemas.openxmlformats.org/drawingml/2006/main" xmlns:r="http://schemas.openxmlformats.org/officeDocument/2006/relationships" xmlns:p="http://schemas.openxmlformats.org/presentationml/2006/main">
+  <p:cSld>
+    <p:spTree>
+      <p:nvGrpSpPr>
+        <p:cNvPr id="1" name=""/>
+        <p:cNvGrpSpPr/>
+        <p:nvPr/>
+      </p:nvGrpSpPr>
+      <p:grpSpPr>
+        <a:xfrm>
+          <a:off x="0" y="0"/>
+          <a:ext cx="0" cy="0"/>
+          <a:chOff x="0" y="0"/>
+          <a:chExt cx="0" cy="0"/>
+        </a:xfrm>
+      </p:grpSpPr>
+      <p:pic>
+        <p:nvPicPr>
+          <p:cNvPr id="10" name="Picture 9">
+            <a:extLst>
+              <a:ext uri="{FF2B5EF4-FFF2-40B4-BE49-F238E27FC236}">
+                <a16:creationId xmlns:a16="http://schemas.microsoft.com/office/drawing/2014/main" id="{B59421FA-5E1C-AB4E-BDFB-A61CCA455BC8}"/>
+              </a:ext>
+            </a:extLst>
+          </p:cNvPr>
+          <p:cNvPicPr>
+            <a:picLocks noChangeAspect="1"/>
+          </p:cNvPicPr>
+          <p:nvPr/>
+        </p:nvPicPr>
+        <p:blipFill>
+          <a:blip r:embed="rId2"/>
+          <a:stretch>
+            <a:fillRect/>
+          </a:stretch>
+        </p:blipFill>
+        <p:spPr>
+          <a:xfrm>
+            <a:off x="788975" y="1310346"/>
+            <a:ext cx="7756214" cy="4660112"/>
+          </a:xfrm>
+          <a:prstGeom prst="rect">
+            <a:avLst/>
+          </a:prstGeom>
+        </p:spPr>
+      </p:pic>
+      <p:sp>
+        <p:nvSpPr>
+          <p:cNvPr id="2" name="Title 1">
+            <a:extLst>
+              <a:ext uri="{FF2B5EF4-FFF2-40B4-BE49-F238E27FC236}">
+                <a16:creationId xmlns:a16="http://schemas.microsoft.com/office/drawing/2014/main" id="{3231CCAE-EDAD-ED44-A117-17551DAB9099}"/>
+              </a:ext>
+            </a:extLst>
+          </p:cNvPr>
+          <p:cNvSpPr>
+            <a:spLocks noGrp="1"/>
+          </p:cNvSpPr>
+          <p:nvPr>
+            <p:ph type="title"/>
+          </p:nvPr>
+        </p:nvSpPr>
+        <p:spPr/>
+        <p:txBody>
+          <a:bodyPr/>
+          <a:lstStyle/>
+          <a:p>
+            <a:r>
+              <a:rPr lang="en-US" dirty="0"/>
+              <a:t>Anatomy of a Select Query</a:t>
+            </a:r>
+          </a:p>
+        </p:txBody>
+      </p:sp>
+      <p:sp>
+        <p:nvSpPr>
+          <p:cNvPr id="4" name="Slide Number Placeholder 3">
+            <a:extLst>
+              <a:ext uri="{FF2B5EF4-FFF2-40B4-BE49-F238E27FC236}">
+                <a16:creationId xmlns:a16="http://schemas.microsoft.com/office/drawing/2014/main" id="{5BE68C99-AA75-AF44-A030-479B977B13EA}"/>
+              </a:ext>
+            </a:extLst>
+          </p:cNvPr>
+          <p:cNvSpPr>
+            <a:spLocks noGrp="1"/>
+          </p:cNvSpPr>
+          <p:nvPr>
+            <p:ph type="sldNum" idx="12"/>
+          </p:nvPr>
+        </p:nvSpPr>
+        <p:spPr/>
+        <p:txBody>
+          <a:bodyPr/>
+          <a:lstStyle/>
+          <a:p>
+            <a:pPr marL="0" lvl="0" indent="0" algn="r" rtl="0">
+              <a:spcBef>
+                <a:spcPts val="0"/>
+              </a:spcBef>
+              <a:spcAft>
+                <a:spcPts val="0"/>
+              </a:spcAft>
+              <a:buNone/>
+            </a:pPr>
+            <a:fld id="{00000000-1234-1234-1234-123412341234}" type="slidenum">
+              <a:rPr lang="en-US" smtClean="0"/>
+              <a:t>6</a:t>
+            </a:fld>
+            <a:endParaRPr lang="en-US"/>
+          </a:p>
+        </p:txBody>
+      </p:sp>
+      <p:sp>
+        <p:nvSpPr>
+          <p:cNvPr id="6" name="Rectangle 5">
+            <a:extLst>
+              <a:ext uri="{FF2B5EF4-FFF2-40B4-BE49-F238E27FC236}">
+                <a16:creationId xmlns:a16="http://schemas.microsoft.com/office/drawing/2014/main" id="{A9CD5B1F-5041-5C4E-AD7B-06D88C15B1F0}"/>
+              </a:ext>
+            </a:extLst>
+          </p:cNvPr>
+          <p:cNvSpPr/>
+          <p:nvPr/>
+        </p:nvSpPr>
+        <p:spPr>
+          <a:xfrm>
+            <a:off x="1177392" y="3590278"/>
+            <a:ext cx="671638" cy="234669"/>
+          </a:xfrm>
+          <a:prstGeom prst="rect">
+            <a:avLst/>
+          </a:prstGeom>
+          <a:noFill/>
+          <a:ln>
+            <a:solidFill>
+              <a:srgbClr val="C00000"/>
+            </a:solidFill>
+          </a:ln>
+        </p:spPr>
+        <p:style>
+          <a:lnRef idx="2">
+            <a:schemeClr val="accent1">
+              <a:shade val="50000"/>
+            </a:schemeClr>
+          </a:lnRef>
+          <a:fillRef idx="1">
+            <a:schemeClr val="accent1"/>
+          </a:fillRef>
+          <a:effectRef idx="0">
+            <a:schemeClr val="accent1"/>
+          </a:effectRef>
+          <a:fontRef idx="minor">
+            <a:schemeClr val="lt1"/>
+          </a:fontRef>
+        </p:style>
+        <p:txBody>
+          <a:bodyPr rtlCol="0" anchor="ctr"/>
+          <a:lstStyle/>
+          <a:p>
+            <a:pPr algn="ctr"/>
+            <a:endParaRPr lang="en-US"/>
+          </a:p>
+        </p:txBody>
+      </p:sp>
+      <p:sp>
+        <p:nvSpPr>
+          <p:cNvPr id="7" name="Rectangle 6">
+            <a:extLst>
+              <a:ext uri="{FF2B5EF4-FFF2-40B4-BE49-F238E27FC236}">
+                <a16:creationId xmlns:a16="http://schemas.microsoft.com/office/drawing/2014/main" id="{A49705B6-025E-2342-B461-9026CAFFA5C1}"/>
+              </a:ext>
+            </a:extLst>
+          </p:cNvPr>
+          <p:cNvSpPr/>
+          <p:nvPr/>
+        </p:nvSpPr>
+        <p:spPr>
+          <a:xfrm>
+            <a:off x="1177392" y="1341481"/>
+            <a:ext cx="813248" cy="234669"/>
+          </a:xfrm>
+          <a:prstGeom prst="rect">
+            <a:avLst/>
+          </a:prstGeom>
+          <a:noFill/>
+          <a:ln>
+            <a:solidFill>
+              <a:srgbClr val="C00000"/>
+            </a:solidFill>
+          </a:ln>
+        </p:spPr>
+        <p:style>
+          <a:lnRef idx="2">
+            <a:schemeClr val="accent1">
+              <a:shade val="50000"/>
+            </a:schemeClr>
+          </a:lnRef>
+          <a:fillRef idx="1">
+            <a:schemeClr val="accent1"/>
+          </a:fillRef>
+          <a:effectRef idx="0">
+            <a:schemeClr val="accent1"/>
+          </a:effectRef>
+          <a:fontRef idx="minor">
+            <a:schemeClr val="lt1"/>
+          </a:fontRef>
+        </p:style>
+        <p:txBody>
+          <a:bodyPr rtlCol="0" anchor="ctr"/>
+          <a:lstStyle/>
+          <a:p>
+            <a:pPr algn="ctr"/>
+            <a:endParaRPr lang="en-US"/>
+          </a:p>
+        </p:txBody>
+      </p:sp>
+      <p:sp>
+        <p:nvSpPr>
+          <p:cNvPr id="8" name="Rectangle 7">
+            <a:extLst>
+              <a:ext uri="{FF2B5EF4-FFF2-40B4-BE49-F238E27FC236}">
+                <a16:creationId xmlns:a16="http://schemas.microsoft.com/office/drawing/2014/main" id="{92354EC8-4D28-C143-9D00-CCAB4482F085}"/>
+              </a:ext>
+            </a:extLst>
+          </p:cNvPr>
+          <p:cNvSpPr/>
+          <p:nvPr/>
+        </p:nvSpPr>
+        <p:spPr>
+          <a:xfrm>
+            <a:off x="1654821" y="4048828"/>
+            <a:ext cx="1274495" cy="234669"/>
+          </a:xfrm>
+          <a:prstGeom prst="rect">
+            <a:avLst/>
+          </a:prstGeom>
+          <a:noFill/>
+          <a:ln>
+            <a:solidFill>
+              <a:srgbClr val="C00000"/>
+            </a:solidFill>
+          </a:ln>
+        </p:spPr>
+        <p:style>
+          <a:lnRef idx="2">
+            <a:schemeClr val="accent1">
+              <a:shade val="50000"/>
+            </a:schemeClr>
+          </a:lnRef>
+          <a:fillRef idx="1">
+            <a:schemeClr val="accent1"/>
+          </a:fillRef>
+          <a:effectRef idx="0">
+            <a:schemeClr val="accent1"/>
+          </a:effectRef>
+          <a:fontRef idx="minor">
+            <a:schemeClr val="lt1"/>
+          </a:fontRef>
+        </p:style>
+        <p:txBody>
+          <a:bodyPr rtlCol="0" anchor="ctr"/>
+          <a:lstStyle/>
+          <a:p>
+            <a:pPr algn="ctr"/>
+            <a:endParaRPr lang="en-US"/>
+          </a:p>
+        </p:txBody>
+      </p:sp>
+      <p:sp>
+        <p:nvSpPr>
+          <p:cNvPr id="11" name="Rectangle 10">
+            <a:extLst>
+              <a:ext uri="{FF2B5EF4-FFF2-40B4-BE49-F238E27FC236}">
+                <a16:creationId xmlns:a16="http://schemas.microsoft.com/office/drawing/2014/main" id="{63361A69-5FC2-0741-9491-A56EA7A6126A}"/>
+              </a:ext>
+            </a:extLst>
+          </p:cNvPr>
+          <p:cNvSpPr/>
+          <p:nvPr/>
+        </p:nvSpPr>
+        <p:spPr>
+          <a:xfrm>
+            <a:off x="1177392" y="4916584"/>
+            <a:ext cx="671638" cy="234669"/>
+          </a:xfrm>
+          <a:prstGeom prst="rect">
+            <a:avLst/>
+          </a:prstGeom>
+          <a:noFill/>
+          <a:ln>
+            <a:solidFill>
+              <a:srgbClr val="C00000"/>
+            </a:solidFill>
+          </a:ln>
+        </p:spPr>
+        <p:style>
+          <a:lnRef idx="2">
+            <a:schemeClr val="accent1">
+              <a:shade val="50000"/>
+            </a:schemeClr>
+          </a:lnRef>
+          <a:fillRef idx="1">
+            <a:schemeClr val="accent1"/>
+          </a:fillRef>
+          <a:effectRef idx="0">
+            <a:schemeClr val="accent1"/>
+          </a:effectRef>
+          <a:fontRef idx="minor">
+            <a:schemeClr val="lt1"/>
+          </a:fontRef>
+        </p:style>
+        <p:txBody>
+          <a:bodyPr rtlCol="0" anchor="ctr"/>
+          <a:lstStyle/>
+          <a:p>
+            <a:pPr algn="ctr"/>
+            <a:endParaRPr lang="en-US"/>
+          </a:p>
+        </p:txBody>
+      </p:sp>
+      <p:sp>
+        <p:nvSpPr>
+          <p:cNvPr id="12" name="Rectangle 11">
+            <a:extLst>
+              <a:ext uri="{FF2B5EF4-FFF2-40B4-BE49-F238E27FC236}">
+                <a16:creationId xmlns:a16="http://schemas.microsoft.com/office/drawing/2014/main" id="{C162E5CC-2CB5-8F43-96A6-57379BE9D932}"/>
+              </a:ext>
+            </a:extLst>
+          </p:cNvPr>
+          <p:cNvSpPr/>
+          <p:nvPr/>
+        </p:nvSpPr>
+        <p:spPr>
+          <a:xfrm>
+            <a:off x="1177393" y="5375134"/>
+            <a:ext cx="1031734" cy="234669"/>
+          </a:xfrm>
+          <a:prstGeom prst="rect">
+            <a:avLst/>
+          </a:prstGeom>
+          <a:noFill/>
+          <a:ln>
+            <a:solidFill>
+              <a:srgbClr val="C00000"/>
+            </a:solidFill>
+          </a:ln>
+        </p:spPr>
+        <p:style>
+          <a:lnRef idx="2">
+            <a:schemeClr val="accent1">
+              <a:shade val="50000"/>
+            </a:schemeClr>
+          </a:lnRef>
+          <a:fillRef idx="1">
+            <a:schemeClr val="accent1"/>
+          </a:fillRef>
+          <a:effectRef idx="0">
+            <a:schemeClr val="accent1"/>
+          </a:effectRef>
+          <a:fontRef idx="minor">
+            <a:schemeClr val="lt1"/>
+          </a:fontRef>
+        </p:style>
+        <p:txBody>
+          <a:bodyPr rtlCol="0" anchor="ctr"/>
+          <a:lstStyle/>
+          <a:p>
+            <a:pPr algn="ctr"/>
+            <a:endParaRPr lang="en-US"/>
+          </a:p>
+        </p:txBody>
+      </p:sp>
+    </p:spTree>
+    <p:extLst>
+      <p:ext uri="{BB962C8B-B14F-4D97-AF65-F5344CB8AC3E}">
+        <p14:creationId xmlns:p14="http://schemas.microsoft.com/office/powerpoint/2010/main" val="182500847"/>
+      </p:ext>
+    </p:extLst>
+  </p:cSld>
+  <p:clrMapOvr>
+    <a:masterClrMapping/>
+  </p:clrMapOvr>
+  <p:timing>
+    <p:tnLst>
+      <p:par>
+        <p:cTn id="1" dur="indefinite" restart="never" nodeType="tmRoot">
+          <p:childTnLst>
+            <p:seq concurrent="1" nextAc="seek">
+              <p:cTn id="2" dur="indefinite" nodeType="mainSeq">
+                <p:childTnLst>
+                  <p:par>
+                    <p:cTn id="3" fill="hold">
+                      <p:stCondLst>
+                        <p:cond delay="indefinite"/>
+                      </p:stCondLst>
+                      <p:childTnLst>
+                        <p:par>
+                          <p:cTn id="4" fill="hold">
+                            <p:stCondLst>
+                              <p:cond delay="0"/>
+                            </p:stCondLst>
+                            <p:childTnLst>
+                              <p:par>
+                                <p:cTn id="5" presetID="1" presetClass="entr" presetSubtype="0" fill="hold" grpId="0" nodeType="clickEffect">
+                                  <p:stCondLst>
+                                    <p:cond delay="0"/>
+                                  </p:stCondLst>
+                                  <p:childTnLst>
+                                    <p:set>
+                                      <p:cBhvr>
+                                        <p:cTn id="6" dur="1" fill="hold">
+                                          <p:stCondLst>
+                                            <p:cond delay="0"/>
+                                          </p:stCondLst>
+                                        </p:cTn>
+                                        <p:tgtEl>
+                                          <p:spTgt spid="7"/>
+                                        </p:tgtEl>
+                                        <p:attrNameLst>
+                                          <p:attrName>style.visibility</p:attrName>
+                                        </p:attrNameLst>
+                                      </p:cBhvr>
+                                      <p:to>
+                                        <p:strVal val="visible"/>
+                                      </p:to>
+                                    </p:set>
+                                  </p:childTnLst>
+                                </p:cTn>
+                              </p:par>
+                            </p:childTnLst>
+                          </p:cTn>
+                        </p:par>
+                      </p:childTnLst>
+                    </p:cTn>
+                  </p:par>
+                  <p:par>
+                    <p:cTn id="7" fill="hold">
+                      <p:stCondLst>
+                        <p:cond delay="indefinite"/>
+                      </p:stCondLst>
+                      <p:childTnLst>
+                        <p:par>
+                          <p:cTn id="8" fill="hold">
+                            <p:stCondLst>
+                              <p:cond delay="0"/>
+                            </p:stCondLst>
+                            <p:childTnLst>
+                              <p:par>
+                                <p:cTn id="9" presetID="1" presetClass="entr" presetSubtype="0" fill="hold" grpId="0" nodeType="clickEffect">
+                                  <p:stCondLst>
+                                    <p:cond delay="0"/>
+                                  </p:stCondLst>
+                                  <p:childTnLst>
+                                    <p:set>
+                                      <p:cBhvr>
+                                        <p:cTn id="10" dur="1" fill="hold">
+                                          <p:stCondLst>
+                                            <p:cond delay="0"/>
+                                          </p:stCondLst>
+                                        </p:cTn>
+                                        <p:tgtEl>
+                                          <p:spTgt spid="6"/>
+                                        </p:tgtEl>
+                                        <p:attrNameLst>
+                                          <p:attrName>style.visibility</p:attrName>
+                                        </p:attrNameLst>
+                                      </p:cBhvr>
+                                      <p:to>
+                                        <p:strVal val="visible"/>
+                                      </p:to>
+                                    </p:set>
+                                  </p:childTnLst>
+                                </p:cTn>
+                              </p:par>
+                            </p:childTnLst>
+                          </p:cTn>
+                        </p:par>
+                      </p:childTnLst>
+                    </p:cTn>
+                  </p:par>
+                  <p:par>
+                    <p:cTn id="11" fill="hold">
+                      <p:stCondLst>
+                        <p:cond delay="indefinite"/>
+                      </p:stCondLst>
+                      <p:childTnLst>
+                        <p:par>
+                          <p:cTn id="12" fill="hold">
+                            <p:stCondLst>
+                              <p:cond delay="0"/>
+                            </p:stCondLst>
+                            <p:childTnLst>
+                              <p:par>
+                                <p:cTn id="13" presetID="1" presetClass="entr" presetSubtype="0" fill="hold" grpId="0" nodeType="clickEffect">
+                                  <p:stCondLst>
+                                    <p:cond delay="0"/>
+                                  </p:stCondLst>
+                                  <p:childTnLst>
+                                    <p:set>
+                                      <p:cBhvr>
+                                        <p:cTn id="14" dur="1" fill="hold">
+                                          <p:stCondLst>
+                                            <p:cond delay="0"/>
+                                          </p:stCondLst>
+                                        </p:cTn>
+                                        <p:tgtEl>
+                                          <p:spTgt spid="8"/>
+                                        </p:tgtEl>
+                                        <p:attrNameLst>
+                                          <p:attrName>style.visibility</p:attrName>
+                                        </p:attrNameLst>
+                                      </p:cBhvr>
+                                      <p:to>
+                                        <p:strVal val="visible"/>
+                                      </p:to>
+                                    </p:set>
+                                  </p:childTnLst>
+                                </p:cTn>
+                              </p:par>
+                            </p:childTnLst>
+                          </p:cTn>
+                        </p:par>
+                      </p:childTnLst>
+                    </p:cTn>
+                  </p:par>
+                  <p:par>
+                    <p:cTn id="15" fill="hold">
+                      <p:stCondLst>
+                        <p:cond delay="indefinite"/>
+                      </p:stCondLst>
+                      <p:childTnLst>
+                        <p:par>
+                          <p:cTn id="16" fill="hold">
+                            <p:stCondLst>
+                              <p:cond delay="0"/>
+                            </p:stCondLst>
+                            <p:childTnLst>
+                              <p:par>
+                                <p:cTn id="17" presetID="1" presetClass="entr" presetSubtype="0" fill="hold" grpId="0" nodeType="clickEffect">
+                                  <p:stCondLst>
+                                    <p:cond delay="0"/>
+                                  </p:stCondLst>
+                                  <p:childTnLst>
+                                    <p:set>
+                                      <p:cBhvr>
+                                        <p:cTn id="18" dur="1" fill="hold">
+                                          <p:stCondLst>
+                                            <p:cond delay="0"/>
+                                          </p:stCondLst>
+                                        </p:cTn>
+                                        <p:tgtEl>
+                                          <p:spTgt spid="11"/>
+                                        </p:tgtEl>
+                                        <p:attrNameLst>
+                                          <p:attrName>style.visibility</p:attrName>
+                                        </p:attrNameLst>
+                                      </p:cBhvr>
+                                      <p:to>
+                                        <p:strVal val="visible"/>
+                                      </p:to>
+                                    </p:set>
+                                  </p:childTnLst>
+                                </p:cTn>
+                              </p:par>
+                            </p:childTnLst>
+                          </p:cTn>
+                        </p:par>
+                      </p:childTnLst>
+                    </p:cTn>
+                  </p:par>
+                  <p:par>
+                    <p:cTn id="19" fill="hold">
+                      <p:stCondLst>
+                        <p:cond delay="indefinite"/>
+                      </p:stCondLst>
+                      <p:childTnLst>
+                        <p:par>
+                          <p:cTn id="20" fill="hold">
+                            <p:stCondLst>
+                              <p:cond delay="0"/>
+                            </p:stCondLst>
+                            <p:childTnLst>
+                              <p:par>
+                                <p:cTn id="21" presetID="1" presetClass="entr" presetSubtype="0" fill="hold" grpId="0" nodeType="clickEffect">
+                                  <p:stCondLst>
+                                    <p:cond delay="0"/>
+                                  </p:stCondLst>
+                                  <p:childTnLst>
+                                    <p:set>
+                                      <p:cBhvr>
+                                        <p:cTn id="22" dur="1" fill="hold">
+                                          <p:stCondLst>
+                                            <p:cond delay="0"/>
+                                          </p:stCondLst>
+                                        </p:cTn>
+                                        <p:tgtEl>
+                                          <p:spTgt spid="12"/>
+                                        </p:tgtEl>
+                                        <p:attrNameLst>
+                                          <p:attrName>style.visibility</p:attrName>
+                                        </p:attrNameLst>
+                                      </p:cBhvr>
+                                      <p:to>
+                                        <p:strVal val="visible"/>
+                                      </p:to>
+                                    </p:set>
+                                  </p:childTnLst>
+                                </p:cTn>
+                              </p:par>
+                            </p:childTnLst>
+                          </p:cTn>
+                        </p:par>
+                      </p:childTnLst>
+                    </p:cTn>
+                  </p:par>
+                </p:childTnLst>
+              </p:cTn>
+              <p:prevCondLst>
+                <p:cond evt="onPrev" delay="0">
+                  <p:tgtEl>
+                    <p:sldTgt/>
+                  </p:tgtEl>
+                </p:cond>
+              </p:prevCondLst>
+              <p:nextCondLst>
+                <p:cond evt="onNext" delay="0">
+                  <p:tgtEl>
+                    <p:sldTgt/>
+                  </p:tgtEl>
+                </p:cond>
+              </p:nextCondLst>
+            </p:seq>
+          </p:childTnLst>
+        </p:cTn>
+      </p:par>
+    </p:tnLst>
+    <p:bldLst>
+      <p:bldP spid="6" grpId="0" animBg="1"/>
+      <p:bldP spid="7" grpId="0" animBg="1"/>
+      <p:bldP spid="8" grpId="0" animBg="1"/>
+      <p:bldP spid="11" grpId="0" animBg="1"/>
+      <p:bldP spid="12" grpId="0" animBg="1"/>
+    </p:bldLst>
+  </p:timing>
+</p:sld>
+</file>
+
+<file path=ppt/slides/slide7.xml><?xml version="1.0" encoding="utf-8"?>
+<p:sld xmlns:a="http://schemas.openxmlformats.org/drawingml/2006/main" xmlns:r="http://schemas.openxmlformats.org/officeDocument/2006/relationships" xmlns:p="http://schemas.openxmlformats.org/presentationml/2006/main">
+  <p:cSld>
+    <p:spTree>
+      <p:nvGrpSpPr>
+        <p:cNvPr id="1" name=""/>
+        <p:cNvGrpSpPr/>
+        <p:nvPr/>
+      </p:nvGrpSpPr>
+      <p:grpSpPr>
+        <a:xfrm>
+          <a:off x="0" y="0"/>
+          <a:ext cx="0" cy="0"/>
+          <a:chOff x="0" y="0"/>
+          <a:chExt cx="0" cy="0"/>
+        </a:xfrm>
+      </p:grpSpPr>
+      <p:sp>
+        <p:nvSpPr>
+          <p:cNvPr id="2" name="Title 1">
+            <a:extLst>
+              <a:ext uri="{FF2B5EF4-FFF2-40B4-BE49-F238E27FC236}">
+                <a16:creationId xmlns:a16="http://schemas.microsoft.com/office/drawing/2014/main" id="{C180F631-E2AB-5540-A5F8-E73E6941606E}"/>
+              </a:ext>
+            </a:extLst>
+          </p:cNvPr>
+          <p:cNvSpPr>
+            <a:spLocks noGrp="1"/>
+          </p:cNvSpPr>
+          <p:nvPr>
+            <p:ph type="title"/>
+          </p:nvPr>
+        </p:nvSpPr>
+        <p:spPr/>
+        <p:txBody>
+          <a:bodyPr/>
+          <a:lstStyle/>
+          <a:p>
+            <a:r>
+              <a:rPr lang="en-US" dirty="0"/>
+              <a:t>SQL Code Lab</a:t>
+            </a:r>
+          </a:p>
+        </p:txBody>
+      </p:sp>
+      <p:sp>
+        <p:nvSpPr>
+          <p:cNvPr id="3" name="Text Placeholder 2">
+            <a:extLst>
+              <a:ext uri="{FF2B5EF4-FFF2-40B4-BE49-F238E27FC236}">
+                <a16:creationId xmlns:a16="http://schemas.microsoft.com/office/drawing/2014/main" id="{44DA4C25-BE59-CE47-8638-3119AD6B9C6B}"/>
+              </a:ext>
+            </a:extLst>
+          </p:cNvPr>
+          <p:cNvSpPr>
+            <a:spLocks noGrp="1"/>
+          </p:cNvSpPr>
+          <p:nvPr>
+            <p:ph type="body" idx="1"/>
+          </p:nvPr>
+        </p:nvSpPr>
+        <p:spPr>
+          <a:xfrm>
+            <a:off x="914400" y="1017361"/>
+            <a:ext cx="8229600" cy="712612"/>
+          </a:xfrm>
+        </p:spPr>
+        <p:txBody>
+          <a:bodyPr/>
+          <a:lstStyle/>
+          <a:p>
+            <a:r>
+              <a:rPr lang="en-US" dirty="0">
+                <a:hlinkClick r:id="rId2"/>
+              </a:rPr>
+              <a:t>https://sqliteonline.com/</a:t>
+            </a:r>
+            <a:endParaRPr lang="en-US" dirty="0"/>
+          </a:p>
+        </p:txBody>
+      </p:sp>
+      <p:sp>
+        <p:nvSpPr>
+          <p:cNvPr id="4" name="Slide Number Placeholder 3">
+            <a:extLst>
+              <a:ext uri="{FF2B5EF4-FFF2-40B4-BE49-F238E27FC236}">
+                <a16:creationId xmlns:a16="http://schemas.microsoft.com/office/drawing/2014/main" id="{65EF4254-8407-9348-8B09-FA8D0BB7FD98}"/>
+              </a:ext>
+            </a:extLst>
+          </p:cNvPr>
+          <p:cNvSpPr>
+            <a:spLocks noGrp="1"/>
+          </p:cNvSpPr>
+          <p:nvPr>
+            <p:ph type="sldNum" idx="12"/>
+          </p:nvPr>
+        </p:nvSpPr>
+        <p:spPr/>
+        <p:txBody>
+          <a:bodyPr/>
+          <a:lstStyle/>
+          <a:p>
+            <a:pPr marL="0" lvl="0" indent="0" algn="r" rtl="0">
+              <a:spcBef>
+                <a:spcPts val="0"/>
+              </a:spcBef>
+              <a:spcAft>
+                <a:spcPts val="0"/>
+              </a:spcAft>
+              <a:buNone/>
+            </a:pPr>
+            <a:fld id="{00000000-1234-1234-1234-123412341234}" type="slidenum">
+              <a:rPr lang="en-US" smtClean="0"/>
+              <a:t>7</a:t>
+            </a:fld>
+            <a:endParaRPr lang="en-US"/>
+          </a:p>
+        </p:txBody>
+      </p:sp>
+      <p:pic>
+        <p:nvPicPr>
+          <p:cNvPr id="6" name="Picture 5">
+            <a:extLst>
+              <a:ext uri="{FF2B5EF4-FFF2-40B4-BE49-F238E27FC236}">
+                <a16:creationId xmlns:a16="http://schemas.microsoft.com/office/drawing/2014/main" id="{8E9F0A9F-27DD-B64E-860E-3EBEB80B7D88}"/>
+              </a:ext>
+            </a:extLst>
+          </p:cNvPr>
+          <p:cNvPicPr>
+            <a:picLocks noChangeAspect="1"/>
+          </p:cNvPicPr>
+          <p:nvPr/>
+        </p:nvPicPr>
+        <p:blipFill>
+          <a:blip r:embed="rId3"/>
+          <a:stretch>
+            <a:fillRect/>
+          </a:stretch>
+        </p:blipFill>
+        <p:spPr>
+          <a:xfrm>
+            <a:off x="2237360" y="1729973"/>
+            <a:ext cx="5068981" cy="4676433"/>
+          </a:xfrm>
+          <a:prstGeom prst="rect">
+            <a:avLst/>
+          </a:prstGeom>
+        </p:spPr>
+      </p:pic>
+    </p:spTree>
+    <p:extLst>
+      <p:ext uri="{BB962C8B-B14F-4D97-AF65-F5344CB8AC3E}">
+        <p14:creationId xmlns:p14="http://schemas.microsoft.com/office/powerpoint/2010/main" val="3342892509"/>
+      </p:ext>
+    </p:extLst>
+  </p:cSld>
+  <p:clrMapOvr>
+    <a:masterClrMapping/>
+  </p:clrMapOvr>
+</p:sld>
+</file>
+
+<file path=ppt/slides/slide8.xml><?xml version="1.0" encoding="utf-8"?>
+<p:sld xmlns:a="http://schemas.openxmlformats.org/drawingml/2006/main" xmlns:r="http://schemas.openxmlformats.org/officeDocument/2006/relationships" xmlns:p="http://schemas.openxmlformats.org/presentationml/2006/main">
+  <p:cSld>
+    <p:spTree>
+      <p:nvGrpSpPr>
+        <p:cNvPr id="1" name="Shape 56"/>
+        <p:cNvGrpSpPr/>
+        <p:nvPr/>
+      </p:nvGrpSpPr>
+      <p:grpSpPr>
+        <a:xfrm>
+          <a:off x="0" y="0"/>
+          <a:ext cx="0" cy="0"/>
+          <a:chOff x="0" y="0"/>
+          <a:chExt cx="0" cy="0"/>
+        </a:xfrm>
+      </p:grpSpPr>
+      <p:sp>
+        <p:nvSpPr>
+          <p:cNvPr id="57" name="Google Shape;57;p9"/>
+          <p:cNvSpPr txBox="1">
+            <a:spLocks noGrp="1"/>
+          </p:cNvSpPr>
+          <p:nvPr>
+            <p:ph type="title"/>
+          </p:nvPr>
+        </p:nvSpPr>
+        <p:spPr>
+          <a:xfrm>
+            <a:off x="457200" y="0"/>
+            <a:ext cx="8229600" cy="1143000"/>
+          </a:xfrm>
+          <a:prstGeom prst="rect">
+            <a:avLst/>
+          </a:prstGeom>
+          <a:noFill/>
+          <a:ln>
+            <a:noFill/>
+          </a:ln>
+        </p:spPr>
+        <p:txBody>
+          <a:bodyPr spcFirstLastPara="1" wrap="square" lIns="91425" tIns="45700" rIns="91425" bIns="45700" anchor="ctr" anchorCtr="0">
+            <a:noAutofit/>
+          </a:bodyPr>
+          <a:lstStyle/>
+          <a:p>
+            <a:pPr marL="0" lvl="0" indent="0" algn="l" rtl="0">
+              <a:lnSpc>
+                <a:spcPct val="100000"/>
+              </a:lnSpc>
+              <a:spcBef>
+                <a:spcPts val="0"/>
+              </a:spcBef>
+              <a:spcAft>
+                <a:spcPts val="0"/>
+              </a:spcAft>
+              <a:buClr>
+                <a:srgbClr val="3D146F"/>
+              </a:buClr>
+              <a:buSzPts val="3200"/>
+              <a:buFont typeface="Arial"/>
+              <a:buNone/>
+            </a:pPr>
+            <a:r>
+              <a:rPr lang="en-US" dirty="0"/>
+              <a:t>ODBC Connection in STATA</a:t>
+            </a:r>
+            <a:endParaRPr dirty="0"/>
+          </a:p>
+        </p:txBody>
+      </p:sp>
+      <p:sp>
+        <p:nvSpPr>
+          <p:cNvPr id="59" name="Google Shape;59;p9"/>
+          <p:cNvSpPr txBox="1">
+            <a:spLocks noGrp="1"/>
+          </p:cNvSpPr>
+          <p:nvPr>
+            <p:ph type="sldNum" idx="12"/>
+          </p:nvPr>
+        </p:nvSpPr>
+        <p:spPr>
+          <a:xfrm>
+            <a:off x="8686800" y="6506896"/>
+            <a:ext cx="416244" cy="365125"/>
+          </a:xfrm>
+          <a:prstGeom prst="rect">
+            <a:avLst/>
+          </a:prstGeom>
+          <a:noFill/>
+          <a:ln>
+            <a:noFill/>
+          </a:ln>
+        </p:spPr>
+        <p:txBody>
+          <a:bodyPr spcFirstLastPara="1" wrap="square" lIns="91425" tIns="45700" rIns="91425" bIns="45700" anchor="ctr" anchorCtr="0">
+            <a:noAutofit/>
+          </a:bodyPr>
+          <a:lstStyle/>
+          <a:p>
+            <a:pPr marL="0" lvl="0" indent="0" algn="r" rtl="0">
+              <a:lnSpc>
+                <a:spcPct val="100000"/>
+              </a:lnSpc>
+              <a:spcBef>
+                <a:spcPts val="0"/>
+              </a:spcBef>
+              <a:spcAft>
+                <a:spcPts val="0"/>
+              </a:spcAft>
+              <a:buSzPts val="1000"/>
+              <a:buNone/>
+            </a:pPr>
+            <a:fld id="{00000000-1234-1234-1234-123412341234}" type="slidenum">
+              <a:rPr lang="en-US"/>
+              <a:t>8</a:t>
+            </a:fld>
+            <a:endParaRPr/>
+          </a:p>
+        </p:txBody>
+      </p:sp>
+      <p:sp>
+        <p:nvSpPr>
+          <p:cNvPr id="6" name="Google Shape;60;p9"/>
+          <p:cNvSpPr txBox="1"/>
+          <p:nvPr/>
+        </p:nvSpPr>
+        <p:spPr>
+          <a:xfrm>
+            <a:off x="457200" y="1231900"/>
+            <a:ext cx="8541000" cy="4599600"/>
+          </a:xfrm>
+          <a:prstGeom prst="rect">
+            <a:avLst/>
+          </a:prstGeom>
+          <a:noFill/>
+          <a:ln>
+            <a:noFill/>
+          </a:ln>
+        </p:spPr>
+        <p:txBody>
+          <a:bodyPr spcFirstLastPara="1" wrap="square" lIns="91425" tIns="45700" rIns="91425" bIns="45700" anchor="t" anchorCtr="0">
+            <a:noAutofit/>
+          </a:bodyPr>
+          <a:lstStyle/>
+          <a:p>
+            <a:pPr marL="742950" marR="0" lvl="1" indent="-171450" algn="l" rtl="0">
+              <a:lnSpc>
+                <a:spcPct val="100000"/>
+              </a:lnSpc>
+              <a:spcBef>
+                <a:spcPts val="0"/>
+              </a:spcBef>
+              <a:spcAft>
+                <a:spcPts val="0"/>
+              </a:spcAft>
+              <a:buClr>
+                <a:schemeClr val="dk1"/>
+              </a:buClr>
+              <a:buSzPts val="1800"/>
+              <a:buFont typeface="Courier New"/>
+              <a:buNone/>
+            </a:pPr>
+            <a:endParaRPr sz="1800" b="0" i="0" u="none" strike="noStrike" cap="none" dirty="0">
+              <a:solidFill>
+                <a:schemeClr val="dk1"/>
+              </a:solidFill>
+              <a:latin typeface="Arial"/>
+              <a:ea typeface="Arial"/>
+              <a:cs typeface="Arial"/>
+              <a:sym typeface="Arial"/>
+            </a:endParaRPr>
+          </a:p>
+          <a:p>
+            <a:pPr marL="457200" marR="0" lvl="1" indent="0" algn="l" rtl="0">
+              <a:lnSpc>
+                <a:spcPct val="100000"/>
+              </a:lnSpc>
+              <a:spcBef>
+                <a:spcPts val="0"/>
+              </a:spcBef>
+              <a:spcAft>
+                <a:spcPts val="0"/>
+              </a:spcAft>
+              <a:buClr>
+                <a:srgbClr val="000000"/>
+              </a:buClr>
+              <a:buSzPts val="1800"/>
+              <a:buFont typeface="Arial"/>
+              <a:buNone/>
+            </a:pPr>
+            <a:endParaRPr sz="1800" b="0" i="0" u="none" strike="noStrike" cap="none" dirty="0">
+              <a:solidFill>
+                <a:schemeClr val="dk1"/>
+              </a:solidFill>
+              <a:latin typeface="Arial"/>
+              <a:ea typeface="Arial"/>
+              <a:cs typeface="Arial"/>
+              <a:sym typeface="Arial"/>
+            </a:endParaRPr>
+          </a:p>
+          <a:p>
+            <a:pPr marL="0" marR="0" lvl="0" indent="0" algn="l" rtl="0">
+              <a:lnSpc>
+                <a:spcPct val="100000"/>
+              </a:lnSpc>
+              <a:spcBef>
+                <a:spcPts val="0"/>
+              </a:spcBef>
+              <a:spcAft>
+                <a:spcPts val="0"/>
+              </a:spcAft>
+              <a:buClr>
+                <a:srgbClr val="000000"/>
+              </a:buClr>
+              <a:buSzPts val="1800"/>
+              <a:buFont typeface="Arial"/>
+              <a:buNone/>
+            </a:pPr>
+            <a:endParaRPr sz="1800" b="0" i="0" u="none" strike="noStrike" cap="none" dirty="0">
+              <a:solidFill>
+                <a:schemeClr val="dk1"/>
+              </a:solidFill>
+              <a:latin typeface="Arial"/>
+              <a:ea typeface="Arial"/>
+              <a:cs typeface="Arial"/>
+              <a:sym typeface="Arial"/>
+            </a:endParaRPr>
+          </a:p>
+          <a:p>
+            <a:pPr marL="0" marR="0" lvl="0" indent="0" algn="l" rtl="0">
+              <a:lnSpc>
+                <a:spcPct val="100000"/>
+              </a:lnSpc>
+              <a:spcBef>
+                <a:spcPts val="0"/>
+              </a:spcBef>
+              <a:spcAft>
+                <a:spcPts val="0"/>
+              </a:spcAft>
+              <a:buClr>
+                <a:srgbClr val="000000"/>
+              </a:buClr>
+              <a:buSzPts val="1800"/>
+              <a:buFont typeface="Arial"/>
+              <a:buNone/>
+            </a:pPr>
+            <a:endParaRPr sz="1800" b="0" i="0" u="none" strike="noStrike" cap="none" dirty="0">
+              <a:solidFill>
+                <a:schemeClr val="dk1"/>
+              </a:solidFill>
+              <a:latin typeface="Arial"/>
+              <a:ea typeface="Arial"/>
+              <a:cs typeface="Arial"/>
+              <a:sym typeface="Arial"/>
+            </a:endParaRPr>
+          </a:p>
+          <a:p>
+            <a:pPr marL="0" marR="0" lvl="0" indent="0" algn="l" rtl="0">
+              <a:lnSpc>
+                <a:spcPct val="100000"/>
+              </a:lnSpc>
+              <a:spcBef>
+                <a:spcPts val="0"/>
+              </a:spcBef>
+              <a:spcAft>
+                <a:spcPts val="0"/>
+              </a:spcAft>
+              <a:buClr>
+                <a:srgbClr val="000000"/>
+              </a:buClr>
+              <a:buSzPts val="1800"/>
+              <a:buFont typeface="Arial"/>
+              <a:buNone/>
+            </a:pPr>
+            <a:endParaRPr sz="1800" b="0" i="0" u="none" strike="noStrike" cap="none" dirty="0">
+              <a:solidFill>
+                <a:schemeClr val="dk1"/>
+              </a:solidFill>
+              <a:latin typeface="Arial"/>
+              <a:ea typeface="Arial"/>
+              <a:cs typeface="Arial"/>
+              <a:sym typeface="Arial"/>
+            </a:endParaRPr>
+          </a:p>
+          <a:p>
+            <a:pPr marL="0" marR="0" lvl="0" indent="0" algn="l" rtl="0">
+              <a:lnSpc>
+                <a:spcPct val="100000"/>
+              </a:lnSpc>
+              <a:spcBef>
+                <a:spcPts val="0"/>
+              </a:spcBef>
+              <a:spcAft>
+                <a:spcPts val="0"/>
+              </a:spcAft>
+              <a:buClr>
+                <a:srgbClr val="000000"/>
+              </a:buClr>
+              <a:buSzPts val="1800"/>
+              <a:buFont typeface="Arial"/>
+              <a:buNone/>
+            </a:pPr>
+            <a:endParaRPr sz="1800" b="0" i="0" u="none" strike="noStrike" cap="none" dirty="0">
+              <a:solidFill>
+                <a:schemeClr val="dk1"/>
+              </a:solidFill>
+              <a:latin typeface="Arial"/>
+              <a:ea typeface="Arial"/>
+              <a:cs typeface="Arial"/>
+              <a:sym typeface="Arial"/>
+            </a:endParaRPr>
+          </a:p>
+          <a:p>
+            <a:pPr marL="0" marR="0" lvl="0" indent="0" algn="l" rtl="0">
+              <a:lnSpc>
+                <a:spcPct val="100000"/>
+              </a:lnSpc>
+              <a:spcBef>
+                <a:spcPts val="0"/>
+              </a:spcBef>
+              <a:spcAft>
+                <a:spcPts val="0"/>
+              </a:spcAft>
+              <a:buClr>
+                <a:srgbClr val="000000"/>
+              </a:buClr>
+              <a:buSzPts val="1800"/>
+              <a:buFont typeface="Arial"/>
+              <a:buNone/>
+            </a:pPr>
+            <a:endParaRPr sz="1800" b="0" i="0" u="none" strike="noStrike" cap="none" dirty="0">
+              <a:solidFill>
+                <a:schemeClr val="dk1"/>
+              </a:solidFill>
+              <a:latin typeface="Arial"/>
+              <a:ea typeface="Arial"/>
+              <a:cs typeface="Arial"/>
+              <a:sym typeface="Arial"/>
+            </a:endParaRPr>
+          </a:p>
+          <a:p>
+            <a:pPr marL="0" marR="0" lvl="0" indent="0" algn="l" rtl="0">
+              <a:lnSpc>
+                <a:spcPct val="100000"/>
+              </a:lnSpc>
+              <a:spcBef>
+                <a:spcPts val="0"/>
+              </a:spcBef>
+              <a:spcAft>
+                <a:spcPts val="0"/>
+              </a:spcAft>
+              <a:buClr>
+                <a:srgbClr val="000000"/>
+              </a:buClr>
+              <a:buSzPts val="1800"/>
+              <a:buFont typeface="Arial"/>
+              <a:buNone/>
+            </a:pPr>
+            <a:endParaRPr sz="1800" b="0" i="0" u="none" strike="noStrike" cap="none" dirty="0">
+              <a:solidFill>
+                <a:schemeClr val="dk1"/>
+              </a:solidFill>
+              <a:latin typeface="Arial"/>
+              <a:ea typeface="Arial"/>
+              <a:cs typeface="Arial"/>
+              <a:sym typeface="Arial"/>
+            </a:endParaRPr>
+          </a:p>
+          <a:p>
+            <a:pPr marL="0" marR="0" lvl="0" indent="0" algn="l" rtl="0">
+              <a:lnSpc>
+                <a:spcPct val="100000"/>
+              </a:lnSpc>
+              <a:spcBef>
+                <a:spcPts val="0"/>
+              </a:spcBef>
+              <a:spcAft>
+                <a:spcPts val="0"/>
+              </a:spcAft>
+              <a:buClr>
+                <a:srgbClr val="000000"/>
+              </a:buClr>
+              <a:buSzPts val="1800"/>
+              <a:buFont typeface="Arial"/>
+              <a:buNone/>
+            </a:pPr>
+            <a:endParaRPr sz="1800" b="0" i="0" u="none" strike="noStrike" cap="none" dirty="0">
+              <a:solidFill>
+                <a:schemeClr val="dk1"/>
+              </a:solidFill>
+              <a:latin typeface="Arial"/>
+              <a:ea typeface="Arial"/>
+              <a:cs typeface="Arial"/>
+              <a:sym typeface="Arial"/>
+            </a:endParaRPr>
+          </a:p>
+          <a:p>
+            <a:pPr marL="0" marR="0" lvl="0" indent="0" algn="l" rtl="0">
+              <a:lnSpc>
+                <a:spcPct val="100000"/>
+              </a:lnSpc>
+              <a:spcBef>
+                <a:spcPts val="0"/>
+              </a:spcBef>
+              <a:spcAft>
+                <a:spcPts val="0"/>
+              </a:spcAft>
+              <a:buClr>
+                <a:srgbClr val="000000"/>
+              </a:buClr>
+              <a:buSzPts val="1800"/>
+              <a:buFont typeface="Arial"/>
+              <a:buNone/>
+            </a:pPr>
+            <a:endParaRPr sz="1800" b="0" i="0" u="none" strike="noStrike" cap="none" dirty="0">
+              <a:solidFill>
+                <a:schemeClr val="dk1"/>
+              </a:solidFill>
+              <a:latin typeface="Arial"/>
+              <a:ea typeface="Arial"/>
+              <a:cs typeface="Arial"/>
+              <a:sym typeface="Arial"/>
+            </a:endParaRPr>
+          </a:p>
+        </p:txBody>
+      </p:sp>
+      <p:sp>
+        <p:nvSpPr>
+          <p:cNvPr id="2" name="TextBox 1"/>
+          <p:cNvSpPr txBox="1"/>
+          <p:nvPr/>
+        </p:nvSpPr>
+        <p:spPr>
+          <a:xfrm>
+            <a:off x="300790" y="1065200"/>
+            <a:ext cx="7984878" cy="830997"/>
+          </a:xfrm>
+          <a:prstGeom prst="rect">
+            <a:avLst/>
+          </a:prstGeom>
+          <a:noFill/>
+        </p:spPr>
+        <p:txBody>
+          <a:bodyPr wrap="none" rtlCol="0">
+            <a:spAutoFit/>
+          </a:bodyPr>
+          <a:lstStyle/>
+          <a:p>
+            <a:r>
+              <a:rPr lang="en-US" sz="2400" dirty="0"/>
+              <a:t>Open a GNOME Terminal Session in </a:t>
+            </a:r>
+            <a:r>
+              <a:rPr lang="en-US" sz="2400" dirty="0" err="1"/>
+              <a:t>FastX</a:t>
+            </a:r>
+            <a:r>
+              <a:rPr lang="en-US" sz="2400" dirty="0"/>
+              <a:t> and type the </a:t>
+            </a:r>
+          </a:p>
+          <a:p>
+            <a:r>
+              <a:rPr lang="en-US" sz="2400" dirty="0"/>
+              <a:t>following:</a:t>
+            </a:r>
+          </a:p>
+        </p:txBody>
+      </p:sp>
+      <p:sp>
+        <p:nvSpPr>
+          <p:cNvPr id="8" name="Round Same Side Corner Rectangle 7"/>
+          <p:cNvSpPr/>
+          <p:nvPr/>
+        </p:nvSpPr>
+        <p:spPr>
+          <a:xfrm>
+            <a:off x="457200" y="2750130"/>
+            <a:ext cx="8229600" cy="1563140"/>
+          </a:xfrm>
+          <a:prstGeom prst="round2SameRect">
+            <a:avLst/>
+          </a:prstGeom>
+          <a:solidFill>
+            <a:schemeClr val="bg1">
+              <a:lumMod val="85000"/>
+            </a:schemeClr>
+          </a:solidFill>
+          <a:ln>
+            <a:noFill/>
+          </a:ln>
+        </p:spPr>
+        <p:style>
+          <a:lnRef idx="2">
+            <a:schemeClr val="accent1">
+              <a:shade val="50000"/>
+            </a:schemeClr>
+          </a:lnRef>
+          <a:fillRef idx="1">
+            <a:schemeClr val="accent1"/>
+          </a:fillRef>
+          <a:effectRef idx="0">
+            <a:schemeClr val="accent1"/>
+          </a:effectRef>
+          <a:fontRef idx="minor">
+            <a:schemeClr val="lt1"/>
+          </a:fontRef>
+        </p:style>
+        <p:txBody>
+          <a:bodyPr rtlCol="0" anchor="ctr"/>
+          <a:lstStyle/>
+          <a:p>
+            <a:r>
+              <a:rPr lang="en-US" sz="2400" dirty="0">
+                <a:solidFill>
+                  <a:schemeClr val="tx1"/>
+                </a:solidFill>
+                <a:latin typeface="Consolas" charset="0"/>
+                <a:ea typeface="Consolas" charset="0"/>
+                <a:cs typeface="Consolas" charset="0"/>
+              </a:rPr>
+              <a:t>export ODBCSYSINI=~/.</a:t>
+            </a:r>
+            <a:r>
+              <a:rPr lang="en-US" sz="2400" dirty="0" err="1">
+                <a:solidFill>
+                  <a:schemeClr val="tx1"/>
+                </a:solidFill>
+                <a:latin typeface="Consolas" charset="0"/>
+                <a:ea typeface="Consolas" charset="0"/>
+                <a:cs typeface="Consolas" charset="0"/>
+              </a:rPr>
+              <a:t>odbc</a:t>
+            </a:r>
+            <a:r>
+              <a:rPr lang="en-US" sz="2400" dirty="0">
+                <a:solidFill>
+                  <a:schemeClr val="tx1"/>
+                </a:solidFill>
+                <a:latin typeface="Consolas" charset="0"/>
+                <a:ea typeface="Consolas" charset="0"/>
+                <a:cs typeface="Consolas" charset="0"/>
+              </a:rPr>
+              <a:t>/</a:t>
+            </a:r>
+          </a:p>
+          <a:p>
+            <a:r>
+              <a:rPr lang="en-US" sz="2400" dirty="0">
+                <a:solidFill>
+                  <a:schemeClr val="tx1"/>
+                </a:solidFill>
+                <a:latin typeface="Consolas" charset="0"/>
+                <a:ea typeface="Consolas" charset="0"/>
+                <a:cs typeface="Consolas" charset="0"/>
+              </a:rPr>
+              <a:t>module load </a:t>
+            </a:r>
+            <a:r>
+              <a:rPr lang="en-US" sz="2400" dirty="0" err="1">
+                <a:solidFill>
+                  <a:schemeClr val="tx1"/>
+                </a:solidFill>
+                <a:latin typeface="Consolas" charset="0"/>
+                <a:ea typeface="Consolas" charset="0"/>
+                <a:cs typeface="Consolas" charset="0"/>
+              </a:rPr>
+              <a:t>stata</a:t>
+            </a:r>
+            <a:r>
+              <a:rPr lang="en-US" sz="2400" dirty="0">
+                <a:solidFill>
+                  <a:schemeClr val="tx1"/>
+                </a:solidFill>
+                <a:latin typeface="Consolas" charset="0"/>
+                <a:ea typeface="Consolas" charset="0"/>
+                <a:cs typeface="Consolas" charset="0"/>
+              </a:rPr>
+              <a:t>/15</a:t>
+            </a:r>
+          </a:p>
+          <a:p>
+            <a:r>
+              <a:rPr lang="en-US" sz="2400" dirty="0" err="1">
+                <a:solidFill>
+                  <a:schemeClr val="tx1"/>
+                </a:solidFill>
+                <a:latin typeface="Consolas" charset="0"/>
+                <a:ea typeface="Consolas" charset="0"/>
+                <a:cs typeface="Consolas" charset="0"/>
+              </a:rPr>
+              <a:t>xstata-mp</a:t>
+            </a:r>
+            <a:endParaRPr lang="en-US" dirty="0"/>
+          </a:p>
+        </p:txBody>
+      </p:sp>
+    </p:spTree>
+    <p:extLst>
+      <p:ext uri="{BB962C8B-B14F-4D97-AF65-F5344CB8AC3E}">
+        <p14:creationId xmlns:p14="http://schemas.microsoft.com/office/powerpoint/2010/main" val="2074952894"/>
+      </p:ext>
+    </p:extLst>
+  </p:cSld>
+  <p:clrMapOvr>
+    <a:masterClrMapping/>
+  </p:clrMapOvr>
+</p:sld>
+</file>
+
+<file path=ppt/slides/slide9.xml><?xml version="1.0" encoding="utf-8"?>
+<p:sld xmlns:a="http://schemas.openxmlformats.org/drawingml/2006/main" xmlns:r="http://schemas.openxmlformats.org/officeDocument/2006/relationships" xmlns:p="http://schemas.openxmlformats.org/presentationml/2006/main">
+  <p:cSld>
+    <p:spTree>
+      <p:nvGrpSpPr>
+        <p:cNvPr id="1" name="Shape 56"/>
+        <p:cNvGrpSpPr/>
+        <p:nvPr/>
+      </p:nvGrpSpPr>
+      <p:grpSpPr>
+        <a:xfrm>
+          <a:off x="0" y="0"/>
+          <a:ext cx="0" cy="0"/>
+          <a:chOff x="0" y="0"/>
+          <a:chExt cx="0" cy="0"/>
+        </a:xfrm>
+      </p:grpSpPr>
+      <p:sp>
+        <p:nvSpPr>
+          <p:cNvPr id="57" name="Google Shape;57;p9"/>
+          <p:cNvSpPr txBox="1">
+            <a:spLocks noGrp="1"/>
+          </p:cNvSpPr>
+          <p:nvPr>
+            <p:ph type="title"/>
+          </p:nvPr>
+        </p:nvSpPr>
+        <p:spPr>
+          <a:xfrm>
+            <a:off x="457200" y="0"/>
+            <a:ext cx="8229600" cy="1143000"/>
+          </a:xfrm>
+          <a:prstGeom prst="rect">
+            <a:avLst/>
+          </a:prstGeom>
+          <a:noFill/>
+          <a:ln>
+            <a:noFill/>
+          </a:ln>
+        </p:spPr>
+        <p:txBody>
+          <a:bodyPr spcFirstLastPara="1" wrap="square" lIns="91425" tIns="45700" rIns="91425" bIns="45700" anchor="ctr" anchorCtr="0">
+            <a:noAutofit/>
+          </a:bodyPr>
+          <a:lstStyle/>
+          <a:p>
+            <a:pPr marL="0" lvl="0" indent="0" algn="l" rtl="0">
+              <a:lnSpc>
+                <a:spcPct val="100000"/>
+              </a:lnSpc>
+              <a:spcBef>
+                <a:spcPts val="0"/>
+              </a:spcBef>
+              <a:spcAft>
+                <a:spcPts val="0"/>
+              </a:spcAft>
+              <a:buClr>
+                <a:srgbClr val="3D146F"/>
+              </a:buClr>
+              <a:buSzPts val="3200"/>
+              <a:buFont typeface="Arial"/>
+              <a:buNone/>
+            </a:pPr>
+            <a:r>
+              <a:rPr lang="en-US" dirty="0"/>
+              <a:t>ODBC Connection in Python</a:t>
+            </a:r>
+            <a:endParaRPr dirty="0"/>
+          </a:p>
+        </p:txBody>
+      </p:sp>
+      <p:sp>
+        <p:nvSpPr>
+          <p:cNvPr id="58" name="Google Shape;58;p9"/>
+          <p:cNvSpPr txBox="1">
+            <a:spLocks noGrp="1"/>
+          </p:cNvSpPr>
+          <p:nvPr>
+            <p:ph type="ftr" idx="11"/>
+          </p:nvPr>
+        </p:nvSpPr>
+        <p:spPr>
+          <a:xfrm>
+            <a:off x="4572000" y="6506896"/>
+            <a:ext cx="4114800" cy="365125"/>
+          </a:xfrm>
+          <a:prstGeom prst="rect">
+            <a:avLst/>
+          </a:prstGeom>
+          <a:noFill/>
+          <a:ln>
+            <a:noFill/>
+          </a:ln>
+        </p:spPr>
+        <p:txBody>
+          <a:bodyPr spcFirstLastPara="1" wrap="square" lIns="91425" tIns="45700" rIns="91425" bIns="45700" anchor="ctr" anchorCtr="0">
+            <a:noAutofit/>
+          </a:bodyPr>
+          <a:lstStyle/>
+          <a:p>
+            <a:pPr marL="0" lvl="0" indent="0" algn="r" rtl="0">
+              <a:lnSpc>
+                <a:spcPct val="100000"/>
+              </a:lnSpc>
+              <a:spcBef>
+                <a:spcPts val="0"/>
+              </a:spcBef>
+              <a:spcAft>
+                <a:spcPts val="0"/>
+              </a:spcAft>
+              <a:buSzPts val="1400"/>
+              <a:buNone/>
+            </a:pPr>
+            <a:r>
+              <a:rPr lang="en-US" dirty="0"/>
+              <a:t>Data Skills for Empiricists </a:t>
+            </a:r>
+            <a:endParaRPr dirty="0"/>
+          </a:p>
+        </p:txBody>
+      </p:sp>
+      <p:sp>
+        <p:nvSpPr>
+          <p:cNvPr id="59" name="Google Shape;59;p9"/>
+          <p:cNvSpPr txBox="1">
+            <a:spLocks noGrp="1"/>
+          </p:cNvSpPr>
+          <p:nvPr>
+            <p:ph type="sldNum" idx="12"/>
+          </p:nvPr>
+        </p:nvSpPr>
+        <p:spPr>
+          <a:xfrm>
+            <a:off x="8686800" y="6506896"/>
+            <a:ext cx="416244" cy="365125"/>
+          </a:xfrm>
+          <a:prstGeom prst="rect">
+            <a:avLst/>
+          </a:prstGeom>
+          <a:noFill/>
+          <a:ln>
+            <a:noFill/>
+          </a:ln>
+        </p:spPr>
+        <p:txBody>
+          <a:bodyPr spcFirstLastPara="1" wrap="square" lIns="91425" tIns="45700" rIns="91425" bIns="45700" anchor="ctr" anchorCtr="0">
+            <a:noAutofit/>
+          </a:bodyPr>
+          <a:lstStyle/>
+          <a:p>
+            <a:pPr marL="0" lvl="0" indent="0" algn="r" rtl="0">
+              <a:lnSpc>
+                <a:spcPct val="100000"/>
+              </a:lnSpc>
+              <a:spcBef>
+                <a:spcPts val="0"/>
+              </a:spcBef>
+              <a:spcAft>
+                <a:spcPts val="0"/>
+              </a:spcAft>
+              <a:buSzPts val="1000"/>
+              <a:buNone/>
+            </a:pPr>
+            <a:fld id="{00000000-1234-1234-1234-123412341234}" type="slidenum">
+              <a:rPr lang="en-US"/>
+              <a:t>9</a:t>
+            </a:fld>
+            <a:endParaRPr/>
+          </a:p>
+        </p:txBody>
+      </p:sp>
+      <p:sp>
+        <p:nvSpPr>
+          <p:cNvPr id="6" name="Google Shape;60;p9"/>
+          <p:cNvSpPr txBox="1"/>
+          <p:nvPr/>
+        </p:nvSpPr>
+        <p:spPr>
+          <a:xfrm>
+            <a:off x="457200" y="1231900"/>
+            <a:ext cx="8541000" cy="4599600"/>
+          </a:xfrm>
+          <a:prstGeom prst="rect">
+            <a:avLst/>
+          </a:prstGeom>
+          <a:noFill/>
+          <a:ln>
+            <a:noFill/>
+          </a:ln>
+        </p:spPr>
+        <p:txBody>
+          <a:bodyPr spcFirstLastPara="1" wrap="square" lIns="91425" tIns="45700" rIns="91425" bIns="45700" anchor="t" anchorCtr="0">
+            <a:noAutofit/>
+          </a:bodyPr>
+          <a:lstStyle/>
+          <a:p>
+            <a:pPr marL="742950" marR="0" lvl="1" indent="-171450" algn="l" rtl="0">
+              <a:lnSpc>
+                <a:spcPct val="100000"/>
+              </a:lnSpc>
+              <a:spcBef>
+                <a:spcPts val="0"/>
+              </a:spcBef>
+              <a:spcAft>
+                <a:spcPts val="0"/>
+              </a:spcAft>
+              <a:buClr>
+                <a:schemeClr val="dk1"/>
+              </a:buClr>
+              <a:buSzPts val="1800"/>
+              <a:buFont typeface="Courier New"/>
+              <a:buNone/>
+            </a:pPr>
+            <a:endParaRPr sz="1800" b="0" i="0" u="none" strike="noStrike" cap="none" dirty="0">
+              <a:solidFill>
+                <a:schemeClr val="dk1"/>
+              </a:solidFill>
+              <a:latin typeface="Arial"/>
+              <a:ea typeface="Arial"/>
+              <a:cs typeface="Arial"/>
+              <a:sym typeface="Arial"/>
+            </a:endParaRPr>
+          </a:p>
+          <a:p>
+            <a:pPr marL="457200" marR="0" lvl="1" indent="0" algn="l" rtl="0">
+              <a:lnSpc>
+                <a:spcPct val="100000"/>
+              </a:lnSpc>
+              <a:spcBef>
+                <a:spcPts val="0"/>
+              </a:spcBef>
+              <a:spcAft>
+                <a:spcPts val="0"/>
+              </a:spcAft>
+              <a:buClr>
+                <a:srgbClr val="000000"/>
+              </a:buClr>
+              <a:buSzPts val="1800"/>
+              <a:buFont typeface="Arial"/>
+              <a:buNone/>
+            </a:pPr>
+            <a:endParaRPr sz="1800" b="0" i="0" u="none" strike="noStrike" cap="none" dirty="0">
+              <a:solidFill>
+                <a:schemeClr val="dk1"/>
+              </a:solidFill>
+              <a:latin typeface="Arial"/>
+              <a:ea typeface="Arial"/>
+              <a:cs typeface="Arial"/>
+              <a:sym typeface="Arial"/>
+            </a:endParaRPr>
+          </a:p>
+          <a:p>
+            <a:pPr marL="0" marR="0" lvl="0" indent="0" algn="l" rtl="0">
+              <a:lnSpc>
+                <a:spcPct val="100000"/>
+              </a:lnSpc>
+              <a:spcBef>
+                <a:spcPts val="0"/>
+              </a:spcBef>
+              <a:spcAft>
+                <a:spcPts val="0"/>
+              </a:spcAft>
+              <a:buClr>
+                <a:srgbClr val="000000"/>
+              </a:buClr>
+              <a:buSzPts val="1800"/>
+              <a:buFont typeface="Arial"/>
+              <a:buNone/>
+            </a:pPr>
+            <a:endParaRPr sz="1800" b="0" i="0" u="none" strike="noStrike" cap="none" dirty="0">
+              <a:solidFill>
+                <a:schemeClr val="dk1"/>
+              </a:solidFill>
+              <a:latin typeface="Arial"/>
+              <a:ea typeface="Arial"/>
+              <a:cs typeface="Arial"/>
+              <a:sym typeface="Arial"/>
+            </a:endParaRPr>
+          </a:p>
+          <a:p>
+            <a:pPr marL="0" marR="0" lvl="0" indent="0" algn="l" rtl="0">
+              <a:lnSpc>
+                <a:spcPct val="100000"/>
+              </a:lnSpc>
+              <a:spcBef>
+                <a:spcPts val="0"/>
+              </a:spcBef>
+              <a:spcAft>
+                <a:spcPts val="0"/>
+              </a:spcAft>
+              <a:buClr>
+                <a:srgbClr val="000000"/>
+              </a:buClr>
+              <a:buSzPts val="1800"/>
+              <a:buFont typeface="Arial"/>
+              <a:buNone/>
+            </a:pPr>
+            <a:endParaRPr sz="1800" b="0" i="0" u="none" strike="noStrike" cap="none" dirty="0">
+              <a:solidFill>
+                <a:schemeClr val="dk1"/>
+              </a:solidFill>
+              <a:latin typeface="Arial"/>
+              <a:ea typeface="Arial"/>
+              <a:cs typeface="Arial"/>
+              <a:sym typeface="Arial"/>
+            </a:endParaRPr>
+          </a:p>
+          <a:p>
+            <a:pPr marL="0" marR="0" lvl="0" indent="0" algn="l" rtl="0">
+              <a:lnSpc>
+                <a:spcPct val="100000"/>
+              </a:lnSpc>
+              <a:spcBef>
+                <a:spcPts val="0"/>
+              </a:spcBef>
+              <a:spcAft>
+                <a:spcPts val="0"/>
+              </a:spcAft>
+              <a:buClr>
+                <a:srgbClr val="000000"/>
+              </a:buClr>
+              <a:buSzPts val="1800"/>
+              <a:buFont typeface="Arial"/>
+              <a:buNone/>
+            </a:pPr>
+            <a:endParaRPr sz="1800" b="0" i="0" u="none" strike="noStrike" cap="none" dirty="0">
+              <a:solidFill>
+                <a:schemeClr val="dk1"/>
+              </a:solidFill>
+              <a:latin typeface="Arial"/>
+              <a:ea typeface="Arial"/>
+              <a:cs typeface="Arial"/>
+              <a:sym typeface="Arial"/>
+            </a:endParaRPr>
+          </a:p>
+          <a:p>
+            <a:pPr marL="0" marR="0" lvl="0" indent="0" algn="l" rtl="0">
+              <a:lnSpc>
+                <a:spcPct val="100000"/>
+              </a:lnSpc>
+              <a:spcBef>
+                <a:spcPts val="0"/>
+              </a:spcBef>
+              <a:spcAft>
+                <a:spcPts val="0"/>
+              </a:spcAft>
+              <a:buClr>
+                <a:srgbClr val="000000"/>
+              </a:buClr>
+              <a:buSzPts val="1800"/>
+              <a:buFont typeface="Arial"/>
+              <a:buNone/>
+            </a:pPr>
+            <a:endParaRPr sz="1800" b="0" i="0" u="none" strike="noStrike" cap="none" dirty="0">
+              <a:solidFill>
+                <a:schemeClr val="dk1"/>
+              </a:solidFill>
+              <a:latin typeface="Arial"/>
+              <a:ea typeface="Arial"/>
+              <a:cs typeface="Arial"/>
+              <a:sym typeface="Arial"/>
+            </a:endParaRPr>
+          </a:p>
+          <a:p>
+            <a:pPr marL="0" marR="0" lvl="0" indent="0" algn="l" rtl="0">
+              <a:lnSpc>
+                <a:spcPct val="100000"/>
+              </a:lnSpc>
+              <a:spcBef>
+                <a:spcPts val="0"/>
+              </a:spcBef>
+              <a:spcAft>
+                <a:spcPts val="0"/>
+              </a:spcAft>
+              <a:buClr>
+                <a:srgbClr val="000000"/>
+              </a:buClr>
+              <a:buSzPts val="1800"/>
+              <a:buFont typeface="Arial"/>
+              <a:buNone/>
+            </a:pPr>
+            <a:endParaRPr sz="1800" b="0" i="0" u="none" strike="noStrike" cap="none" dirty="0">
+              <a:solidFill>
+                <a:schemeClr val="dk1"/>
+              </a:solidFill>
+              <a:latin typeface="Arial"/>
+              <a:ea typeface="Arial"/>
+              <a:cs typeface="Arial"/>
+              <a:sym typeface="Arial"/>
+            </a:endParaRPr>
+          </a:p>
+          <a:p>
+            <a:pPr marL="0" marR="0" lvl="0" indent="0" algn="l" rtl="0">
+              <a:lnSpc>
+                <a:spcPct val="100000"/>
+              </a:lnSpc>
+              <a:spcBef>
+                <a:spcPts val="0"/>
+              </a:spcBef>
+              <a:spcAft>
+                <a:spcPts val="0"/>
+              </a:spcAft>
+              <a:buClr>
+                <a:srgbClr val="000000"/>
+              </a:buClr>
+              <a:buSzPts val="1800"/>
+              <a:buFont typeface="Arial"/>
+              <a:buNone/>
+            </a:pPr>
+            <a:endParaRPr sz="1800" b="0" i="0" u="none" strike="noStrike" cap="none" dirty="0">
+              <a:solidFill>
+                <a:schemeClr val="dk1"/>
+              </a:solidFill>
+              <a:latin typeface="Arial"/>
+              <a:ea typeface="Arial"/>
+              <a:cs typeface="Arial"/>
+              <a:sym typeface="Arial"/>
+            </a:endParaRPr>
+          </a:p>
+          <a:p>
+            <a:pPr marL="0" marR="0" lvl="0" indent="0" algn="l" rtl="0">
+              <a:lnSpc>
+                <a:spcPct val="100000"/>
+              </a:lnSpc>
+              <a:spcBef>
+                <a:spcPts val="0"/>
+              </a:spcBef>
+              <a:spcAft>
+                <a:spcPts val="0"/>
+              </a:spcAft>
+              <a:buClr>
+                <a:srgbClr val="000000"/>
+              </a:buClr>
+              <a:buSzPts val="1800"/>
+              <a:buFont typeface="Arial"/>
+              <a:buNone/>
+            </a:pPr>
+            <a:endParaRPr sz="1800" b="0" i="0" u="none" strike="noStrike" cap="none" dirty="0">
+              <a:solidFill>
+                <a:schemeClr val="dk1"/>
+              </a:solidFill>
+              <a:latin typeface="Arial"/>
+              <a:ea typeface="Arial"/>
+              <a:cs typeface="Arial"/>
+              <a:sym typeface="Arial"/>
+            </a:endParaRPr>
+          </a:p>
+          <a:p>
+            <a:pPr marL="0" marR="0" lvl="0" indent="0" algn="l" rtl="0">
+              <a:lnSpc>
+                <a:spcPct val="100000"/>
+              </a:lnSpc>
+              <a:spcBef>
+                <a:spcPts val="0"/>
+              </a:spcBef>
+              <a:spcAft>
+                <a:spcPts val="0"/>
+              </a:spcAft>
+              <a:buClr>
+                <a:srgbClr val="000000"/>
+              </a:buClr>
+              <a:buSzPts val="1800"/>
+              <a:buFont typeface="Arial"/>
+              <a:buNone/>
+            </a:pPr>
+            <a:endParaRPr sz="1800" b="0" i="0" u="none" strike="noStrike" cap="none" dirty="0">
+              <a:solidFill>
+                <a:schemeClr val="dk1"/>
+              </a:solidFill>
+              <a:latin typeface="Arial"/>
+              <a:ea typeface="Arial"/>
+              <a:cs typeface="Arial"/>
+              <a:sym typeface="Arial"/>
+            </a:endParaRPr>
+          </a:p>
+        </p:txBody>
+      </p:sp>
+      <p:sp>
+        <p:nvSpPr>
+          <p:cNvPr id="2" name="TextBox 1"/>
+          <p:cNvSpPr txBox="1"/>
+          <p:nvPr/>
+        </p:nvSpPr>
+        <p:spPr>
+          <a:xfrm>
+            <a:off x="300790" y="1065200"/>
+            <a:ext cx="7984878" cy="830997"/>
+          </a:xfrm>
+          <a:prstGeom prst="rect">
+            <a:avLst/>
+          </a:prstGeom>
+          <a:noFill/>
+        </p:spPr>
+        <p:txBody>
+          <a:bodyPr wrap="none" rtlCol="0">
+            <a:spAutoFit/>
+          </a:bodyPr>
+          <a:lstStyle/>
+          <a:p>
+            <a:r>
+              <a:rPr lang="en-US" sz="2400" dirty="0"/>
+              <a:t>Open a GNOME Terminal Session in </a:t>
+            </a:r>
+            <a:r>
+              <a:rPr lang="en-US" sz="2400" dirty="0" err="1"/>
+              <a:t>FastX</a:t>
+            </a:r>
+            <a:r>
+              <a:rPr lang="en-US" sz="2400" dirty="0"/>
+              <a:t> and type the </a:t>
+            </a:r>
+          </a:p>
+          <a:p>
+            <a:r>
+              <a:rPr lang="en-US" sz="2400" dirty="0"/>
+              <a:t>following:</a:t>
+            </a:r>
+          </a:p>
+        </p:txBody>
+      </p:sp>
+      <p:sp>
+        <p:nvSpPr>
+          <p:cNvPr id="8" name="Round Same Side Corner Rectangle 7"/>
+          <p:cNvSpPr/>
+          <p:nvPr/>
+        </p:nvSpPr>
+        <p:spPr>
+          <a:xfrm>
+            <a:off x="300790" y="2185520"/>
+            <a:ext cx="8229600" cy="3143504"/>
+          </a:xfrm>
+          <a:prstGeom prst="round2SameRect">
+            <a:avLst/>
+          </a:prstGeom>
+          <a:solidFill>
+            <a:schemeClr val="bg1">
+              <a:lumMod val="85000"/>
+            </a:schemeClr>
+          </a:solidFill>
+          <a:ln>
+            <a:noFill/>
+          </a:ln>
+        </p:spPr>
+        <p:style>
+          <a:lnRef idx="2">
+            <a:schemeClr val="accent1">
+              <a:shade val="50000"/>
+            </a:schemeClr>
+          </a:lnRef>
+          <a:fillRef idx="1">
+            <a:schemeClr val="accent1"/>
+          </a:fillRef>
+          <a:effectRef idx="0">
+            <a:schemeClr val="accent1"/>
+          </a:effectRef>
+          <a:fontRef idx="minor">
+            <a:schemeClr val="lt1"/>
+          </a:fontRef>
+        </p:style>
+        <p:txBody>
+          <a:bodyPr rtlCol="0" anchor="ctr"/>
+          <a:lstStyle/>
+          <a:p>
+            <a:r>
+              <a:rPr lang="en-US" sz="2400" dirty="0">
+                <a:solidFill>
+                  <a:schemeClr val="tx1"/>
+                </a:solidFill>
+                <a:latin typeface="Consolas" charset="0"/>
+                <a:ea typeface="Consolas" charset="0"/>
+                <a:cs typeface="Consolas" charset="0"/>
+              </a:rPr>
+              <a:t>module load python/anaconda3.6</a:t>
+            </a:r>
+          </a:p>
+          <a:p>
+            <a:endParaRPr lang="en-US" sz="2400" dirty="0">
+              <a:solidFill>
+                <a:schemeClr val="tx1"/>
+              </a:solidFill>
+              <a:latin typeface="Consolas" charset="0"/>
+              <a:ea typeface="Consolas" charset="0"/>
+              <a:cs typeface="Consolas" charset="0"/>
+            </a:endParaRPr>
+          </a:p>
+          <a:p>
+            <a:r>
+              <a:rPr lang="en-US" sz="2400" dirty="0" err="1">
+                <a:solidFill>
+                  <a:schemeClr val="tx1"/>
+                </a:solidFill>
+                <a:latin typeface="Consolas" charset="0"/>
+                <a:ea typeface="Consolas" charset="0"/>
+                <a:cs typeface="Consolas" charset="0"/>
+              </a:rPr>
+              <a:t>conda</a:t>
+            </a:r>
+            <a:r>
+              <a:rPr lang="en-US" sz="2400" dirty="0">
+                <a:solidFill>
+                  <a:schemeClr val="tx1"/>
+                </a:solidFill>
+                <a:latin typeface="Consolas" charset="0"/>
+                <a:ea typeface="Consolas" charset="0"/>
+                <a:cs typeface="Consolas" charset="0"/>
+              </a:rPr>
+              <a:t> create -n </a:t>
+            </a:r>
+            <a:r>
+              <a:rPr lang="en-US" sz="2400" dirty="0" err="1">
+                <a:solidFill>
+                  <a:schemeClr val="tx1"/>
+                </a:solidFill>
+                <a:latin typeface="Consolas" charset="0"/>
+                <a:ea typeface="Consolas" charset="0"/>
+                <a:cs typeface="Consolas" charset="0"/>
+              </a:rPr>
+              <a:t>taxi_env</a:t>
+            </a:r>
+            <a:r>
+              <a:rPr lang="en-US" sz="2400" dirty="0">
+                <a:solidFill>
+                  <a:schemeClr val="tx1"/>
+                </a:solidFill>
+                <a:latin typeface="Consolas" charset="0"/>
+                <a:ea typeface="Consolas" charset="0"/>
+                <a:cs typeface="Consolas" charset="0"/>
+              </a:rPr>
+              <a:t> python=3.6</a:t>
+            </a:r>
+          </a:p>
+          <a:p>
+            <a:r>
+              <a:rPr lang="en-US" sz="2400" dirty="0">
+                <a:solidFill>
+                  <a:schemeClr val="tx1"/>
+                </a:solidFill>
+                <a:latin typeface="Consolas" charset="0"/>
+                <a:ea typeface="Consolas" charset="0"/>
+                <a:cs typeface="Consolas" charset="0"/>
+              </a:rPr>
+              <a:t>source activate </a:t>
+            </a:r>
+            <a:r>
+              <a:rPr lang="en-US" sz="2400" dirty="0" err="1">
+                <a:solidFill>
+                  <a:schemeClr val="tx1"/>
+                </a:solidFill>
+                <a:latin typeface="Consolas" charset="0"/>
+                <a:ea typeface="Consolas" charset="0"/>
+                <a:cs typeface="Consolas" charset="0"/>
+              </a:rPr>
+              <a:t>taxi_env</a:t>
+            </a:r>
+            <a:endParaRPr lang="en-US" sz="2400" dirty="0">
+              <a:solidFill>
+                <a:schemeClr val="tx1"/>
+              </a:solidFill>
+              <a:latin typeface="Consolas" charset="0"/>
+              <a:ea typeface="Consolas" charset="0"/>
+              <a:cs typeface="Consolas" charset="0"/>
+            </a:endParaRPr>
+          </a:p>
+          <a:p>
+            <a:endParaRPr lang="en-US" sz="2400" dirty="0">
+              <a:solidFill>
+                <a:schemeClr val="tx1"/>
+              </a:solidFill>
+              <a:latin typeface="Consolas" charset="0"/>
+              <a:ea typeface="Consolas" charset="0"/>
+              <a:cs typeface="Consolas" charset="0"/>
+            </a:endParaRPr>
+          </a:p>
+          <a:p>
+            <a:r>
+              <a:rPr lang="en-US" sz="2400" dirty="0" err="1">
+                <a:solidFill>
+                  <a:schemeClr val="tx1"/>
+                </a:solidFill>
+                <a:latin typeface="Consolas" charset="0"/>
+                <a:ea typeface="Consolas" charset="0"/>
+                <a:cs typeface="Consolas" charset="0"/>
+              </a:rPr>
+              <a:t>conda</a:t>
+            </a:r>
+            <a:r>
+              <a:rPr lang="en-US" sz="2400" dirty="0">
+                <a:solidFill>
+                  <a:schemeClr val="tx1"/>
+                </a:solidFill>
+                <a:latin typeface="Consolas" charset="0"/>
+                <a:ea typeface="Consolas" charset="0"/>
+                <a:cs typeface="Consolas" charset="0"/>
+              </a:rPr>
+              <a:t> install -c </a:t>
+            </a:r>
+            <a:r>
+              <a:rPr lang="en-US" sz="2400" dirty="0" err="1">
+                <a:solidFill>
+                  <a:schemeClr val="tx1"/>
+                </a:solidFill>
+                <a:latin typeface="Consolas" charset="0"/>
+                <a:ea typeface="Consolas" charset="0"/>
+                <a:cs typeface="Consolas" charset="0"/>
+              </a:rPr>
+              <a:t>conda</a:t>
+            </a:r>
+            <a:r>
+              <a:rPr lang="en-US" sz="2400" dirty="0">
+                <a:solidFill>
+                  <a:schemeClr val="tx1"/>
+                </a:solidFill>
+                <a:latin typeface="Consolas" charset="0"/>
+                <a:ea typeface="Consolas" charset="0"/>
+                <a:cs typeface="Consolas" charset="0"/>
+              </a:rPr>
+              <a:t>-forge </a:t>
+            </a:r>
+            <a:r>
+              <a:rPr lang="en-US" sz="2400" dirty="0" err="1">
+                <a:solidFill>
+                  <a:schemeClr val="tx1"/>
+                </a:solidFill>
+                <a:latin typeface="Consolas" charset="0"/>
+                <a:ea typeface="Consolas" charset="0"/>
+                <a:cs typeface="Consolas" charset="0"/>
+              </a:rPr>
+              <a:t>pyodbc</a:t>
+            </a:r>
+            <a:endParaRPr lang="en-US" sz="2400" dirty="0">
+              <a:solidFill>
+                <a:schemeClr val="tx1"/>
+              </a:solidFill>
+              <a:latin typeface="Consolas" charset="0"/>
+              <a:ea typeface="Consolas" charset="0"/>
+              <a:cs typeface="Consolas" charset="0"/>
+            </a:endParaRPr>
+          </a:p>
+          <a:p>
+            <a:endParaRPr lang="en-US" sz="2400" dirty="0">
+              <a:solidFill>
+                <a:schemeClr val="tx1"/>
+              </a:solidFill>
+              <a:latin typeface="Consolas" charset="0"/>
+              <a:ea typeface="Consolas" charset="0"/>
+              <a:cs typeface="Consolas" charset="0"/>
+            </a:endParaRPr>
+          </a:p>
+          <a:p>
+            <a:r>
+              <a:rPr lang="en-US" sz="2400" dirty="0" err="1">
+                <a:solidFill>
+                  <a:schemeClr val="tx1"/>
+                </a:solidFill>
+                <a:latin typeface="Consolas" charset="0"/>
+                <a:ea typeface="Consolas" charset="0"/>
+                <a:cs typeface="Consolas" charset="0"/>
+              </a:rPr>
+              <a:t>jupyter</a:t>
+            </a:r>
+            <a:r>
+              <a:rPr lang="en-US" sz="2400" dirty="0">
+                <a:solidFill>
+                  <a:schemeClr val="tx1"/>
+                </a:solidFill>
+                <a:latin typeface="Consolas" charset="0"/>
+                <a:ea typeface="Consolas" charset="0"/>
+                <a:cs typeface="Consolas" charset="0"/>
+              </a:rPr>
+              <a:t> notebook --browser=</a:t>
+            </a:r>
+            <a:r>
+              <a:rPr lang="en-US" sz="2400" dirty="0" err="1">
+                <a:solidFill>
+                  <a:schemeClr val="tx1"/>
+                </a:solidFill>
+                <a:latin typeface="Consolas" charset="0"/>
+                <a:ea typeface="Consolas" charset="0"/>
+                <a:cs typeface="Consolas" charset="0"/>
+              </a:rPr>
+              <a:t>firefox</a:t>
+            </a:r>
+            <a:endParaRPr lang="en-US" sz="2400" dirty="0">
+              <a:solidFill>
+                <a:schemeClr val="tx1"/>
+              </a:solidFill>
+              <a:latin typeface="Consolas" charset="0"/>
+              <a:ea typeface="Consolas" charset="0"/>
+              <a:cs typeface="Consolas" charset="0"/>
+            </a:endParaRPr>
+          </a:p>
+          <a:p>
+            <a:pPr algn="ctr"/>
+            <a:endParaRPr lang="en-US" dirty="0"/>
+          </a:p>
+        </p:txBody>
+      </p:sp>
+    </p:spTree>
+    <p:extLst>
+      <p:ext uri="{BB962C8B-B14F-4D97-AF65-F5344CB8AC3E}">
+        <p14:creationId xmlns:p14="http://schemas.microsoft.com/office/powerpoint/2010/main" val="1176232585"/>
       </p:ext>
     </p:extLst>
   </p:cSld>

</xml_diff>

<commit_message>
added slide to SQL Primer deck
</commit_message>
<xml_diff>
--- a/1-sql-primer/SQL_Primer.pptx
+++ b/1-sql-primer/SQL_Primer.pptx
@@ -5,19 +5,20 @@
     <p:sldMasterId id="2147483654" r:id="rId1"/>
   </p:sldMasterIdLst>
   <p:notesMasterIdLst>
-    <p:notesMasterId r:id="rId12"/>
+    <p:notesMasterId r:id="rId13"/>
   </p:notesMasterIdLst>
   <p:sldIdLst>
     <p:sldId id="256" r:id="rId2"/>
     <p:sldId id="257" r:id="rId3"/>
     <p:sldId id="267" r:id="rId4"/>
-    <p:sldId id="260" r:id="rId5"/>
-    <p:sldId id="262" r:id="rId6"/>
-    <p:sldId id="261" r:id="rId7"/>
-    <p:sldId id="264" r:id="rId8"/>
-    <p:sldId id="268" r:id="rId9"/>
-    <p:sldId id="269" r:id="rId10"/>
-    <p:sldId id="263" r:id="rId11"/>
+    <p:sldId id="270" r:id="rId5"/>
+    <p:sldId id="260" r:id="rId6"/>
+    <p:sldId id="262" r:id="rId7"/>
+    <p:sldId id="261" r:id="rId8"/>
+    <p:sldId id="264" r:id="rId9"/>
+    <p:sldId id="268" r:id="rId10"/>
+    <p:sldId id="269" r:id="rId11"/>
+    <p:sldId id="263" r:id="rId12"/>
   </p:sldIdLst>
   <p:sldSz cx="9144000" cy="6858000" type="screen4x3"/>
   <p:notesSz cx="7010400" cy="9236075"/>
@@ -2405,7 +2406,7 @@
             </a:pPr>
             <a:fld id="{00000000-1234-1234-1234-123412341234}" type="slidenum">
               <a:rPr lang="en-US"/>
-              <a:t>8</a:t>
+              <a:t>9</a:t>
             </a:fld>
             <a:endParaRPr/>
           </a:p>
@@ -2582,7 +2583,7 @@
             </a:pPr>
             <a:fld id="{00000000-1234-1234-1234-123412341234}" type="slidenum">
               <a:rPr lang="en-US"/>
-              <a:t>9</a:t>
+              <a:t>10</a:t>
             </a:fld>
             <a:endParaRPr/>
           </a:p>
@@ -9034,16 +9035,8 @@
               <a:buNone/>
             </a:pPr>
             <a:r>
-              <a:rPr lang="en-US" dirty="0" smtClean="0"/>
-              <a:t>January 10</a:t>
-            </a:r>
-            <a:r>
-              <a:rPr lang="en-US" dirty="0" smtClean="0"/>
-              <a:t>, </a:t>
-            </a:r>
-            <a:r>
               <a:rPr lang="en-US" dirty="0"/>
-              <a:t>2020</a:t>
+              <a:t>January 10, 2020</a:t>
             </a:r>
             <a:endParaRPr dirty="0"/>
           </a:p>
@@ -9112,6 +9105,965 @@
   <p:cSld>
     <p:spTree>
       <p:nvGrpSpPr>
+        <p:cNvPr id="1" name="Shape 56"/>
+        <p:cNvGrpSpPr/>
+        <p:nvPr/>
+      </p:nvGrpSpPr>
+      <p:grpSpPr>
+        <a:xfrm>
+          <a:off x="0" y="0"/>
+          <a:ext cx="0" cy="0"/>
+          <a:chOff x="0" y="0"/>
+          <a:chExt cx="0" cy="0"/>
+        </a:xfrm>
+      </p:grpSpPr>
+      <p:sp>
+        <p:nvSpPr>
+          <p:cNvPr id="57" name="Google Shape;57;p9"/>
+          <p:cNvSpPr txBox="1">
+            <a:spLocks noGrp="1"/>
+          </p:cNvSpPr>
+          <p:nvPr>
+            <p:ph type="title"/>
+          </p:nvPr>
+        </p:nvSpPr>
+        <p:spPr>
+          <a:xfrm>
+            <a:off x="457200" y="0"/>
+            <a:ext cx="8229600" cy="1143000"/>
+          </a:xfrm>
+          <a:prstGeom prst="rect">
+            <a:avLst/>
+          </a:prstGeom>
+          <a:noFill/>
+          <a:ln>
+            <a:noFill/>
+          </a:ln>
+        </p:spPr>
+        <p:txBody>
+          <a:bodyPr spcFirstLastPara="1" wrap="square" lIns="91425" tIns="45700" rIns="91425" bIns="45700" anchor="ctr" anchorCtr="0">
+            <a:noAutofit/>
+          </a:bodyPr>
+          <a:lstStyle/>
+          <a:p>
+            <a:pPr marL="0" lvl="0" indent="0" algn="l" rtl="0">
+              <a:lnSpc>
+                <a:spcPct val="100000"/>
+              </a:lnSpc>
+              <a:spcBef>
+                <a:spcPts val="0"/>
+              </a:spcBef>
+              <a:spcAft>
+                <a:spcPts val="0"/>
+              </a:spcAft>
+              <a:buClr>
+                <a:srgbClr val="3D146F"/>
+              </a:buClr>
+              <a:buSzPts val="3200"/>
+              <a:buFont typeface="Arial"/>
+              <a:buNone/>
+            </a:pPr>
+            <a:r>
+              <a:rPr lang="en-US" dirty="0"/>
+              <a:t>ODBC Connection in Python</a:t>
+            </a:r>
+            <a:endParaRPr dirty="0"/>
+          </a:p>
+        </p:txBody>
+      </p:sp>
+      <p:sp>
+        <p:nvSpPr>
+          <p:cNvPr id="59" name="Google Shape;59;p9"/>
+          <p:cNvSpPr txBox="1">
+            <a:spLocks noGrp="1"/>
+          </p:cNvSpPr>
+          <p:nvPr>
+            <p:ph type="sldNum" idx="12"/>
+          </p:nvPr>
+        </p:nvSpPr>
+        <p:spPr>
+          <a:xfrm>
+            <a:off x="8686800" y="6506896"/>
+            <a:ext cx="416244" cy="365125"/>
+          </a:xfrm>
+          <a:prstGeom prst="rect">
+            <a:avLst/>
+          </a:prstGeom>
+          <a:noFill/>
+          <a:ln>
+            <a:noFill/>
+          </a:ln>
+        </p:spPr>
+        <p:txBody>
+          <a:bodyPr spcFirstLastPara="1" wrap="square" lIns="91425" tIns="45700" rIns="91425" bIns="45700" anchor="ctr" anchorCtr="0">
+            <a:noAutofit/>
+          </a:bodyPr>
+          <a:lstStyle/>
+          <a:p>
+            <a:pPr marL="0" lvl="0" indent="0" algn="r" rtl="0">
+              <a:lnSpc>
+                <a:spcPct val="100000"/>
+              </a:lnSpc>
+              <a:spcBef>
+                <a:spcPts val="0"/>
+              </a:spcBef>
+              <a:spcAft>
+                <a:spcPts val="0"/>
+              </a:spcAft>
+              <a:buSzPts val="1000"/>
+              <a:buNone/>
+            </a:pPr>
+            <a:fld id="{00000000-1234-1234-1234-123412341234}" type="slidenum">
+              <a:rPr lang="en-US"/>
+              <a:t>10</a:t>
+            </a:fld>
+            <a:endParaRPr/>
+          </a:p>
+        </p:txBody>
+      </p:sp>
+      <p:sp>
+        <p:nvSpPr>
+          <p:cNvPr id="6" name="Google Shape;60;p9"/>
+          <p:cNvSpPr txBox="1"/>
+          <p:nvPr/>
+        </p:nvSpPr>
+        <p:spPr>
+          <a:xfrm>
+            <a:off x="457200" y="1231900"/>
+            <a:ext cx="8541000" cy="4599600"/>
+          </a:xfrm>
+          <a:prstGeom prst="rect">
+            <a:avLst/>
+          </a:prstGeom>
+          <a:noFill/>
+          <a:ln>
+            <a:noFill/>
+          </a:ln>
+        </p:spPr>
+        <p:txBody>
+          <a:bodyPr spcFirstLastPara="1" wrap="square" lIns="91425" tIns="45700" rIns="91425" bIns="45700" anchor="t" anchorCtr="0">
+            <a:noAutofit/>
+          </a:bodyPr>
+          <a:lstStyle/>
+          <a:p>
+            <a:pPr marL="742950" marR="0" lvl="1" indent="-171450" algn="l" rtl="0">
+              <a:lnSpc>
+                <a:spcPct val="100000"/>
+              </a:lnSpc>
+              <a:spcBef>
+                <a:spcPts val="0"/>
+              </a:spcBef>
+              <a:spcAft>
+                <a:spcPts val="0"/>
+              </a:spcAft>
+              <a:buClr>
+                <a:schemeClr val="dk1"/>
+              </a:buClr>
+              <a:buSzPts val="1800"/>
+              <a:buFont typeface="Courier New"/>
+              <a:buNone/>
+            </a:pPr>
+            <a:endParaRPr sz="1800" b="0" i="0" u="none" strike="noStrike" cap="none" dirty="0">
+              <a:solidFill>
+                <a:schemeClr val="dk1"/>
+              </a:solidFill>
+              <a:latin typeface="Arial"/>
+              <a:ea typeface="Arial"/>
+              <a:cs typeface="Arial"/>
+              <a:sym typeface="Arial"/>
+            </a:endParaRPr>
+          </a:p>
+          <a:p>
+            <a:pPr marL="457200" marR="0" lvl="1" indent="0" algn="l" rtl="0">
+              <a:lnSpc>
+                <a:spcPct val="100000"/>
+              </a:lnSpc>
+              <a:spcBef>
+                <a:spcPts val="0"/>
+              </a:spcBef>
+              <a:spcAft>
+                <a:spcPts val="0"/>
+              </a:spcAft>
+              <a:buClr>
+                <a:srgbClr val="000000"/>
+              </a:buClr>
+              <a:buSzPts val="1800"/>
+              <a:buFont typeface="Arial"/>
+              <a:buNone/>
+            </a:pPr>
+            <a:endParaRPr sz="1800" b="0" i="0" u="none" strike="noStrike" cap="none" dirty="0">
+              <a:solidFill>
+                <a:schemeClr val="dk1"/>
+              </a:solidFill>
+              <a:latin typeface="Arial"/>
+              <a:ea typeface="Arial"/>
+              <a:cs typeface="Arial"/>
+              <a:sym typeface="Arial"/>
+            </a:endParaRPr>
+          </a:p>
+          <a:p>
+            <a:pPr marL="0" marR="0" lvl="0" indent="0" algn="l" rtl="0">
+              <a:lnSpc>
+                <a:spcPct val="100000"/>
+              </a:lnSpc>
+              <a:spcBef>
+                <a:spcPts val="0"/>
+              </a:spcBef>
+              <a:spcAft>
+                <a:spcPts val="0"/>
+              </a:spcAft>
+              <a:buClr>
+                <a:srgbClr val="000000"/>
+              </a:buClr>
+              <a:buSzPts val="1800"/>
+              <a:buFont typeface="Arial"/>
+              <a:buNone/>
+            </a:pPr>
+            <a:endParaRPr sz="1800" b="0" i="0" u="none" strike="noStrike" cap="none" dirty="0">
+              <a:solidFill>
+                <a:schemeClr val="dk1"/>
+              </a:solidFill>
+              <a:latin typeface="Arial"/>
+              <a:ea typeface="Arial"/>
+              <a:cs typeface="Arial"/>
+              <a:sym typeface="Arial"/>
+            </a:endParaRPr>
+          </a:p>
+          <a:p>
+            <a:pPr marL="0" marR="0" lvl="0" indent="0" algn="l" rtl="0">
+              <a:lnSpc>
+                <a:spcPct val="100000"/>
+              </a:lnSpc>
+              <a:spcBef>
+                <a:spcPts val="0"/>
+              </a:spcBef>
+              <a:spcAft>
+                <a:spcPts val="0"/>
+              </a:spcAft>
+              <a:buClr>
+                <a:srgbClr val="000000"/>
+              </a:buClr>
+              <a:buSzPts val="1800"/>
+              <a:buFont typeface="Arial"/>
+              <a:buNone/>
+            </a:pPr>
+            <a:endParaRPr sz="1800" b="0" i="0" u="none" strike="noStrike" cap="none" dirty="0">
+              <a:solidFill>
+                <a:schemeClr val="dk1"/>
+              </a:solidFill>
+              <a:latin typeface="Arial"/>
+              <a:ea typeface="Arial"/>
+              <a:cs typeface="Arial"/>
+              <a:sym typeface="Arial"/>
+            </a:endParaRPr>
+          </a:p>
+          <a:p>
+            <a:pPr marL="0" marR="0" lvl="0" indent="0" algn="l" rtl="0">
+              <a:lnSpc>
+                <a:spcPct val="100000"/>
+              </a:lnSpc>
+              <a:spcBef>
+                <a:spcPts val="0"/>
+              </a:spcBef>
+              <a:spcAft>
+                <a:spcPts val="0"/>
+              </a:spcAft>
+              <a:buClr>
+                <a:srgbClr val="000000"/>
+              </a:buClr>
+              <a:buSzPts val="1800"/>
+              <a:buFont typeface="Arial"/>
+              <a:buNone/>
+            </a:pPr>
+            <a:endParaRPr sz="1800" b="0" i="0" u="none" strike="noStrike" cap="none" dirty="0">
+              <a:solidFill>
+                <a:schemeClr val="dk1"/>
+              </a:solidFill>
+              <a:latin typeface="Arial"/>
+              <a:ea typeface="Arial"/>
+              <a:cs typeface="Arial"/>
+              <a:sym typeface="Arial"/>
+            </a:endParaRPr>
+          </a:p>
+          <a:p>
+            <a:pPr marL="0" marR="0" lvl="0" indent="0" algn="l" rtl="0">
+              <a:lnSpc>
+                <a:spcPct val="100000"/>
+              </a:lnSpc>
+              <a:spcBef>
+                <a:spcPts val="0"/>
+              </a:spcBef>
+              <a:spcAft>
+                <a:spcPts val="0"/>
+              </a:spcAft>
+              <a:buClr>
+                <a:srgbClr val="000000"/>
+              </a:buClr>
+              <a:buSzPts val="1800"/>
+              <a:buFont typeface="Arial"/>
+              <a:buNone/>
+            </a:pPr>
+            <a:endParaRPr sz="1800" b="0" i="0" u="none" strike="noStrike" cap="none" dirty="0">
+              <a:solidFill>
+                <a:schemeClr val="dk1"/>
+              </a:solidFill>
+              <a:latin typeface="Arial"/>
+              <a:ea typeface="Arial"/>
+              <a:cs typeface="Arial"/>
+              <a:sym typeface="Arial"/>
+            </a:endParaRPr>
+          </a:p>
+          <a:p>
+            <a:pPr marL="0" marR="0" lvl="0" indent="0" algn="l" rtl="0">
+              <a:lnSpc>
+                <a:spcPct val="100000"/>
+              </a:lnSpc>
+              <a:spcBef>
+                <a:spcPts val="0"/>
+              </a:spcBef>
+              <a:spcAft>
+                <a:spcPts val="0"/>
+              </a:spcAft>
+              <a:buClr>
+                <a:srgbClr val="000000"/>
+              </a:buClr>
+              <a:buSzPts val="1800"/>
+              <a:buFont typeface="Arial"/>
+              <a:buNone/>
+            </a:pPr>
+            <a:endParaRPr sz="1800" b="0" i="0" u="none" strike="noStrike" cap="none" dirty="0">
+              <a:solidFill>
+                <a:schemeClr val="dk1"/>
+              </a:solidFill>
+              <a:latin typeface="Arial"/>
+              <a:ea typeface="Arial"/>
+              <a:cs typeface="Arial"/>
+              <a:sym typeface="Arial"/>
+            </a:endParaRPr>
+          </a:p>
+          <a:p>
+            <a:pPr marL="0" marR="0" lvl="0" indent="0" algn="l" rtl="0">
+              <a:lnSpc>
+                <a:spcPct val="100000"/>
+              </a:lnSpc>
+              <a:spcBef>
+                <a:spcPts val="0"/>
+              </a:spcBef>
+              <a:spcAft>
+                <a:spcPts val="0"/>
+              </a:spcAft>
+              <a:buClr>
+                <a:srgbClr val="000000"/>
+              </a:buClr>
+              <a:buSzPts val="1800"/>
+              <a:buFont typeface="Arial"/>
+              <a:buNone/>
+            </a:pPr>
+            <a:endParaRPr sz="1800" b="0" i="0" u="none" strike="noStrike" cap="none" dirty="0">
+              <a:solidFill>
+                <a:schemeClr val="dk1"/>
+              </a:solidFill>
+              <a:latin typeface="Arial"/>
+              <a:ea typeface="Arial"/>
+              <a:cs typeface="Arial"/>
+              <a:sym typeface="Arial"/>
+            </a:endParaRPr>
+          </a:p>
+          <a:p>
+            <a:pPr marL="0" marR="0" lvl="0" indent="0" algn="l" rtl="0">
+              <a:lnSpc>
+                <a:spcPct val="100000"/>
+              </a:lnSpc>
+              <a:spcBef>
+                <a:spcPts val="0"/>
+              </a:spcBef>
+              <a:spcAft>
+                <a:spcPts val="0"/>
+              </a:spcAft>
+              <a:buClr>
+                <a:srgbClr val="000000"/>
+              </a:buClr>
+              <a:buSzPts val="1800"/>
+              <a:buFont typeface="Arial"/>
+              <a:buNone/>
+            </a:pPr>
+            <a:endParaRPr sz="1800" b="0" i="0" u="none" strike="noStrike" cap="none" dirty="0">
+              <a:solidFill>
+                <a:schemeClr val="dk1"/>
+              </a:solidFill>
+              <a:latin typeface="Arial"/>
+              <a:ea typeface="Arial"/>
+              <a:cs typeface="Arial"/>
+              <a:sym typeface="Arial"/>
+            </a:endParaRPr>
+          </a:p>
+          <a:p>
+            <a:pPr marL="0" marR="0" lvl="0" indent="0" algn="l" rtl="0">
+              <a:lnSpc>
+                <a:spcPct val="100000"/>
+              </a:lnSpc>
+              <a:spcBef>
+                <a:spcPts val="0"/>
+              </a:spcBef>
+              <a:spcAft>
+                <a:spcPts val="0"/>
+              </a:spcAft>
+              <a:buClr>
+                <a:srgbClr val="000000"/>
+              </a:buClr>
+              <a:buSzPts val="1800"/>
+              <a:buFont typeface="Arial"/>
+              <a:buNone/>
+            </a:pPr>
+            <a:endParaRPr sz="1800" b="0" i="0" u="none" strike="noStrike" cap="none" dirty="0">
+              <a:solidFill>
+                <a:schemeClr val="dk1"/>
+              </a:solidFill>
+              <a:latin typeface="Arial"/>
+              <a:ea typeface="Arial"/>
+              <a:cs typeface="Arial"/>
+              <a:sym typeface="Arial"/>
+            </a:endParaRPr>
+          </a:p>
+        </p:txBody>
+      </p:sp>
+      <p:sp>
+        <p:nvSpPr>
+          <p:cNvPr id="2" name="TextBox 1"/>
+          <p:cNvSpPr txBox="1"/>
+          <p:nvPr/>
+        </p:nvSpPr>
+        <p:spPr>
+          <a:xfrm>
+            <a:off x="300791" y="934106"/>
+            <a:ext cx="6718506" cy="4524315"/>
+          </a:xfrm>
+          <a:prstGeom prst="rect">
+            <a:avLst/>
+          </a:prstGeom>
+          <a:noFill/>
+        </p:spPr>
+        <p:txBody>
+          <a:bodyPr wrap="none" rtlCol="0">
+            <a:spAutoFit/>
+          </a:bodyPr>
+          <a:lstStyle/>
+          <a:p>
+            <a:r>
+              <a:rPr lang="en-US" sz="2400" dirty="0"/>
+              <a:t>Open a GNOME Terminal Session in </a:t>
+            </a:r>
+            <a:r>
+              <a:rPr lang="en-US" sz="2400" dirty="0" err="1"/>
+              <a:t>FastX</a:t>
+            </a:r>
+            <a:r>
+              <a:rPr lang="en-US" sz="2400" dirty="0"/>
+              <a:t>.</a:t>
+            </a:r>
+          </a:p>
+          <a:p>
+            <a:endParaRPr lang="en-US" sz="800" dirty="0"/>
+          </a:p>
+          <a:p>
+            <a:r>
+              <a:rPr lang="en-US" sz="2400" dirty="0"/>
+              <a:t>     </a:t>
+            </a:r>
+            <a:r>
+              <a:rPr lang="en-US" sz="2200" dirty="0"/>
+              <a:t>To load packages, type: </a:t>
+            </a:r>
+          </a:p>
+          <a:p>
+            <a:endParaRPr lang="en-US" sz="2200" dirty="0"/>
+          </a:p>
+          <a:p>
+            <a:endParaRPr lang="en-US" sz="2200" dirty="0"/>
+          </a:p>
+          <a:p>
+            <a:endParaRPr lang="en-US" sz="1200" dirty="0"/>
+          </a:p>
+          <a:p>
+            <a:r>
+              <a:rPr lang="en-US" sz="2200" dirty="0"/>
+              <a:t>     To create and launch a </a:t>
+            </a:r>
+            <a:r>
+              <a:rPr lang="en-US" sz="2200" dirty="0" err="1"/>
+              <a:t>conda</a:t>
+            </a:r>
+            <a:r>
+              <a:rPr lang="en-US" sz="2200" dirty="0"/>
+              <a:t> environment, type:</a:t>
+            </a:r>
+          </a:p>
+          <a:p>
+            <a:endParaRPr lang="en-US" sz="2200" dirty="0"/>
+          </a:p>
+          <a:p>
+            <a:endParaRPr lang="en-US" sz="2200" dirty="0"/>
+          </a:p>
+          <a:p>
+            <a:endParaRPr lang="en-US" sz="2200" dirty="0"/>
+          </a:p>
+          <a:p>
+            <a:r>
+              <a:rPr lang="en-US" sz="2200" dirty="0"/>
+              <a:t>     To install libraries, type:</a:t>
+            </a:r>
+          </a:p>
+          <a:p>
+            <a:endParaRPr lang="en-US" sz="2200" dirty="0"/>
+          </a:p>
+          <a:p>
+            <a:endParaRPr lang="en-US" sz="2200" dirty="0"/>
+          </a:p>
+          <a:p>
+            <a:r>
+              <a:rPr lang="en-US" sz="2200" dirty="0"/>
+              <a:t>     To launch a </a:t>
+            </a:r>
+            <a:r>
+              <a:rPr lang="en-US" sz="2200" dirty="0" err="1"/>
+              <a:t>jupyter</a:t>
+            </a:r>
+            <a:r>
+              <a:rPr lang="en-US" sz="2200" dirty="0"/>
+              <a:t> notebook, type:    </a:t>
+            </a:r>
+          </a:p>
+        </p:txBody>
+      </p:sp>
+      <p:sp>
+        <p:nvSpPr>
+          <p:cNvPr id="9" name="Rounded Rectangle 8"/>
+          <p:cNvSpPr/>
+          <p:nvPr/>
+        </p:nvSpPr>
+        <p:spPr>
+          <a:xfrm>
+            <a:off x="1138140" y="1917130"/>
+            <a:ext cx="6778639" cy="736828"/>
+          </a:xfrm>
+          <a:prstGeom prst="roundRect">
+            <a:avLst/>
+          </a:prstGeom>
+          <a:solidFill>
+            <a:schemeClr val="bg1">
+              <a:lumMod val="75000"/>
+              <a:alpha val="30000"/>
+            </a:schemeClr>
+          </a:solidFill>
+          <a:ln>
+            <a:solidFill>
+              <a:schemeClr val="bg1">
+                <a:lumMod val="75000"/>
+              </a:schemeClr>
+            </a:solidFill>
+          </a:ln>
+        </p:spPr>
+        <p:style>
+          <a:lnRef idx="2">
+            <a:schemeClr val="accent1">
+              <a:shade val="50000"/>
+            </a:schemeClr>
+          </a:lnRef>
+          <a:fillRef idx="1">
+            <a:schemeClr val="accent1"/>
+          </a:fillRef>
+          <a:effectRef idx="0">
+            <a:schemeClr val="accent1"/>
+          </a:effectRef>
+          <a:fontRef idx="minor">
+            <a:schemeClr val="lt1"/>
+          </a:fontRef>
+        </p:style>
+        <p:txBody>
+          <a:bodyPr rtlCol="0" anchor="ctr"/>
+          <a:lstStyle/>
+          <a:p>
+            <a:r>
+              <a:rPr lang="en-US" sz="2400" dirty="0">
+                <a:solidFill>
+                  <a:schemeClr val="tx1"/>
+                </a:solidFill>
+                <a:latin typeface="Consolas" charset="0"/>
+                <a:ea typeface="Consolas" charset="0"/>
+                <a:cs typeface="Consolas" charset="0"/>
+              </a:rPr>
+              <a:t>module load python/anaconda3.6</a:t>
+            </a:r>
+          </a:p>
+          <a:p>
+            <a:r>
+              <a:rPr lang="en-US" sz="2400" dirty="0">
+                <a:solidFill>
+                  <a:schemeClr val="tx1"/>
+                </a:solidFill>
+                <a:latin typeface="Consolas" charset="0"/>
+                <a:ea typeface="Consolas" charset="0"/>
+                <a:cs typeface="Consolas" charset="0"/>
+              </a:rPr>
+              <a:t>module load </a:t>
+            </a:r>
+            <a:r>
+              <a:rPr lang="en-US" sz="2400" dirty="0" err="1">
+                <a:solidFill>
+                  <a:schemeClr val="tx1"/>
+                </a:solidFill>
+                <a:latin typeface="Consolas" charset="0"/>
+                <a:ea typeface="Consolas" charset="0"/>
+                <a:cs typeface="Consolas" charset="0"/>
+              </a:rPr>
+              <a:t>firefox</a:t>
+            </a:r>
+            <a:r>
+              <a:rPr lang="en-US" sz="2400" dirty="0">
+                <a:solidFill>
+                  <a:schemeClr val="tx1"/>
+                </a:solidFill>
+                <a:latin typeface="Consolas" charset="0"/>
+                <a:ea typeface="Consolas" charset="0"/>
+                <a:cs typeface="Consolas" charset="0"/>
+              </a:rPr>
+              <a:t>/62</a:t>
+            </a:r>
+          </a:p>
+        </p:txBody>
+      </p:sp>
+      <p:sp>
+        <p:nvSpPr>
+          <p:cNvPr id="10" name="Rounded Rectangle 9"/>
+          <p:cNvSpPr/>
+          <p:nvPr/>
+        </p:nvSpPr>
+        <p:spPr>
+          <a:xfrm>
+            <a:off x="1138140" y="3153282"/>
+            <a:ext cx="6778639" cy="762479"/>
+          </a:xfrm>
+          <a:prstGeom prst="roundRect">
+            <a:avLst/>
+          </a:prstGeom>
+          <a:solidFill>
+            <a:schemeClr val="bg1">
+              <a:lumMod val="75000"/>
+              <a:alpha val="30000"/>
+            </a:schemeClr>
+          </a:solidFill>
+          <a:ln>
+            <a:solidFill>
+              <a:schemeClr val="bg1">
+                <a:lumMod val="75000"/>
+              </a:schemeClr>
+            </a:solidFill>
+          </a:ln>
+        </p:spPr>
+        <p:style>
+          <a:lnRef idx="2">
+            <a:schemeClr val="accent1">
+              <a:shade val="50000"/>
+            </a:schemeClr>
+          </a:lnRef>
+          <a:fillRef idx="1">
+            <a:schemeClr val="accent1"/>
+          </a:fillRef>
+          <a:effectRef idx="0">
+            <a:schemeClr val="accent1"/>
+          </a:effectRef>
+          <a:fontRef idx="minor">
+            <a:schemeClr val="lt1"/>
+          </a:fontRef>
+        </p:style>
+        <p:txBody>
+          <a:bodyPr rtlCol="0" anchor="ctr"/>
+          <a:lstStyle/>
+          <a:p>
+            <a:r>
+              <a:rPr lang="en-US" sz="2400" dirty="0" err="1">
+                <a:solidFill>
+                  <a:schemeClr val="tx1"/>
+                </a:solidFill>
+                <a:latin typeface="Consolas" charset="0"/>
+                <a:ea typeface="Consolas" charset="0"/>
+                <a:cs typeface="Consolas" charset="0"/>
+              </a:rPr>
+              <a:t>conda</a:t>
+            </a:r>
+            <a:r>
+              <a:rPr lang="en-US" sz="2400" dirty="0">
+                <a:solidFill>
+                  <a:schemeClr val="tx1"/>
+                </a:solidFill>
+                <a:latin typeface="Consolas" charset="0"/>
+                <a:ea typeface="Consolas" charset="0"/>
+                <a:cs typeface="Consolas" charset="0"/>
+              </a:rPr>
+              <a:t> create -n </a:t>
+            </a:r>
+            <a:r>
+              <a:rPr lang="en-US" sz="2400" dirty="0" err="1">
+                <a:solidFill>
+                  <a:schemeClr val="tx1"/>
+                </a:solidFill>
+                <a:latin typeface="Consolas" charset="0"/>
+                <a:ea typeface="Consolas" charset="0"/>
+                <a:cs typeface="Consolas" charset="0"/>
+              </a:rPr>
+              <a:t>taxi_env</a:t>
+            </a:r>
+            <a:r>
+              <a:rPr lang="en-US" sz="2400" dirty="0">
+                <a:solidFill>
+                  <a:schemeClr val="tx1"/>
+                </a:solidFill>
+                <a:latin typeface="Consolas" charset="0"/>
+                <a:ea typeface="Consolas" charset="0"/>
+                <a:cs typeface="Consolas" charset="0"/>
+              </a:rPr>
+              <a:t> python=3.6</a:t>
+            </a:r>
+          </a:p>
+          <a:p>
+            <a:r>
+              <a:rPr lang="en-US" sz="2400" dirty="0">
+                <a:solidFill>
+                  <a:schemeClr val="tx1"/>
+                </a:solidFill>
+                <a:latin typeface="Consolas" charset="0"/>
+                <a:ea typeface="Consolas" charset="0"/>
+                <a:cs typeface="Consolas" charset="0"/>
+              </a:rPr>
+              <a:t>source activate </a:t>
+            </a:r>
+            <a:r>
+              <a:rPr lang="en-US" sz="2400" dirty="0" err="1">
+                <a:solidFill>
+                  <a:schemeClr val="tx1"/>
+                </a:solidFill>
+                <a:latin typeface="Consolas" charset="0"/>
+                <a:ea typeface="Consolas" charset="0"/>
+                <a:cs typeface="Consolas" charset="0"/>
+              </a:rPr>
+              <a:t>taxi_env</a:t>
+            </a:r>
+            <a:endParaRPr lang="en-US" sz="2400" dirty="0">
+              <a:solidFill>
+                <a:schemeClr val="tx1"/>
+              </a:solidFill>
+              <a:latin typeface="Consolas" charset="0"/>
+              <a:ea typeface="Consolas" charset="0"/>
+              <a:cs typeface="Consolas" charset="0"/>
+            </a:endParaRPr>
+          </a:p>
+        </p:txBody>
+      </p:sp>
+      <p:sp>
+        <p:nvSpPr>
+          <p:cNvPr id="11" name="Rounded Rectangle 10"/>
+          <p:cNvSpPr/>
+          <p:nvPr/>
+        </p:nvSpPr>
+        <p:spPr>
+          <a:xfrm>
+            <a:off x="1138140" y="4431088"/>
+            <a:ext cx="6778638" cy="418779"/>
+          </a:xfrm>
+          <a:prstGeom prst="roundRect">
+            <a:avLst/>
+          </a:prstGeom>
+          <a:solidFill>
+            <a:schemeClr val="bg1">
+              <a:lumMod val="75000"/>
+              <a:alpha val="30000"/>
+            </a:schemeClr>
+          </a:solidFill>
+          <a:ln>
+            <a:solidFill>
+              <a:schemeClr val="bg1">
+                <a:lumMod val="75000"/>
+              </a:schemeClr>
+            </a:solidFill>
+          </a:ln>
+        </p:spPr>
+        <p:style>
+          <a:lnRef idx="2">
+            <a:schemeClr val="accent1">
+              <a:shade val="50000"/>
+            </a:schemeClr>
+          </a:lnRef>
+          <a:fillRef idx="1">
+            <a:schemeClr val="accent1"/>
+          </a:fillRef>
+          <a:effectRef idx="0">
+            <a:schemeClr val="accent1"/>
+          </a:effectRef>
+          <a:fontRef idx="minor">
+            <a:schemeClr val="lt1"/>
+          </a:fontRef>
+        </p:style>
+        <p:txBody>
+          <a:bodyPr rtlCol="0" anchor="ctr"/>
+          <a:lstStyle/>
+          <a:p>
+            <a:r>
+              <a:rPr lang="en-US" sz="2400" dirty="0" err="1">
+                <a:solidFill>
+                  <a:schemeClr val="tx1"/>
+                </a:solidFill>
+                <a:latin typeface="Consolas" charset="0"/>
+                <a:ea typeface="Consolas" charset="0"/>
+                <a:cs typeface="Consolas" charset="0"/>
+              </a:rPr>
+              <a:t>conda</a:t>
+            </a:r>
+            <a:r>
+              <a:rPr lang="en-US" sz="2400" dirty="0">
+                <a:solidFill>
+                  <a:schemeClr val="tx1"/>
+                </a:solidFill>
+                <a:latin typeface="Consolas" charset="0"/>
+                <a:ea typeface="Consolas" charset="0"/>
+                <a:cs typeface="Consolas" charset="0"/>
+              </a:rPr>
+              <a:t> install -c </a:t>
+            </a:r>
+            <a:r>
+              <a:rPr lang="en-US" sz="2400" dirty="0" err="1">
+                <a:solidFill>
+                  <a:schemeClr val="tx1"/>
+                </a:solidFill>
+                <a:latin typeface="Consolas" charset="0"/>
+                <a:ea typeface="Consolas" charset="0"/>
+                <a:cs typeface="Consolas" charset="0"/>
+              </a:rPr>
+              <a:t>conda</a:t>
+            </a:r>
+            <a:r>
+              <a:rPr lang="en-US" sz="2400" dirty="0">
+                <a:solidFill>
+                  <a:schemeClr val="tx1"/>
+                </a:solidFill>
+                <a:latin typeface="Consolas" charset="0"/>
+                <a:ea typeface="Consolas" charset="0"/>
+                <a:cs typeface="Consolas" charset="0"/>
+              </a:rPr>
+              <a:t>-forge &lt;library&gt;</a:t>
+            </a:r>
+          </a:p>
+        </p:txBody>
+      </p:sp>
+      <p:sp>
+        <p:nvSpPr>
+          <p:cNvPr id="12" name="Rounded Rectangle 11"/>
+          <p:cNvSpPr/>
+          <p:nvPr/>
+        </p:nvSpPr>
+        <p:spPr>
+          <a:xfrm>
+            <a:off x="1138140" y="5512114"/>
+            <a:ext cx="6778637" cy="445631"/>
+          </a:xfrm>
+          <a:prstGeom prst="roundRect">
+            <a:avLst/>
+          </a:prstGeom>
+          <a:solidFill>
+            <a:schemeClr val="bg1">
+              <a:lumMod val="75000"/>
+              <a:alpha val="30000"/>
+            </a:schemeClr>
+          </a:solidFill>
+          <a:ln>
+            <a:solidFill>
+              <a:schemeClr val="bg1">
+                <a:lumMod val="75000"/>
+              </a:schemeClr>
+            </a:solidFill>
+          </a:ln>
+        </p:spPr>
+        <p:style>
+          <a:lnRef idx="2">
+            <a:schemeClr val="accent1">
+              <a:shade val="50000"/>
+            </a:schemeClr>
+          </a:lnRef>
+          <a:fillRef idx="1">
+            <a:schemeClr val="accent1"/>
+          </a:fillRef>
+          <a:effectRef idx="0">
+            <a:schemeClr val="accent1"/>
+          </a:effectRef>
+          <a:fontRef idx="minor">
+            <a:schemeClr val="lt1"/>
+          </a:fontRef>
+        </p:style>
+        <p:txBody>
+          <a:bodyPr rtlCol="0" anchor="ctr"/>
+          <a:lstStyle/>
+          <a:p>
+            <a:r>
+              <a:rPr lang="en-US" sz="2400" dirty="0" err="1">
+                <a:solidFill>
+                  <a:schemeClr val="tx1"/>
+                </a:solidFill>
+                <a:latin typeface="Consolas" charset="0"/>
+                <a:ea typeface="Consolas" charset="0"/>
+                <a:cs typeface="Consolas" charset="0"/>
+              </a:rPr>
+              <a:t>jupyter</a:t>
+            </a:r>
+            <a:r>
+              <a:rPr lang="en-US" sz="2400" dirty="0">
+                <a:solidFill>
+                  <a:schemeClr val="tx1"/>
+                </a:solidFill>
+                <a:latin typeface="Consolas" charset="0"/>
+                <a:ea typeface="Consolas" charset="0"/>
+                <a:cs typeface="Consolas" charset="0"/>
+              </a:rPr>
+              <a:t> notebook --browser=</a:t>
+            </a:r>
+            <a:r>
+              <a:rPr lang="en-US" sz="2400" dirty="0" err="1">
+                <a:solidFill>
+                  <a:schemeClr val="tx1"/>
+                </a:solidFill>
+                <a:latin typeface="Consolas" charset="0"/>
+                <a:ea typeface="Consolas" charset="0"/>
+                <a:cs typeface="Consolas" charset="0"/>
+              </a:rPr>
+              <a:t>firefox</a:t>
+            </a:r>
+            <a:endParaRPr lang="en-US" sz="2400" dirty="0">
+              <a:solidFill>
+                <a:schemeClr val="tx1"/>
+              </a:solidFill>
+              <a:latin typeface="Consolas" charset="0"/>
+              <a:ea typeface="Consolas" charset="0"/>
+              <a:cs typeface="Consolas" charset="0"/>
+            </a:endParaRPr>
+          </a:p>
+        </p:txBody>
+      </p:sp>
+    </p:spTree>
+    <p:extLst>
+      <p:ext uri="{BB962C8B-B14F-4D97-AF65-F5344CB8AC3E}">
+        <p14:creationId xmlns:p14="http://schemas.microsoft.com/office/powerpoint/2010/main" val="472956744"/>
+      </p:ext>
+    </p:extLst>
+  </p:cSld>
+  <p:clrMapOvr>
+    <a:masterClrMapping/>
+  </p:clrMapOvr>
+</p:sld>
+</file>
+
+<file path=ppt/slides/slide11.xml><?xml version="1.0" encoding="utf-8"?>
+<p:sld xmlns:a="http://schemas.openxmlformats.org/drawingml/2006/main" xmlns:r="http://schemas.openxmlformats.org/officeDocument/2006/relationships" xmlns:p="http://schemas.openxmlformats.org/presentationml/2006/main">
+  <p:cSld>
+    <p:spTree>
+      <p:nvGrpSpPr>
         <p:cNvPr id="1" name=""/>
         <p:cNvGrpSpPr/>
         <p:nvPr/>
@@ -9129,7 +10081,7 @@
           <p:cNvPr id="2" name="Title 1">
             <a:extLst>
               <a:ext uri="{FF2B5EF4-FFF2-40B4-BE49-F238E27FC236}">
-                <a16:creationId xmlns:a16="http://schemas.microsoft.com/office/drawing/2014/main" xmlns="" id="{F81768C4-73F8-6A4A-A317-EB5B1641540B}"/>
+                <a16:creationId xmlns:a16="http://schemas.microsoft.com/office/drawing/2014/main" id="{F81768C4-73F8-6A4A-A317-EB5B1641540B}"/>
               </a:ext>
             </a:extLst>
           </p:cNvPr>
@@ -9157,7 +10109,7 @@
           <p:cNvPr id="3" name="Text Placeholder 2">
             <a:extLst>
               <a:ext uri="{FF2B5EF4-FFF2-40B4-BE49-F238E27FC236}">
-                <a16:creationId xmlns:a16="http://schemas.microsoft.com/office/drawing/2014/main" xmlns="" id="{1BFA1603-DCEA-8849-8DEA-0610C87DACAB}"/>
+                <a16:creationId xmlns:a16="http://schemas.microsoft.com/office/drawing/2014/main" id="{1BFA1603-DCEA-8849-8DEA-0610C87DACAB}"/>
               </a:ext>
             </a:extLst>
           </p:cNvPr>
@@ -9252,7 +10204,7 @@
           <p:cNvPr id="4" name="Slide Number Placeholder 3">
             <a:extLst>
               <a:ext uri="{FF2B5EF4-FFF2-40B4-BE49-F238E27FC236}">
-                <a16:creationId xmlns:a16="http://schemas.microsoft.com/office/drawing/2014/main" xmlns="" id="{1797D19B-1123-F743-82A8-27C8B8B5DEEC}"/>
+                <a16:creationId xmlns:a16="http://schemas.microsoft.com/office/drawing/2014/main" id="{1797D19B-1123-F743-82A8-27C8B8B5DEEC}"/>
               </a:ext>
             </a:extLst>
           </p:cNvPr>
@@ -9279,7 +10231,7 @@
             </a:pPr>
             <a:fld id="{00000000-1234-1234-1234-123412341234}" type="slidenum">
               <a:rPr lang="en-US" smtClean="0"/>
-              <a:t>10</a:t>
+              <a:t>11</a:t>
             </a:fld>
             <a:endParaRPr lang="en-US"/>
           </a:p>
@@ -10528,33 +11480,17 @@
                   <a:schemeClr val="tx1"/>
                 </a:solidFill>
               </a:rPr>
-              <a:t>Login to a terminal window in KLC </a:t>
+              <a:t>Login to a terminal window in KLC and </a:t>
             </a:r>
-            <a:r>
-              <a:rPr lang="en-US" sz="2800" b="0" dirty="0" smtClean="0">
-                <a:solidFill>
-                  <a:schemeClr val="tx1"/>
-                </a:solidFill>
-              </a:rPr>
-              <a:t>and </a:t>
-            </a:r>
-          </a:p>
-          <a:p>
-            <a:r>
-              <a:rPr lang="en-US" sz="2800" b="0" dirty="0" smtClean="0">
-                <a:solidFill>
-                  <a:schemeClr val="tx1"/>
-                </a:solidFill>
-              </a:rPr>
-              <a:t>run </a:t>
-            </a:r>
+          </a:p>
+          <a:p>
             <a:r>
               <a:rPr lang="en-US" sz="2800" b="0" dirty="0">
                 <a:solidFill>
                   <a:schemeClr val="tx1"/>
                 </a:solidFill>
               </a:rPr>
-              <a:t>this:</a:t>
+              <a:t>run this:</a:t>
             </a:r>
           </a:p>
           <a:p>
@@ -10616,7 +11552,7 @@
           <a:p>
             <a:pPr algn="ctr"/>
             <a:r>
-              <a:rPr lang="en-US" sz="2800" b="1" dirty="0" smtClean="0">
+              <a:rPr lang="en-US" sz="2800" b="1" dirty="0">
                 <a:solidFill>
                   <a:sysClr val="windowText" lastClr="000000"/>
                 </a:solidFill>
@@ -10627,7 +11563,7 @@
               <a:t>source /</a:t>
             </a:r>
             <a:r>
-              <a:rPr lang="en-US" sz="2800" b="1" dirty="0" err="1" smtClean="0">
+              <a:rPr lang="en-US" sz="2800" b="1" dirty="0" err="1">
                 <a:solidFill>
                   <a:sysClr val="windowText" lastClr="000000"/>
                 </a:solidFill>
@@ -10638,7 +11574,7 @@
               <a:t>kellogg</a:t>
             </a:r>
             <a:r>
-              <a:rPr lang="en-US" sz="2800" b="1" dirty="0" smtClean="0">
+              <a:rPr lang="en-US" sz="2800" b="1" dirty="0">
                 <a:solidFill>
                   <a:sysClr val="windowText" lastClr="000000"/>
                 </a:solidFill>
@@ -10649,7 +11585,7 @@
               <a:t>/bin/</a:t>
             </a:r>
             <a:r>
-              <a:rPr lang="en-US" sz="2800" b="1" dirty="0" err="1" smtClean="0">
+              <a:rPr lang="en-US" sz="2800" b="1" dirty="0" err="1">
                 <a:solidFill>
                   <a:sysClr val="windowText" lastClr="000000"/>
                 </a:solidFill>
@@ -10660,18 +11596,13 @@
               <a:t>freetds_config</a:t>
             </a:r>
             <a:r>
-              <a:rPr lang="en-US" sz="2800" dirty="0" smtClean="0">
+              <a:rPr lang="en-US" sz="2800" dirty="0">
                 <a:latin typeface="Consolas" charset="0"/>
                 <a:ea typeface="Consolas" charset="0"/>
                 <a:cs typeface="Consolas" charset="0"/>
               </a:rPr>
               <a:t> </a:t>
             </a:r>
-            <a:endParaRPr lang="en-US" sz="2800" dirty="0">
-              <a:latin typeface="Consolas" charset="0"/>
-              <a:ea typeface="Consolas" charset="0"/>
-              <a:cs typeface="Consolas" charset="0"/>
-            </a:endParaRPr>
           </a:p>
         </p:txBody>
       </p:sp>
@@ -10705,12 +11636,138 @@
           <a:chExt cx="0" cy="0"/>
         </a:xfrm>
       </p:grpSpPr>
+      <p:sp>
+        <p:nvSpPr>
+          <p:cNvPr id="2" name="Title 1">
+            <a:extLst>
+              <a:ext uri="{FF2B5EF4-FFF2-40B4-BE49-F238E27FC236}">
+                <a16:creationId xmlns:a16="http://schemas.microsoft.com/office/drawing/2014/main" id="{3A9E6A75-DABA-2D47-AE99-F10FABF7B473}"/>
+              </a:ext>
+            </a:extLst>
+          </p:cNvPr>
+          <p:cNvSpPr>
+            <a:spLocks noGrp="1"/>
+          </p:cNvSpPr>
+          <p:nvPr>
+            <p:ph type="title"/>
+          </p:nvPr>
+        </p:nvSpPr>
+        <p:spPr/>
+        <p:txBody>
+          <a:bodyPr/>
+          <a:lstStyle/>
+          <a:p>
+            <a:r>
+              <a:rPr lang="en-US" dirty="0"/>
+              <a:t>Relational Data</a:t>
+            </a:r>
+          </a:p>
+        </p:txBody>
+      </p:sp>
+      <p:sp>
+        <p:nvSpPr>
+          <p:cNvPr id="4" name="Slide Number Placeholder 3">
+            <a:extLst>
+              <a:ext uri="{FF2B5EF4-FFF2-40B4-BE49-F238E27FC236}">
+                <a16:creationId xmlns:a16="http://schemas.microsoft.com/office/drawing/2014/main" id="{9D13C036-7F2F-254F-86B5-0183070AFFB5}"/>
+              </a:ext>
+            </a:extLst>
+          </p:cNvPr>
+          <p:cNvSpPr>
+            <a:spLocks noGrp="1"/>
+          </p:cNvSpPr>
+          <p:nvPr>
+            <p:ph type="sldNum" idx="12"/>
+          </p:nvPr>
+        </p:nvSpPr>
+        <p:spPr/>
+        <p:txBody>
+          <a:bodyPr/>
+          <a:lstStyle/>
+          <a:p>
+            <a:pPr marL="0" lvl="0" indent="0" algn="r" rtl="0">
+              <a:spcBef>
+                <a:spcPts val="0"/>
+              </a:spcBef>
+              <a:spcAft>
+                <a:spcPts val="0"/>
+              </a:spcAft>
+              <a:buNone/>
+            </a:pPr>
+            <a:fld id="{00000000-1234-1234-1234-123412341234}" type="slidenum">
+              <a:rPr lang="en-US" smtClean="0"/>
+              <a:t>4</a:t>
+            </a:fld>
+            <a:endParaRPr lang="en-US"/>
+          </a:p>
+        </p:txBody>
+      </p:sp>
       <p:pic>
         <p:nvPicPr>
           <p:cNvPr id="6" name="Picture 5">
             <a:extLst>
               <a:ext uri="{FF2B5EF4-FFF2-40B4-BE49-F238E27FC236}">
-                <a16:creationId xmlns:a16="http://schemas.microsoft.com/office/drawing/2014/main" xmlns="" id="{85DD4E90-BFD8-8C4B-AE28-0B0A2B0E6221}"/>
+                <a16:creationId xmlns:a16="http://schemas.microsoft.com/office/drawing/2014/main" id="{AFCFB0D3-4C2F-D948-922E-F547F82B632D}"/>
+              </a:ext>
+            </a:extLst>
+          </p:cNvPr>
+          <p:cNvPicPr>
+            <a:picLocks noChangeAspect="1"/>
+          </p:cNvPicPr>
+          <p:nvPr/>
+        </p:nvPicPr>
+        <p:blipFill>
+          <a:blip r:embed="rId2"/>
+          <a:stretch>
+            <a:fillRect/>
+          </a:stretch>
+        </p:blipFill>
+        <p:spPr>
+          <a:xfrm>
+            <a:off x="1682885" y="1780907"/>
+            <a:ext cx="5656224" cy="3617945"/>
+          </a:xfrm>
+          <a:prstGeom prst="rect">
+            <a:avLst/>
+          </a:prstGeom>
+        </p:spPr>
+      </p:pic>
+    </p:spTree>
+    <p:extLst>
+      <p:ext uri="{BB962C8B-B14F-4D97-AF65-F5344CB8AC3E}">
+        <p14:creationId xmlns:p14="http://schemas.microsoft.com/office/powerpoint/2010/main" val="1053801009"/>
+      </p:ext>
+    </p:extLst>
+  </p:cSld>
+  <p:clrMapOvr>
+    <a:masterClrMapping/>
+  </p:clrMapOvr>
+</p:sld>
+</file>
+
+<file path=ppt/slides/slide5.xml><?xml version="1.0" encoding="utf-8"?>
+<p:sld xmlns:a="http://schemas.openxmlformats.org/drawingml/2006/main" xmlns:r="http://schemas.openxmlformats.org/officeDocument/2006/relationships" xmlns:p="http://schemas.openxmlformats.org/presentationml/2006/main">
+  <p:cSld>
+    <p:spTree>
+      <p:nvGrpSpPr>
+        <p:cNvPr id="1" name=""/>
+        <p:cNvGrpSpPr/>
+        <p:nvPr/>
+      </p:nvGrpSpPr>
+      <p:grpSpPr>
+        <a:xfrm>
+          <a:off x="0" y="0"/>
+          <a:ext cx="0" cy="0"/>
+          <a:chOff x="0" y="0"/>
+          <a:chExt cx="0" cy="0"/>
+        </a:xfrm>
+      </p:grpSpPr>
+      <p:pic>
+        <p:nvPicPr>
+          <p:cNvPr id="6" name="Picture 5">
+            <a:extLst>
+              <a:ext uri="{FF2B5EF4-FFF2-40B4-BE49-F238E27FC236}">
+                <a16:creationId xmlns:a16="http://schemas.microsoft.com/office/drawing/2014/main" id="{85DD4E90-BFD8-8C4B-AE28-0B0A2B0E6221}"/>
               </a:ext>
             </a:extLst>
           </p:cNvPr>
@@ -10740,7 +11797,7 @@
           <p:cNvPr id="2" name="Title 1">
             <a:extLst>
               <a:ext uri="{FF2B5EF4-FFF2-40B4-BE49-F238E27FC236}">
-                <a16:creationId xmlns:a16="http://schemas.microsoft.com/office/drawing/2014/main" xmlns="" id="{3231CCAE-EDAD-ED44-A117-17551DAB9099}"/>
+                <a16:creationId xmlns:a16="http://schemas.microsoft.com/office/drawing/2014/main" id="{3231CCAE-EDAD-ED44-A117-17551DAB9099}"/>
               </a:ext>
             </a:extLst>
           </p:cNvPr>
@@ -10768,7 +11825,7 @@
           <p:cNvPr id="4" name="Slide Number Placeholder 3">
             <a:extLst>
               <a:ext uri="{FF2B5EF4-FFF2-40B4-BE49-F238E27FC236}">
-                <a16:creationId xmlns:a16="http://schemas.microsoft.com/office/drawing/2014/main" xmlns="" id="{5BE68C99-AA75-AF44-A030-479B977B13EA}"/>
+                <a16:creationId xmlns:a16="http://schemas.microsoft.com/office/drawing/2014/main" id="{5BE68C99-AA75-AF44-A030-479B977B13EA}"/>
               </a:ext>
             </a:extLst>
           </p:cNvPr>
@@ -10795,7 +11852,7 @@
             </a:pPr>
             <a:fld id="{00000000-1234-1234-1234-123412341234}" type="slidenum">
               <a:rPr lang="en-US" smtClean="0"/>
-              <a:t>4</a:t>
+              <a:t>5</a:t>
             </a:fld>
             <a:endParaRPr lang="en-US"/>
           </a:p>
@@ -10806,7 +11863,7 @@
           <p:cNvPr id="8" name="Picture 7">
             <a:extLst>
               <a:ext uri="{FF2B5EF4-FFF2-40B4-BE49-F238E27FC236}">
-                <a16:creationId xmlns:a16="http://schemas.microsoft.com/office/drawing/2014/main" xmlns="" id="{5B356315-19FB-7F4C-BEB6-68FEC4EAAF53}"/>
+                <a16:creationId xmlns:a16="http://schemas.microsoft.com/office/drawing/2014/main" id="{5B356315-19FB-7F4C-BEB6-68FEC4EAAF53}"/>
               </a:ext>
             </a:extLst>
           </p:cNvPr>
@@ -10836,7 +11893,7 @@
           <p:cNvPr id="10" name="Picture 9">
             <a:extLst>
               <a:ext uri="{FF2B5EF4-FFF2-40B4-BE49-F238E27FC236}">
-                <a16:creationId xmlns:a16="http://schemas.microsoft.com/office/drawing/2014/main" xmlns="" id="{40434ABE-A508-5146-9CA6-0FB21568C3DA}"/>
+                <a16:creationId xmlns:a16="http://schemas.microsoft.com/office/drawing/2014/main" id="{40434ABE-A508-5146-9CA6-0FB21568C3DA}"/>
               </a:ext>
             </a:extLst>
           </p:cNvPr>
@@ -10874,7 +11931,7 @@
 </p:sld>
 </file>
 
-<file path=ppt/slides/slide5.xml><?xml version="1.0" encoding="utf-8"?>
+<file path=ppt/slides/slide6.xml><?xml version="1.0" encoding="utf-8"?>
 <p:sld xmlns:a="http://schemas.openxmlformats.org/drawingml/2006/main" xmlns:r="http://schemas.openxmlformats.org/officeDocument/2006/relationships" xmlns:p="http://schemas.openxmlformats.org/presentationml/2006/main">
   <p:cSld>
     <p:spTree>
@@ -10896,7 +11953,7 @@
           <p:cNvPr id="6" name="Picture 5">
             <a:extLst>
               <a:ext uri="{FF2B5EF4-FFF2-40B4-BE49-F238E27FC236}">
-                <a16:creationId xmlns:a16="http://schemas.microsoft.com/office/drawing/2014/main" xmlns="" id="{E38C544A-1EC7-8949-A94D-DD54E4002389}"/>
+                <a16:creationId xmlns:a16="http://schemas.microsoft.com/office/drawing/2014/main" id="{E38C544A-1EC7-8949-A94D-DD54E4002389}"/>
               </a:ext>
             </a:extLst>
           </p:cNvPr>
@@ -10926,7 +11983,7 @@
           <p:cNvPr id="2" name="Title 1">
             <a:extLst>
               <a:ext uri="{FF2B5EF4-FFF2-40B4-BE49-F238E27FC236}">
-                <a16:creationId xmlns:a16="http://schemas.microsoft.com/office/drawing/2014/main" xmlns="" id="{0AC27225-756B-C544-B2F6-7B300A50B66A}"/>
+                <a16:creationId xmlns:a16="http://schemas.microsoft.com/office/drawing/2014/main" id="{0AC27225-756B-C544-B2F6-7B300A50B66A}"/>
               </a:ext>
             </a:extLst>
           </p:cNvPr>
@@ -10954,7 +12011,7 @@
           <p:cNvPr id="4" name="Slide Number Placeholder 3">
             <a:extLst>
               <a:ext uri="{FF2B5EF4-FFF2-40B4-BE49-F238E27FC236}">
-                <a16:creationId xmlns:a16="http://schemas.microsoft.com/office/drawing/2014/main" xmlns="" id="{0B48D5AE-3077-6E4D-AA83-C53143C3F52F}"/>
+                <a16:creationId xmlns:a16="http://schemas.microsoft.com/office/drawing/2014/main" id="{0B48D5AE-3077-6E4D-AA83-C53143C3F52F}"/>
               </a:ext>
             </a:extLst>
           </p:cNvPr>
@@ -10981,7 +12038,7 @@
             </a:pPr>
             <a:fld id="{00000000-1234-1234-1234-123412341234}" type="slidenum">
               <a:rPr lang="en-US" smtClean="0"/>
-              <a:t>5</a:t>
+              <a:t>6</a:t>
             </a:fld>
             <a:endParaRPr lang="en-US"/>
           </a:p>
@@ -10992,7 +12049,7 @@
           <p:cNvPr id="13" name="Group 12">
             <a:extLst>
               <a:ext uri="{FF2B5EF4-FFF2-40B4-BE49-F238E27FC236}">
-                <a16:creationId xmlns:a16="http://schemas.microsoft.com/office/drawing/2014/main" xmlns="" id="{C564CCFA-E52C-A346-8C66-683A1CC68962}"/>
+                <a16:creationId xmlns:a16="http://schemas.microsoft.com/office/drawing/2014/main" id="{C564CCFA-E52C-A346-8C66-683A1CC68962}"/>
               </a:ext>
             </a:extLst>
           </p:cNvPr>
@@ -11012,7 +12069,7 @@
             <p:cNvPr id="5" name="Straight Arrow Connector 4">
               <a:extLst>
                 <a:ext uri="{FF2B5EF4-FFF2-40B4-BE49-F238E27FC236}">
-                  <a16:creationId xmlns:a16="http://schemas.microsoft.com/office/drawing/2014/main" xmlns="" id="{DAC3C724-A715-3544-974C-5E8F547A9EA6}"/>
+                  <a16:creationId xmlns:a16="http://schemas.microsoft.com/office/drawing/2014/main" id="{DAC3C724-A715-3544-974C-5E8F547A9EA6}"/>
                 </a:ext>
               </a:extLst>
             </p:cNvPr>
@@ -11051,7 +12108,7 @@
             <p:cNvPr id="7" name="Straight Arrow Connector 6">
               <a:extLst>
                 <a:ext uri="{FF2B5EF4-FFF2-40B4-BE49-F238E27FC236}">
-                  <a16:creationId xmlns:a16="http://schemas.microsoft.com/office/drawing/2014/main" xmlns="" id="{072367CF-C92D-814F-9A06-5B90E3403967}"/>
+                  <a16:creationId xmlns:a16="http://schemas.microsoft.com/office/drawing/2014/main" id="{072367CF-C92D-814F-9A06-5B90E3403967}"/>
                 </a:ext>
               </a:extLst>
             </p:cNvPr>
@@ -11090,7 +12147,7 @@
             <p:cNvPr id="8" name="Straight Arrow Connector 7">
               <a:extLst>
                 <a:ext uri="{FF2B5EF4-FFF2-40B4-BE49-F238E27FC236}">
-                  <a16:creationId xmlns:a16="http://schemas.microsoft.com/office/drawing/2014/main" xmlns="" id="{1CD74A1F-9570-E64D-9208-C854091557BA}"/>
+                  <a16:creationId xmlns:a16="http://schemas.microsoft.com/office/drawing/2014/main" id="{1CD74A1F-9570-E64D-9208-C854091557BA}"/>
                 </a:ext>
               </a:extLst>
             </p:cNvPr>
@@ -11129,7 +12186,7 @@
             <p:cNvPr id="10" name="Straight Arrow Connector 9">
               <a:extLst>
                 <a:ext uri="{FF2B5EF4-FFF2-40B4-BE49-F238E27FC236}">
-                  <a16:creationId xmlns:a16="http://schemas.microsoft.com/office/drawing/2014/main" xmlns="" id="{6F61C4AD-A653-A147-A28A-36C85F67DFB7}"/>
+                  <a16:creationId xmlns:a16="http://schemas.microsoft.com/office/drawing/2014/main" id="{6F61C4AD-A653-A147-A28A-36C85F67DFB7}"/>
                 </a:ext>
               </a:extLst>
             </p:cNvPr>
@@ -11254,7 +12311,7 @@
 </p:sld>
 </file>
 
-<file path=ppt/slides/slide6.xml><?xml version="1.0" encoding="utf-8"?>
+<file path=ppt/slides/slide7.xml><?xml version="1.0" encoding="utf-8"?>
 <p:sld xmlns:a="http://schemas.openxmlformats.org/drawingml/2006/main" xmlns:r="http://schemas.openxmlformats.org/officeDocument/2006/relationships" xmlns:p="http://schemas.openxmlformats.org/presentationml/2006/main">
   <p:cSld>
     <p:spTree>
@@ -11276,7 +12333,7 @@
           <p:cNvPr id="10" name="Picture 9">
             <a:extLst>
               <a:ext uri="{FF2B5EF4-FFF2-40B4-BE49-F238E27FC236}">
-                <a16:creationId xmlns:a16="http://schemas.microsoft.com/office/drawing/2014/main" xmlns="" id="{B59421FA-5E1C-AB4E-BDFB-A61CCA455BC8}"/>
+                <a16:creationId xmlns:a16="http://schemas.microsoft.com/office/drawing/2014/main" id="{B59421FA-5E1C-AB4E-BDFB-A61CCA455BC8}"/>
               </a:ext>
             </a:extLst>
           </p:cNvPr>
@@ -11306,7 +12363,7 @@
           <p:cNvPr id="2" name="Title 1">
             <a:extLst>
               <a:ext uri="{FF2B5EF4-FFF2-40B4-BE49-F238E27FC236}">
-                <a16:creationId xmlns:a16="http://schemas.microsoft.com/office/drawing/2014/main" xmlns="" id="{3231CCAE-EDAD-ED44-A117-17551DAB9099}"/>
+                <a16:creationId xmlns:a16="http://schemas.microsoft.com/office/drawing/2014/main" id="{3231CCAE-EDAD-ED44-A117-17551DAB9099}"/>
               </a:ext>
             </a:extLst>
           </p:cNvPr>
@@ -11334,7 +12391,7 @@
           <p:cNvPr id="4" name="Slide Number Placeholder 3">
             <a:extLst>
               <a:ext uri="{FF2B5EF4-FFF2-40B4-BE49-F238E27FC236}">
-                <a16:creationId xmlns:a16="http://schemas.microsoft.com/office/drawing/2014/main" xmlns="" id="{5BE68C99-AA75-AF44-A030-479B977B13EA}"/>
+                <a16:creationId xmlns:a16="http://schemas.microsoft.com/office/drawing/2014/main" id="{5BE68C99-AA75-AF44-A030-479B977B13EA}"/>
               </a:ext>
             </a:extLst>
           </p:cNvPr>
@@ -11361,7 +12418,7 @@
             </a:pPr>
             <a:fld id="{00000000-1234-1234-1234-123412341234}" type="slidenum">
               <a:rPr lang="en-US" smtClean="0"/>
-              <a:t>6</a:t>
+              <a:t>7</a:t>
             </a:fld>
             <a:endParaRPr lang="en-US"/>
           </a:p>
@@ -11372,7 +12429,7 @@
           <p:cNvPr id="6" name="Rectangle 5">
             <a:extLst>
               <a:ext uri="{FF2B5EF4-FFF2-40B4-BE49-F238E27FC236}">
-                <a16:creationId xmlns:a16="http://schemas.microsoft.com/office/drawing/2014/main" xmlns="" id="{A9CD5B1F-5041-5C4E-AD7B-06D88C15B1F0}"/>
+                <a16:creationId xmlns:a16="http://schemas.microsoft.com/office/drawing/2014/main" id="{A9CD5B1F-5041-5C4E-AD7B-06D88C15B1F0}"/>
               </a:ext>
             </a:extLst>
           </p:cNvPr>
@@ -11424,7 +12481,7 @@
           <p:cNvPr id="7" name="Rectangle 6">
             <a:extLst>
               <a:ext uri="{FF2B5EF4-FFF2-40B4-BE49-F238E27FC236}">
-                <a16:creationId xmlns:a16="http://schemas.microsoft.com/office/drawing/2014/main" xmlns="" id="{A49705B6-025E-2342-B461-9026CAFFA5C1}"/>
+                <a16:creationId xmlns:a16="http://schemas.microsoft.com/office/drawing/2014/main" id="{A49705B6-025E-2342-B461-9026CAFFA5C1}"/>
               </a:ext>
             </a:extLst>
           </p:cNvPr>
@@ -11476,7 +12533,7 @@
           <p:cNvPr id="8" name="Rectangle 7">
             <a:extLst>
               <a:ext uri="{FF2B5EF4-FFF2-40B4-BE49-F238E27FC236}">
-                <a16:creationId xmlns:a16="http://schemas.microsoft.com/office/drawing/2014/main" xmlns="" id="{92354EC8-4D28-C143-9D00-CCAB4482F085}"/>
+                <a16:creationId xmlns:a16="http://schemas.microsoft.com/office/drawing/2014/main" id="{92354EC8-4D28-C143-9D00-CCAB4482F085}"/>
               </a:ext>
             </a:extLst>
           </p:cNvPr>
@@ -11528,7 +12585,7 @@
           <p:cNvPr id="11" name="Rectangle 10">
             <a:extLst>
               <a:ext uri="{FF2B5EF4-FFF2-40B4-BE49-F238E27FC236}">
-                <a16:creationId xmlns:a16="http://schemas.microsoft.com/office/drawing/2014/main" xmlns="" id="{63361A69-5FC2-0741-9491-A56EA7A6126A}"/>
+                <a16:creationId xmlns:a16="http://schemas.microsoft.com/office/drawing/2014/main" id="{63361A69-5FC2-0741-9491-A56EA7A6126A}"/>
               </a:ext>
             </a:extLst>
           </p:cNvPr>
@@ -11580,7 +12637,7 @@
           <p:cNvPr id="12" name="Rectangle 11">
             <a:extLst>
               <a:ext uri="{FF2B5EF4-FFF2-40B4-BE49-F238E27FC236}">
-                <a16:creationId xmlns:a16="http://schemas.microsoft.com/office/drawing/2014/main" xmlns="" id="{C162E5CC-2CB5-8F43-96A6-57379BE9D932}"/>
+                <a16:creationId xmlns:a16="http://schemas.microsoft.com/office/drawing/2014/main" id="{C162E5CC-2CB5-8F43-96A6-57379BE9D932}"/>
               </a:ext>
             </a:extLst>
           </p:cNvPr>
@@ -11902,7 +12959,7 @@
 </p:sld>
 </file>
 
-<file path=ppt/slides/slide7.xml><?xml version="1.0" encoding="utf-8"?>
+<file path=ppt/slides/slide8.xml><?xml version="1.0" encoding="utf-8"?>
 <p:sld xmlns:a="http://schemas.openxmlformats.org/drawingml/2006/main" xmlns:r="http://schemas.openxmlformats.org/officeDocument/2006/relationships" xmlns:p="http://schemas.openxmlformats.org/presentationml/2006/main">
   <p:cSld>
     <p:spTree>
@@ -11924,7 +12981,7 @@
           <p:cNvPr id="2" name="Title 1">
             <a:extLst>
               <a:ext uri="{FF2B5EF4-FFF2-40B4-BE49-F238E27FC236}">
-                <a16:creationId xmlns:a16="http://schemas.microsoft.com/office/drawing/2014/main" xmlns="" id="{C180F631-E2AB-5540-A5F8-E73E6941606E}"/>
+                <a16:creationId xmlns:a16="http://schemas.microsoft.com/office/drawing/2014/main" id="{C180F631-E2AB-5540-A5F8-E73E6941606E}"/>
               </a:ext>
             </a:extLst>
           </p:cNvPr>
@@ -11952,7 +13009,7 @@
           <p:cNvPr id="3" name="Text Placeholder 2">
             <a:extLst>
               <a:ext uri="{FF2B5EF4-FFF2-40B4-BE49-F238E27FC236}">
-                <a16:creationId xmlns:a16="http://schemas.microsoft.com/office/drawing/2014/main" xmlns="" id="{44DA4C25-BE59-CE47-8638-3119AD6B9C6B}"/>
+                <a16:creationId xmlns:a16="http://schemas.microsoft.com/office/drawing/2014/main" id="{44DA4C25-BE59-CE47-8638-3119AD6B9C6B}"/>
               </a:ext>
             </a:extLst>
           </p:cNvPr>
@@ -11988,7 +13045,7 @@
           <p:cNvPr id="4" name="Slide Number Placeholder 3">
             <a:extLst>
               <a:ext uri="{FF2B5EF4-FFF2-40B4-BE49-F238E27FC236}">
-                <a16:creationId xmlns:a16="http://schemas.microsoft.com/office/drawing/2014/main" xmlns="" id="{65EF4254-8407-9348-8B09-FA8D0BB7FD98}"/>
+                <a16:creationId xmlns:a16="http://schemas.microsoft.com/office/drawing/2014/main" id="{65EF4254-8407-9348-8B09-FA8D0BB7FD98}"/>
               </a:ext>
             </a:extLst>
           </p:cNvPr>
@@ -12015,7 +13072,7 @@
             </a:pPr>
             <a:fld id="{00000000-1234-1234-1234-123412341234}" type="slidenum">
               <a:rPr lang="en-US" smtClean="0"/>
-              <a:t>7</a:t>
+              <a:t>8</a:t>
             </a:fld>
             <a:endParaRPr lang="en-US"/>
           </a:p>
@@ -12026,7 +13083,7 @@
           <p:cNvPr id="6" name="Picture 5">
             <a:extLst>
               <a:ext uri="{FF2B5EF4-FFF2-40B4-BE49-F238E27FC236}">
-                <a16:creationId xmlns:a16="http://schemas.microsoft.com/office/drawing/2014/main" xmlns="" id="{8E9F0A9F-27DD-B64E-860E-3EBEB80B7D88}"/>
+                <a16:creationId xmlns:a16="http://schemas.microsoft.com/office/drawing/2014/main" id="{8E9F0A9F-27DD-B64E-860E-3EBEB80B7D88}"/>
               </a:ext>
             </a:extLst>
           </p:cNvPr>
@@ -12064,7 +13121,7 @@
 </p:sld>
 </file>
 
-<file path=ppt/slides/slide8.xml><?xml version="1.0" encoding="utf-8"?>
+<file path=ppt/slides/slide9.xml><?xml version="1.0" encoding="utf-8"?>
 <p:sld xmlns:a="http://schemas.openxmlformats.org/drawingml/2006/main" xmlns:r="http://schemas.openxmlformats.org/officeDocument/2006/relationships" xmlns:p="http://schemas.openxmlformats.org/presentationml/2006/main">
   <p:cSld>
     <p:spTree>
@@ -12128,7 +13185,7 @@
               <a:buNone/>
             </a:pPr>
             <a:r>
-              <a:rPr lang="en-US" dirty="0" smtClean="0"/>
+              <a:rPr lang="en-US" dirty="0"/>
               <a:t>ODBC Connection in STATA</a:t>
             </a:r>
             <a:endParaRPr dirty="0"/>
@@ -12179,7 +13236,7 @@
             </a:pPr>
             <a:fld id="{00000000-1234-1234-1234-123412341234}" type="slidenum">
               <a:rPr lang="en-US"/>
-              <a:t>8</a:t>
+              <a:t>9</a:t>
             </a:fld>
             <a:endParaRPr/>
           </a:p>
@@ -12514,21 +13571,21 @@
           <a:lstStyle/>
           <a:p>
             <a:r>
-              <a:rPr lang="en-US" sz="2400" dirty="0" smtClean="0"/>
+              <a:rPr lang="en-US" sz="2400" dirty="0"/>
               <a:t>Open a GNOME Terminal Session in </a:t>
             </a:r>
             <a:r>
-              <a:rPr lang="en-US" sz="2400" dirty="0" err="1" smtClean="0"/>
+              <a:rPr lang="en-US" sz="2400" dirty="0" err="1"/>
               <a:t>FastX</a:t>
             </a:r>
             <a:r>
-              <a:rPr lang="en-US" sz="2400" dirty="0" smtClean="0"/>
+              <a:rPr lang="en-US" sz="2400" dirty="0"/>
               <a:t> and type the </a:t>
             </a:r>
           </a:p>
           <a:p>
             <a:r>
-              <a:rPr lang="en-US" sz="2400" dirty="0" smtClean="0"/>
+              <a:rPr lang="en-US" sz="2400" dirty="0"/>
               <a:t>following:</a:t>
             </a:r>
           </a:p>
@@ -12538,31 +13595,26 @@
           <a:p>
             <a:r>
               <a:rPr lang="en-US" sz="2400" dirty="0"/>
-              <a:t> </a:t>
+              <a:t>    To connect to the ODBC driver, type: </a:t>
             </a:r>
+          </a:p>
+          <a:p>
+            <a:endParaRPr lang="en-US" sz="2400" dirty="0"/>
+          </a:p>
+          <a:p>
+            <a:endParaRPr lang="en-US" sz="2400" dirty="0"/>
+          </a:p>
+          <a:p>
+            <a:endParaRPr lang="en-US" sz="2400" dirty="0"/>
+          </a:p>
+          <a:p>
+            <a:endParaRPr lang="en-US" sz="2400" dirty="0"/>
+          </a:p>
+          <a:p>
             <a:r>
-              <a:rPr lang="en-US" sz="2400" dirty="0" smtClean="0"/>
-              <a:t>   To connect to the ODBC driver, type: </a:t>
-            </a:r>
-          </a:p>
-          <a:p>
-            <a:endParaRPr lang="en-US" sz="2400" dirty="0"/>
-          </a:p>
-          <a:p>
-            <a:endParaRPr lang="en-US" sz="2400" dirty="0" smtClean="0"/>
-          </a:p>
-          <a:p>
-            <a:endParaRPr lang="en-US" sz="2400" dirty="0"/>
-          </a:p>
-          <a:p>
-            <a:endParaRPr lang="en-US" sz="2400" dirty="0" smtClean="0"/>
-          </a:p>
-          <a:p>
-            <a:r>
-              <a:rPr lang="en-US" sz="2400" dirty="0" smtClean="0"/>
+              <a:rPr lang="en-US" sz="2400" dirty="0"/>
               <a:t>    To load and launch STATA 15, type: </a:t>
             </a:r>
-            <a:endParaRPr lang="en-US" sz="2400" dirty="0"/>
           </a:p>
         </p:txBody>
       </p:sp>
@@ -12637,7 +13689,7 @@
               <a:t>odbc</a:t>
             </a:r>
             <a:r>
-              <a:rPr lang="en-US" sz="2800" dirty="0" smtClean="0">
+              <a:rPr lang="en-US" sz="2800" dirty="0">
                 <a:solidFill>
                   <a:schemeClr val="tx1"/>
                 </a:solidFill>
@@ -12647,14 +13699,6 @@
               </a:rPr>
               <a:t>/</a:t>
             </a:r>
-            <a:endParaRPr lang="en-US" sz="2800" dirty="0">
-              <a:solidFill>
-                <a:schemeClr val="tx1"/>
-              </a:solidFill>
-              <a:latin typeface="Consolas" charset="0"/>
-              <a:ea typeface="Consolas" charset="0"/>
-              <a:cs typeface="Consolas" charset="0"/>
-            </a:endParaRPr>
           </a:p>
         </p:txBody>
       </p:sp>
@@ -12707,7 +13751,7 @@
           <a:lstStyle/>
           <a:p>
             <a:r>
-              <a:rPr lang="en-US" sz="2800" dirty="0" smtClean="0">
+              <a:rPr lang="en-US" sz="2800" dirty="0">
                 <a:solidFill>
                   <a:schemeClr val="tx1"/>
                 </a:solidFill>
@@ -12715,18 +13759,7 @@
                 <a:ea typeface="Consolas" charset="0"/>
                 <a:cs typeface="Consolas" charset="0"/>
               </a:rPr>
-              <a:t>module </a:t>
-            </a:r>
-            <a:r>
-              <a:rPr lang="en-US" sz="2800" dirty="0">
-                <a:solidFill>
-                  <a:schemeClr val="tx1"/>
-                </a:solidFill>
-                <a:latin typeface="Consolas" charset="0"/>
-                <a:ea typeface="Consolas" charset="0"/>
-                <a:cs typeface="Consolas" charset="0"/>
-              </a:rPr>
-              <a:t>load </a:t>
+              <a:t>module load </a:t>
             </a:r>
             <a:r>
               <a:rPr lang="en-US" sz="2800" dirty="0" err="1">
@@ -12777,1039 +13810,6 @@
   <p:clrMapOvr>
     <a:masterClrMapping/>
   </p:clrMapOvr>
-  <p:timing>
-    <p:tnLst>
-      <p:par>
-        <p:cTn id="1" dur="indefinite" restart="never" nodeType="tmRoot"/>
-      </p:par>
-    </p:tnLst>
-  </p:timing>
-</p:sld>
-</file>
-
-<file path=ppt/slides/slide9.xml><?xml version="1.0" encoding="utf-8"?>
-<p:sld xmlns:a="http://schemas.openxmlformats.org/drawingml/2006/main" xmlns:r="http://schemas.openxmlformats.org/officeDocument/2006/relationships" xmlns:p="http://schemas.openxmlformats.org/presentationml/2006/main">
-  <p:cSld>
-    <p:spTree>
-      <p:nvGrpSpPr>
-        <p:cNvPr id="1" name="Shape 56"/>
-        <p:cNvGrpSpPr/>
-        <p:nvPr/>
-      </p:nvGrpSpPr>
-      <p:grpSpPr>
-        <a:xfrm>
-          <a:off x="0" y="0"/>
-          <a:ext cx="0" cy="0"/>
-          <a:chOff x="0" y="0"/>
-          <a:chExt cx="0" cy="0"/>
-        </a:xfrm>
-      </p:grpSpPr>
-      <p:sp>
-        <p:nvSpPr>
-          <p:cNvPr id="57" name="Google Shape;57;p9"/>
-          <p:cNvSpPr txBox="1">
-            <a:spLocks noGrp="1"/>
-          </p:cNvSpPr>
-          <p:nvPr>
-            <p:ph type="title"/>
-          </p:nvPr>
-        </p:nvSpPr>
-        <p:spPr>
-          <a:xfrm>
-            <a:off x="457200" y="0"/>
-            <a:ext cx="8229600" cy="1143000"/>
-          </a:xfrm>
-          <a:prstGeom prst="rect">
-            <a:avLst/>
-          </a:prstGeom>
-          <a:noFill/>
-          <a:ln>
-            <a:noFill/>
-          </a:ln>
-        </p:spPr>
-        <p:txBody>
-          <a:bodyPr spcFirstLastPara="1" wrap="square" lIns="91425" tIns="45700" rIns="91425" bIns="45700" anchor="ctr" anchorCtr="0">
-            <a:noAutofit/>
-          </a:bodyPr>
-          <a:lstStyle/>
-          <a:p>
-            <a:pPr marL="0" lvl="0" indent="0" algn="l" rtl="0">
-              <a:lnSpc>
-                <a:spcPct val="100000"/>
-              </a:lnSpc>
-              <a:spcBef>
-                <a:spcPts val="0"/>
-              </a:spcBef>
-              <a:spcAft>
-                <a:spcPts val="0"/>
-              </a:spcAft>
-              <a:buClr>
-                <a:srgbClr val="3D146F"/>
-              </a:buClr>
-              <a:buSzPts val="3200"/>
-              <a:buFont typeface="Arial"/>
-              <a:buNone/>
-            </a:pPr>
-            <a:r>
-              <a:rPr lang="en-US" dirty="0" smtClean="0"/>
-              <a:t>ODBC Connection in Python</a:t>
-            </a:r>
-            <a:endParaRPr dirty="0"/>
-          </a:p>
-        </p:txBody>
-      </p:sp>
-      <p:sp>
-        <p:nvSpPr>
-          <p:cNvPr id="59" name="Google Shape;59;p9"/>
-          <p:cNvSpPr txBox="1">
-            <a:spLocks noGrp="1"/>
-          </p:cNvSpPr>
-          <p:nvPr>
-            <p:ph type="sldNum" idx="12"/>
-          </p:nvPr>
-        </p:nvSpPr>
-        <p:spPr>
-          <a:xfrm>
-            <a:off x="8686800" y="6506896"/>
-            <a:ext cx="416244" cy="365125"/>
-          </a:xfrm>
-          <a:prstGeom prst="rect">
-            <a:avLst/>
-          </a:prstGeom>
-          <a:noFill/>
-          <a:ln>
-            <a:noFill/>
-          </a:ln>
-        </p:spPr>
-        <p:txBody>
-          <a:bodyPr spcFirstLastPara="1" wrap="square" lIns="91425" tIns="45700" rIns="91425" bIns="45700" anchor="ctr" anchorCtr="0">
-            <a:noAutofit/>
-          </a:bodyPr>
-          <a:lstStyle/>
-          <a:p>
-            <a:pPr marL="0" lvl="0" indent="0" algn="r" rtl="0">
-              <a:lnSpc>
-                <a:spcPct val="100000"/>
-              </a:lnSpc>
-              <a:spcBef>
-                <a:spcPts val="0"/>
-              </a:spcBef>
-              <a:spcAft>
-                <a:spcPts val="0"/>
-              </a:spcAft>
-              <a:buSzPts val="1000"/>
-              <a:buNone/>
-            </a:pPr>
-            <a:fld id="{00000000-1234-1234-1234-123412341234}" type="slidenum">
-              <a:rPr lang="en-US"/>
-              <a:t>9</a:t>
-            </a:fld>
-            <a:endParaRPr/>
-          </a:p>
-        </p:txBody>
-      </p:sp>
-      <p:sp>
-        <p:nvSpPr>
-          <p:cNvPr id="6" name="Google Shape;60;p9"/>
-          <p:cNvSpPr txBox="1"/>
-          <p:nvPr/>
-        </p:nvSpPr>
-        <p:spPr>
-          <a:xfrm>
-            <a:off x="457200" y="1231900"/>
-            <a:ext cx="8541000" cy="4599600"/>
-          </a:xfrm>
-          <a:prstGeom prst="rect">
-            <a:avLst/>
-          </a:prstGeom>
-          <a:noFill/>
-          <a:ln>
-            <a:noFill/>
-          </a:ln>
-        </p:spPr>
-        <p:txBody>
-          <a:bodyPr spcFirstLastPara="1" wrap="square" lIns="91425" tIns="45700" rIns="91425" bIns="45700" anchor="t" anchorCtr="0">
-            <a:noAutofit/>
-          </a:bodyPr>
-          <a:lstStyle/>
-          <a:p>
-            <a:pPr marL="742950" marR="0" lvl="1" indent="-171450" algn="l" rtl="0">
-              <a:lnSpc>
-                <a:spcPct val="100000"/>
-              </a:lnSpc>
-              <a:spcBef>
-                <a:spcPts val="0"/>
-              </a:spcBef>
-              <a:spcAft>
-                <a:spcPts val="0"/>
-              </a:spcAft>
-              <a:buClr>
-                <a:schemeClr val="dk1"/>
-              </a:buClr>
-              <a:buSzPts val="1800"/>
-              <a:buFont typeface="Courier New"/>
-              <a:buNone/>
-            </a:pPr>
-            <a:endParaRPr sz="1800" b="0" i="0" u="none" strike="noStrike" cap="none" dirty="0">
-              <a:solidFill>
-                <a:schemeClr val="dk1"/>
-              </a:solidFill>
-              <a:latin typeface="Arial"/>
-              <a:ea typeface="Arial"/>
-              <a:cs typeface="Arial"/>
-              <a:sym typeface="Arial"/>
-            </a:endParaRPr>
-          </a:p>
-          <a:p>
-            <a:pPr marL="457200" marR="0" lvl="1" indent="0" algn="l" rtl="0">
-              <a:lnSpc>
-                <a:spcPct val="100000"/>
-              </a:lnSpc>
-              <a:spcBef>
-                <a:spcPts val="0"/>
-              </a:spcBef>
-              <a:spcAft>
-                <a:spcPts val="0"/>
-              </a:spcAft>
-              <a:buClr>
-                <a:srgbClr val="000000"/>
-              </a:buClr>
-              <a:buSzPts val="1800"/>
-              <a:buFont typeface="Arial"/>
-              <a:buNone/>
-            </a:pPr>
-            <a:endParaRPr sz="1800" b="0" i="0" u="none" strike="noStrike" cap="none" dirty="0">
-              <a:solidFill>
-                <a:schemeClr val="dk1"/>
-              </a:solidFill>
-              <a:latin typeface="Arial"/>
-              <a:ea typeface="Arial"/>
-              <a:cs typeface="Arial"/>
-              <a:sym typeface="Arial"/>
-            </a:endParaRPr>
-          </a:p>
-          <a:p>
-            <a:pPr marL="0" marR="0" lvl="0" indent="0" algn="l" rtl="0">
-              <a:lnSpc>
-                <a:spcPct val="100000"/>
-              </a:lnSpc>
-              <a:spcBef>
-                <a:spcPts val="0"/>
-              </a:spcBef>
-              <a:spcAft>
-                <a:spcPts val="0"/>
-              </a:spcAft>
-              <a:buClr>
-                <a:srgbClr val="000000"/>
-              </a:buClr>
-              <a:buSzPts val="1800"/>
-              <a:buFont typeface="Arial"/>
-              <a:buNone/>
-            </a:pPr>
-            <a:endParaRPr sz="1800" b="0" i="0" u="none" strike="noStrike" cap="none" dirty="0">
-              <a:solidFill>
-                <a:schemeClr val="dk1"/>
-              </a:solidFill>
-              <a:latin typeface="Arial"/>
-              <a:ea typeface="Arial"/>
-              <a:cs typeface="Arial"/>
-              <a:sym typeface="Arial"/>
-            </a:endParaRPr>
-          </a:p>
-          <a:p>
-            <a:pPr marL="0" marR="0" lvl="0" indent="0" algn="l" rtl="0">
-              <a:lnSpc>
-                <a:spcPct val="100000"/>
-              </a:lnSpc>
-              <a:spcBef>
-                <a:spcPts val="0"/>
-              </a:spcBef>
-              <a:spcAft>
-                <a:spcPts val="0"/>
-              </a:spcAft>
-              <a:buClr>
-                <a:srgbClr val="000000"/>
-              </a:buClr>
-              <a:buSzPts val="1800"/>
-              <a:buFont typeface="Arial"/>
-              <a:buNone/>
-            </a:pPr>
-            <a:endParaRPr sz="1800" b="0" i="0" u="none" strike="noStrike" cap="none" dirty="0">
-              <a:solidFill>
-                <a:schemeClr val="dk1"/>
-              </a:solidFill>
-              <a:latin typeface="Arial"/>
-              <a:ea typeface="Arial"/>
-              <a:cs typeface="Arial"/>
-              <a:sym typeface="Arial"/>
-            </a:endParaRPr>
-          </a:p>
-          <a:p>
-            <a:pPr marL="0" marR="0" lvl="0" indent="0" algn="l" rtl="0">
-              <a:lnSpc>
-                <a:spcPct val="100000"/>
-              </a:lnSpc>
-              <a:spcBef>
-                <a:spcPts val="0"/>
-              </a:spcBef>
-              <a:spcAft>
-                <a:spcPts val="0"/>
-              </a:spcAft>
-              <a:buClr>
-                <a:srgbClr val="000000"/>
-              </a:buClr>
-              <a:buSzPts val="1800"/>
-              <a:buFont typeface="Arial"/>
-              <a:buNone/>
-            </a:pPr>
-            <a:endParaRPr sz="1800" b="0" i="0" u="none" strike="noStrike" cap="none" dirty="0">
-              <a:solidFill>
-                <a:schemeClr val="dk1"/>
-              </a:solidFill>
-              <a:latin typeface="Arial"/>
-              <a:ea typeface="Arial"/>
-              <a:cs typeface="Arial"/>
-              <a:sym typeface="Arial"/>
-            </a:endParaRPr>
-          </a:p>
-          <a:p>
-            <a:pPr marL="0" marR="0" lvl="0" indent="0" algn="l" rtl="0">
-              <a:lnSpc>
-                <a:spcPct val="100000"/>
-              </a:lnSpc>
-              <a:spcBef>
-                <a:spcPts val="0"/>
-              </a:spcBef>
-              <a:spcAft>
-                <a:spcPts val="0"/>
-              </a:spcAft>
-              <a:buClr>
-                <a:srgbClr val="000000"/>
-              </a:buClr>
-              <a:buSzPts val="1800"/>
-              <a:buFont typeface="Arial"/>
-              <a:buNone/>
-            </a:pPr>
-            <a:endParaRPr sz="1800" b="0" i="0" u="none" strike="noStrike" cap="none" dirty="0">
-              <a:solidFill>
-                <a:schemeClr val="dk1"/>
-              </a:solidFill>
-              <a:latin typeface="Arial"/>
-              <a:ea typeface="Arial"/>
-              <a:cs typeface="Arial"/>
-              <a:sym typeface="Arial"/>
-            </a:endParaRPr>
-          </a:p>
-          <a:p>
-            <a:pPr marL="0" marR="0" lvl="0" indent="0" algn="l" rtl="0">
-              <a:lnSpc>
-                <a:spcPct val="100000"/>
-              </a:lnSpc>
-              <a:spcBef>
-                <a:spcPts val="0"/>
-              </a:spcBef>
-              <a:spcAft>
-                <a:spcPts val="0"/>
-              </a:spcAft>
-              <a:buClr>
-                <a:srgbClr val="000000"/>
-              </a:buClr>
-              <a:buSzPts val="1800"/>
-              <a:buFont typeface="Arial"/>
-              <a:buNone/>
-            </a:pPr>
-            <a:endParaRPr sz="1800" b="0" i="0" u="none" strike="noStrike" cap="none" dirty="0">
-              <a:solidFill>
-                <a:schemeClr val="dk1"/>
-              </a:solidFill>
-              <a:latin typeface="Arial"/>
-              <a:ea typeface="Arial"/>
-              <a:cs typeface="Arial"/>
-              <a:sym typeface="Arial"/>
-            </a:endParaRPr>
-          </a:p>
-          <a:p>
-            <a:pPr marL="0" marR="0" lvl="0" indent="0" algn="l" rtl="0">
-              <a:lnSpc>
-                <a:spcPct val="100000"/>
-              </a:lnSpc>
-              <a:spcBef>
-                <a:spcPts val="0"/>
-              </a:spcBef>
-              <a:spcAft>
-                <a:spcPts val="0"/>
-              </a:spcAft>
-              <a:buClr>
-                <a:srgbClr val="000000"/>
-              </a:buClr>
-              <a:buSzPts val="1800"/>
-              <a:buFont typeface="Arial"/>
-              <a:buNone/>
-            </a:pPr>
-            <a:endParaRPr sz="1800" b="0" i="0" u="none" strike="noStrike" cap="none" dirty="0">
-              <a:solidFill>
-                <a:schemeClr val="dk1"/>
-              </a:solidFill>
-              <a:latin typeface="Arial"/>
-              <a:ea typeface="Arial"/>
-              <a:cs typeface="Arial"/>
-              <a:sym typeface="Arial"/>
-            </a:endParaRPr>
-          </a:p>
-          <a:p>
-            <a:pPr marL="0" marR="0" lvl="0" indent="0" algn="l" rtl="0">
-              <a:lnSpc>
-                <a:spcPct val="100000"/>
-              </a:lnSpc>
-              <a:spcBef>
-                <a:spcPts val="0"/>
-              </a:spcBef>
-              <a:spcAft>
-                <a:spcPts val="0"/>
-              </a:spcAft>
-              <a:buClr>
-                <a:srgbClr val="000000"/>
-              </a:buClr>
-              <a:buSzPts val="1800"/>
-              <a:buFont typeface="Arial"/>
-              <a:buNone/>
-            </a:pPr>
-            <a:endParaRPr sz="1800" b="0" i="0" u="none" strike="noStrike" cap="none" dirty="0">
-              <a:solidFill>
-                <a:schemeClr val="dk1"/>
-              </a:solidFill>
-              <a:latin typeface="Arial"/>
-              <a:ea typeface="Arial"/>
-              <a:cs typeface="Arial"/>
-              <a:sym typeface="Arial"/>
-            </a:endParaRPr>
-          </a:p>
-          <a:p>
-            <a:pPr marL="0" marR="0" lvl="0" indent="0" algn="l" rtl="0">
-              <a:lnSpc>
-                <a:spcPct val="100000"/>
-              </a:lnSpc>
-              <a:spcBef>
-                <a:spcPts val="0"/>
-              </a:spcBef>
-              <a:spcAft>
-                <a:spcPts val="0"/>
-              </a:spcAft>
-              <a:buClr>
-                <a:srgbClr val="000000"/>
-              </a:buClr>
-              <a:buSzPts val="1800"/>
-              <a:buFont typeface="Arial"/>
-              <a:buNone/>
-            </a:pPr>
-            <a:endParaRPr sz="1800" b="0" i="0" u="none" strike="noStrike" cap="none" dirty="0">
-              <a:solidFill>
-                <a:schemeClr val="dk1"/>
-              </a:solidFill>
-              <a:latin typeface="Arial"/>
-              <a:ea typeface="Arial"/>
-              <a:cs typeface="Arial"/>
-              <a:sym typeface="Arial"/>
-            </a:endParaRPr>
-          </a:p>
-        </p:txBody>
-      </p:sp>
-      <p:sp>
-        <p:nvSpPr>
-          <p:cNvPr id="2" name="TextBox 1"/>
-          <p:cNvSpPr txBox="1"/>
-          <p:nvPr/>
-        </p:nvSpPr>
-        <p:spPr>
-          <a:xfrm>
-            <a:off x="300791" y="934106"/>
-            <a:ext cx="6718506" cy="4524315"/>
-          </a:xfrm>
-          <a:prstGeom prst="rect">
-            <a:avLst/>
-          </a:prstGeom>
-          <a:noFill/>
-        </p:spPr>
-        <p:txBody>
-          <a:bodyPr wrap="none" rtlCol="0">
-            <a:spAutoFit/>
-          </a:bodyPr>
-          <a:lstStyle/>
-          <a:p>
-            <a:r>
-              <a:rPr lang="en-US" sz="2400" dirty="0" smtClean="0"/>
-              <a:t>Open a GNOME Terminal Session in </a:t>
-            </a:r>
-            <a:r>
-              <a:rPr lang="en-US" sz="2400" dirty="0" err="1" smtClean="0"/>
-              <a:t>FastX</a:t>
-            </a:r>
-            <a:r>
-              <a:rPr lang="en-US" sz="2400" dirty="0" smtClean="0"/>
-              <a:t>.</a:t>
-            </a:r>
-          </a:p>
-          <a:p>
-            <a:endParaRPr lang="en-US" sz="800" dirty="0"/>
-          </a:p>
-          <a:p>
-            <a:r>
-              <a:rPr lang="en-US" sz="2400" dirty="0" smtClean="0"/>
-              <a:t>     </a:t>
-            </a:r>
-            <a:r>
-              <a:rPr lang="en-US" sz="2200" dirty="0" smtClean="0"/>
-              <a:t>To load packages, type: </a:t>
-            </a:r>
-          </a:p>
-          <a:p>
-            <a:endParaRPr lang="en-US" sz="2200" dirty="0" smtClean="0"/>
-          </a:p>
-          <a:p>
-            <a:endParaRPr lang="en-US" sz="2200" dirty="0"/>
-          </a:p>
-          <a:p>
-            <a:endParaRPr lang="en-US" sz="1200" dirty="0" smtClean="0"/>
-          </a:p>
-          <a:p>
-            <a:r>
-              <a:rPr lang="en-US" sz="2200" dirty="0" smtClean="0"/>
-              <a:t>     To create and launch a </a:t>
-            </a:r>
-            <a:r>
-              <a:rPr lang="en-US" sz="2200" dirty="0" err="1" smtClean="0"/>
-              <a:t>conda</a:t>
-            </a:r>
-            <a:r>
-              <a:rPr lang="en-US" sz="2200" dirty="0" smtClean="0"/>
-              <a:t> environment, type:</a:t>
-            </a:r>
-          </a:p>
-          <a:p>
-            <a:endParaRPr lang="en-US" sz="2200" dirty="0" smtClean="0"/>
-          </a:p>
-          <a:p>
-            <a:endParaRPr lang="en-US" sz="2200" dirty="0" smtClean="0"/>
-          </a:p>
-          <a:p>
-            <a:endParaRPr lang="en-US" sz="2200" dirty="0" smtClean="0"/>
-          </a:p>
-          <a:p>
-            <a:r>
-              <a:rPr lang="en-US" sz="2200" dirty="0" smtClean="0"/>
-              <a:t>     To install libraries, type:</a:t>
-            </a:r>
-          </a:p>
-          <a:p>
-            <a:endParaRPr lang="en-US" sz="2200" dirty="0" smtClean="0"/>
-          </a:p>
-          <a:p>
-            <a:endParaRPr lang="en-US" sz="2200" dirty="0" smtClean="0"/>
-          </a:p>
-          <a:p>
-            <a:r>
-              <a:rPr lang="en-US" sz="2200" dirty="0" smtClean="0"/>
-              <a:t>     To launch a </a:t>
-            </a:r>
-            <a:r>
-              <a:rPr lang="en-US" sz="2200" dirty="0" err="1" smtClean="0"/>
-              <a:t>jupyter</a:t>
-            </a:r>
-            <a:r>
-              <a:rPr lang="en-US" sz="2200" dirty="0" smtClean="0"/>
-              <a:t> notebook, type:    </a:t>
-            </a:r>
-          </a:p>
-        </p:txBody>
-      </p:sp>
-      <p:sp>
-        <p:nvSpPr>
-          <p:cNvPr id="9" name="Rounded Rectangle 8"/>
-          <p:cNvSpPr/>
-          <p:nvPr/>
-        </p:nvSpPr>
-        <p:spPr>
-          <a:xfrm>
-            <a:off x="1138140" y="1917130"/>
-            <a:ext cx="6778639" cy="736828"/>
-          </a:xfrm>
-          <a:prstGeom prst="roundRect">
-            <a:avLst/>
-          </a:prstGeom>
-          <a:solidFill>
-            <a:schemeClr val="bg1">
-              <a:lumMod val="75000"/>
-              <a:alpha val="30000"/>
-            </a:schemeClr>
-          </a:solidFill>
-          <a:ln>
-            <a:solidFill>
-              <a:schemeClr val="bg1">
-                <a:lumMod val="75000"/>
-              </a:schemeClr>
-            </a:solidFill>
-          </a:ln>
-        </p:spPr>
-        <p:style>
-          <a:lnRef idx="2">
-            <a:schemeClr val="accent1">
-              <a:shade val="50000"/>
-            </a:schemeClr>
-          </a:lnRef>
-          <a:fillRef idx="1">
-            <a:schemeClr val="accent1"/>
-          </a:fillRef>
-          <a:effectRef idx="0">
-            <a:schemeClr val="accent1"/>
-          </a:effectRef>
-          <a:fontRef idx="minor">
-            <a:schemeClr val="lt1"/>
-          </a:fontRef>
-        </p:style>
-        <p:txBody>
-          <a:bodyPr rtlCol="0" anchor="ctr"/>
-          <a:lstStyle/>
-          <a:p>
-            <a:r>
-              <a:rPr lang="en-US" sz="2400" dirty="0">
-                <a:solidFill>
-                  <a:schemeClr val="tx1"/>
-                </a:solidFill>
-                <a:latin typeface="Consolas" charset="0"/>
-                <a:ea typeface="Consolas" charset="0"/>
-                <a:cs typeface="Consolas" charset="0"/>
-              </a:rPr>
-              <a:t>module load python/anaconda3.6</a:t>
-            </a:r>
-          </a:p>
-          <a:p>
-            <a:r>
-              <a:rPr lang="en-US" sz="2400" dirty="0">
-                <a:solidFill>
-                  <a:schemeClr val="tx1"/>
-                </a:solidFill>
-                <a:latin typeface="Consolas" charset="0"/>
-                <a:ea typeface="Consolas" charset="0"/>
-                <a:cs typeface="Consolas" charset="0"/>
-              </a:rPr>
-              <a:t>module load </a:t>
-            </a:r>
-            <a:r>
-              <a:rPr lang="en-US" sz="2400" dirty="0" err="1" smtClean="0">
-                <a:solidFill>
-                  <a:schemeClr val="tx1"/>
-                </a:solidFill>
-                <a:latin typeface="Consolas" charset="0"/>
-                <a:ea typeface="Consolas" charset="0"/>
-                <a:cs typeface="Consolas" charset="0"/>
-              </a:rPr>
-              <a:t>firefox</a:t>
-            </a:r>
-            <a:r>
-              <a:rPr lang="en-US" sz="2400" dirty="0" smtClean="0">
-                <a:solidFill>
-                  <a:schemeClr val="tx1"/>
-                </a:solidFill>
-                <a:latin typeface="Consolas" charset="0"/>
-                <a:ea typeface="Consolas" charset="0"/>
-                <a:cs typeface="Consolas" charset="0"/>
-              </a:rPr>
-              <a:t>/62</a:t>
-            </a:r>
-            <a:endParaRPr lang="en-US" sz="2400" dirty="0">
-              <a:solidFill>
-                <a:schemeClr val="tx1"/>
-              </a:solidFill>
-              <a:latin typeface="Consolas" charset="0"/>
-              <a:ea typeface="Consolas" charset="0"/>
-              <a:cs typeface="Consolas" charset="0"/>
-            </a:endParaRPr>
-          </a:p>
-        </p:txBody>
-      </p:sp>
-      <p:sp>
-        <p:nvSpPr>
-          <p:cNvPr id="10" name="Rounded Rectangle 9"/>
-          <p:cNvSpPr/>
-          <p:nvPr/>
-        </p:nvSpPr>
-        <p:spPr>
-          <a:xfrm>
-            <a:off x="1138140" y="3153282"/>
-            <a:ext cx="6778639" cy="762479"/>
-          </a:xfrm>
-          <a:prstGeom prst="roundRect">
-            <a:avLst/>
-          </a:prstGeom>
-          <a:solidFill>
-            <a:schemeClr val="bg1">
-              <a:lumMod val="75000"/>
-              <a:alpha val="30000"/>
-            </a:schemeClr>
-          </a:solidFill>
-          <a:ln>
-            <a:solidFill>
-              <a:schemeClr val="bg1">
-                <a:lumMod val="75000"/>
-              </a:schemeClr>
-            </a:solidFill>
-          </a:ln>
-        </p:spPr>
-        <p:style>
-          <a:lnRef idx="2">
-            <a:schemeClr val="accent1">
-              <a:shade val="50000"/>
-            </a:schemeClr>
-          </a:lnRef>
-          <a:fillRef idx="1">
-            <a:schemeClr val="accent1"/>
-          </a:fillRef>
-          <a:effectRef idx="0">
-            <a:schemeClr val="accent1"/>
-          </a:effectRef>
-          <a:fontRef idx="minor">
-            <a:schemeClr val="lt1"/>
-          </a:fontRef>
-        </p:style>
-        <p:txBody>
-          <a:bodyPr rtlCol="0" anchor="ctr"/>
-          <a:lstStyle/>
-          <a:p>
-            <a:r>
-              <a:rPr lang="en-US" sz="2400" dirty="0" err="1" smtClean="0">
-                <a:solidFill>
-                  <a:schemeClr val="tx1"/>
-                </a:solidFill>
-                <a:latin typeface="Consolas" charset="0"/>
-                <a:ea typeface="Consolas" charset="0"/>
-                <a:cs typeface="Consolas" charset="0"/>
-              </a:rPr>
-              <a:t>conda</a:t>
-            </a:r>
-            <a:r>
-              <a:rPr lang="en-US" sz="2400" dirty="0" smtClean="0">
-                <a:solidFill>
-                  <a:schemeClr val="tx1"/>
-                </a:solidFill>
-                <a:latin typeface="Consolas" charset="0"/>
-                <a:ea typeface="Consolas" charset="0"/>
-                <a:cs typeface="Consolas" charset="0"/>
-              </a:rPr>
-              <a:t> </a:t>
-            </a:r>
-            <a:r>
-              <a:rPr lang="en-US" sz="2400" dirty="0">
-                <a:solidFill>
-                  <a:schemeClr val="tx1"/>
-                </a:solidFill>
-                <a:latin typeface="Consolas" charset="0"/>
-                <a:ea typeface="Consolas" charset="0"/>
-                <a:cs typeface="Consolas" charset="0"/>
-              </a:rPr>
-              <a:t>create -n </a:t>
-            </a:r>
-            <a:r>
-              <a:rPr lang="en-US" sz="2400" dirty="0" err="1">
-                <a:solidFill>
-                  <a:schemeClr val="tx1"/>
-                </a:solidFill>
-                <a:latin typeface="Consolas" charset="0"/>
-                <a:ea typeface="Consolas" charset="0"/>
-                <a:cs typeface="Consolas" charset="0"/>
-              </a:rPr>
-              <a:t>taxi_env</a:t>
-            </a:r>
-            <a:r>
-              <a:rPr lang="en-US" sz="2400" dirty="0">
-                <a:solidFill>
-                  <a:schemeClr val="tx1"/>
-                </a:solidFill>
-                <a:latin typeface="Consolas" charset="0"/>
-                <a:ea typeface="Consolas" charset="0"/>
-                <a:cs typeface="Consolas" charset="0"/>
-              </a:rPr>
-              <a:t> python=3.6</a:t>
-            </a:r>
-          </a:p>
-          <a:p>
-            <a:r>
-              <a:rPr lang="en-US" sz="2400" dirty="0" smtClean="0">
-                <a:solidFill>
-                  <a:schemeClr val="tx1"/>
-                </a:solidFill>
-                <a:latin typeface="Consolas" charset="0"/>
-                <a:ea typeface="Consolas" charset="0"/>
-                <a:cs typeface="Consolas" charset="0"/>
-              </a:rPr>
-              <a:t>source activate </a:t>
-            </a:r>
-            <a:r>
-              <a:rPr lang="en-US" sz="2400" dirty="0" err="1" smtClean="0">
-                <a:solidFill>
-                  <a:schemeClr val="tx1"/>
-                </a:solidFill>
-                <a:latin typeface="Consolas" charset="0"/>
-                <a:ea typeface="Consolas" charset="0"/>
-                <a:cs typeface="Consolas" charset="0"/>
-              </a:rPr>
-              <a:t>taxi_env</a:t>
-            </a:r>
-            <a:endParaRPr lang="en-US" sz="2400" dirty="0">
-              <a:solidFill>
-                <a:schemeClr val="tx1"/>
-              </a:solidFill>
-              <a:latin typeface="Consolas" charset="0"/>
-              <a:ea typeface="Consolas" charset="0"/>
-              <a:cs typeface="Consolas" charset="0"/>
-            </a:endParaRPr>
-          </a:p>
-        </p:txBody>
-      </p:sp>
-      <p:sp>
-        <p:nvSpPr>
-          <p:cNvPr id="11" name="Rounded Rectangle 10"/>
-          <p:cNvSpPr/>
-          <p:nvPr/>
-        </p:nvSpPr>
-        <p:spPr>
-          <a:xfrm>
-            <a:off x="1138140" y="4431088"/>
-            <a:ext cx="6778638" cy="418779"/>
-          </a:xfrm>
-          <a:prstGeom prst="roundRect">
-            <a:avLst/>
-          </a:prstGeom>
-          <a:solidFill>
-            <a:schemeClr val="bg1">
-              <a:lumMod val="75000"/>
-              <a:alpha val="30000"/>
-            </a:schemeClr>
-          </a:solidFill>
-          <a:ln>
-            <a:solidFill>
-              <a:schemeClr val="bg1">
-                <a:lumMod val="75000"/>
-              </a:schemeClr>
-            </a:solidFill>
-          </a:ln>
-        </p:spPr>
-        <p:style>
-          <a:lnRef idx="2">
-            <a:schemeClr val="accent1">
-              <a:shade val="50000"/>
-            </a:schemeClr>
-          </a:lnRef>
-          <a:fillRef idx="1">
-            <a:schemeClr val="accent1"/>
-          </a:fillRef>
-          <a:effectRef idx="0">
-            <a:schemeClr val="accent1"/>
-          </a:effectRef>
-          <a:fontRef idx="minor">
-            <a:schemeClr val="lt1"/>
-          </a:fontRef>
-        </p:style>
-        <p:txBody>
-          <a:bodyPr rtlCol="0" anchor="ctr"/>
-          <a:lstStyle/>
-          <a:p>
-            <a:r>
-              <a:rPr lang="en-US" sz="2400" dirty="0" err="1" smtClean="0">
-                <a:solidFill>
-                  <a:schemeClr val="tx1"/>
-                </a:solidFill>
-                <a:latin typeface="Consolas" charset="0"/>
-                <a:ea typeface="Consolas" charset="0"/>
-                <a:cs typeface="Consolas" charset="0"/>
-              </a:rPr>
-              <a:t>conda</a:t>
-            </a:r>
-            <a:r>
-              <a:rPr lang="en-US" sz="2400" dirty="0" smtClean="0">
-                <a:solidFill>
-                  <a:schemeClr val="tx1"/>
-                </a:solidFill>
-                <a:latin typeface="Consolas" charset="0"/>
-                <a:ea typeface="Consolas" charset="0"/>
-                <a:cs typeface="Consolas" charset="0"/>
-              </a:rPr>
-              <a:t> </a:t>
-            </a:r>
-            <a:r>
-              <a:rPr lang="en-US" sz="2400" dirty="0">
-                <a:solidFill>
-                  <a:schemeClr val="tx1"/>
-                </a:solidFill>
-                <a:latin typeface="Consolas" charset="0"/>
-                <a:ea typeface="Consolas" charset="0"/>
-                <a:cs typeface="Consolas" charset="0"/>
-              </a:rPr>
-              <a:t>install -c </a:t>
-            </a:r>
-            <a:r>
-              <a:rPr lang="en-US" sz="2400" dirty="0" err="1">
-                <a:solidFill>
-                  <a:schemeClr val="tx1"/>
-                </a:solidFill>
-                <a:latin typeface="Consolas" charset="0"/>
-                <a:ea typeface="Consolas" charset="0"/>
-                <a:cs typeface="Consolas" charset="0"/>
-              </a:rPr>
-              <a:t>conda</a:t>
-            </a:r>
-            <a:r>
-              <a:rPr lang="en-US" sz="2400" dirty="0">
-                <a:solidFill>
-                  <a:schemeClr val="tx1"/>
-                </a:solidFill>
-                <a:latin typeface="Consolas" charset="0"/>
-                <a:ea typeface="Consolas" charset="0"/>
-                <a:cs typeface="Consolas" charset="0"/>
-              </a:rPr>
-              <a:t>-forge </a:t>
-            </a:r>
-            <a:r>
-              <a:rPr lang="en-US" sz="2400" dirty="0" smtClean="0">
-                <a:solidFill>
-                  <a:schemeClr val="tx1"/>
-                </a:solidFill>
-                <a:latin typeface="Consolas" charset="0"/>
-                <a:ea typeface="Consolas" charset="0"/>
-                <a:cs typeface="Consolas" charset="0"/>
-              </a:rPr>
-              <a:t>&lt;library&gt;</a:t>
-            </a:r>
-            <a:endParaRPr lang="en-US" sz="2400" dirty="0">
-              <a:solidFill>
-                <a:schemeClr val="tx1"/>
-              </a:solidFill>
-              <a:latin typeface="Consolas" charset="0"/>
-              <a:ea typeface="Consolas" charset="0"/>
-              <a:cs typeface="Consolas" charset="0"/>
-            </a:endParaRPr>
-          </a:p>
-        </p:txBody>
-      </p:sp>
-      <p:sp>
-        <p:nvSpPr>
-          <p:cNvPr id="12" name="Rounded Rectangle 11"/>
-          <p:cNvSpPr/>
-          <p:nvPr/>
-        </p:nvSpPr>
-        <p:spPr>
-          <a:xfrm>
-            <a:off x="1138140" y="5512114"/>
-            <a:ext cx="6778637" cy="445631"/>
-          </a:xfrm>
-          <a:prstGeom prst="roundRect">
-            <a:avLst/>
-          </a:prstGeom>
-          <a:solidFill>
-            <a:schemeClr val="bg1">
-              <a:lumMod val="75000"/>
-              <a:alpha val="30000"/>
-            </a:schemeClr>
-          </a:solidFill>
-          <a:ln>
-            <a:solidFill>
-              <a:schemeClr val="bg1">
-                <a:lumMod val="75000"/>
-              </a:schemeClr>
-            </a:solidFill>
-          </a:ln>
-        </p:spPr>
-        <p:style>
-          <a:lnRef idx="2">
-            <a:schemeClr val="accent1">
-              <a:shade val="50000"/>
-            </a:schemeClr>
-          </a:lnRef>
-          <a:fillRef idx="1">
-            <a:schemeClr val="accent1"/>
-          </a:fillRef>
-          <a:effectRef idx="0">
-            <a:schemeClr val="accent1"/>
-          </a:effectRef>
-          <a:fontRef idx="minor">
-            <a:schemeClr val="lt1"/>
-          </a:fontRef>
-        </p:style>
-        <p:txBody>
-          <a:bodyPr rtlCol="0" anchor="ctr"/>
-          <a:lstStyle/>
-          <a:p>
-            <a:r>
-              <a:rPr lang="en-US" sz="2400" dirty="0" err="1" smtClean="0">
-                <a:solidFill>
-                  <a:schemeClr val="tx1"/>
-                </a:solidFill>
-                <a:latin typeface="Consolas" charset="0"/>
-                <a:ea typeface="Consolas" charset="0"/>
-                <a:cs typeface="Consolas" charset="0"/>
-              </a:rPr>
-              <a:t>jupyter</a:t>
-            </a:r>
-            <a:r>
-              <a:rPr lang="en-US" sz="2400" dirty="0" smtClean="0">
-                <a:solidFill>
-                  <a:schemeClr val="tx1"/>
-                </a:solidFill>
-                <a:latin typeface="Consolas" charset="0"/>
-                <a:ea typeface="Consolas" charset="0"/>
-                <a:cs typeface="Consolas" charset="0"/>
-              </a:rPr>
-              <a:t> </a:t>
-            </a:r>
-            <a:r>
-              <a:rPr lang="en-US" sz="2400" dirty="0">
-                <a:solidFill>
-                  <a:schemeClr val="tx1"/>
-                </a:solidFill>
-                <a:latin typeface="Consolas" charset="0"/>
-                <a:ea typeface="Consolas" charset="0"/>
-                <a:cs typeface="Consolas" charset="0"/>
-              </a:rPr>
-              <a:t>notebook --browser=</a:t>
-            </a:r>
-            <a:r>
-              <a:rPr lang="en-US" sz="2400" dirty="0" err="1">
-                <a:solidFill>
-                  <a:schemeClr val="tx1"/>
-                </a:solidFill>
-                <a:latin typeface="Consolas" charset="0"/>
-                <a:ea typeface="Consolas" charset="0"/>
-                <a:cs typeface="Consolas" charset="0"/>
-              </a:rPr>
-              <a:t>firefox</a:t>
-            </a:r>
-            <a:endParaRPr lang="en-US" sz="2400" dirty="0">
-              <a:solidFill>
-                <a:schemeClr val="tx1"/>
-              </a:solidFill>
-              <a:latin typeface="Consolas" charset="0"/>
-              <a:ea typeface="Consolas" charset="0"/>
-              <a:cs typeface="Consolas" charset="0"/>
-            </a:endParaRPr>
-          </a:p>
-        </p:txBody>
-      </p:sp>
-    </p:spTree>
-    <p:extLst>
-      <p:ext uri="{BB962C8B-B14F-4D97-AF65-F5344CB8AC3E}">
-        <p14:creationId xmlns:p14="http://schemas.microsoft.com/office/powerpoint/2010/main" val="472956744"/>
-      </p:ext>
-    </p:extLst>
-  </p:cSld>
-  <p:clrMapOvr>
-    <a:masterClrMapping/>
-  </p:clrMapOvr>
-  <p:timing>
-    <p:tnLst>
-      <p:par>
-        <p:cTn id="1" dur="indefinite" restart="never" nodeType="tmRoot"/>
-      </p:par>
-    </p:tnLst>
-  </p:timing>
 </p:sld>
 </file>
 

</xml_diff>